<commit_message>
ch2 update(join operation left)
</commit_message>
<xml_diff>
--- a/SQL_seminar/SQL중상급활용_CH2.pptx
+++ b/SQL_seminar/SQL중상급활용_CH2.pptx
@@ -5,7 +5,7 @@
     <p:sldMasterId id="2147483660" r:id="rId1"/>
   </p:sldMasterIdLst>
   <p:notesMasterIdLst>
-    <p:notesMasterId r:id="rId31"/>
+    <p:notesMasterId r:id="rId34"/>
   </p:notesMasterIdLst>
   <p:sldIdLst>
     <p:sldId id="256" r:id="rId2"/>
@@ -34,9 +34,12 @@
     <p:sldId id="325" r:id="rId25"/>
     <p:sldId id="326" r:id="rId26"/>
     <p:sldId id="330" r:id="rId27"/>
-    <p:sldId id="331" r:id="rId28"/>
-    <p:sldId id="327" r:id="rId29"/>
-    <p:sldId id="329" r:id="rId30"/>
+    <p:sldId id="327" r:id="rId28"/>
+    <p:sldId id="333" r:id="rId29"/>
+    <p:sldId id="334" r:id="rId30"/>
+    <p:sldId id="331" r:id="rId31"/>
+    <p:sldId id="332" r:id="rId32"/>
+    <p:sldId id="329" r:id="rId33"/>
   </p:sldIdLst>
   <p:sldSz cx="9906000" cy="6858000" type="A4"/>
   <p:notesSz cx="6797675" cy="9926638"/>
@@ -166,8 +169,11 @@
             <p14:sldId id="325"/>
             <p14:sldId id="326"/>
             <p14:sldId id="330"/>
+            <p14:sldId id="327"/>
+            <p14:sldId id="333"/>
+            <p14:sldId id="334"/>
             <p14:sldId id="331"/>
-            <p14:sldId id="327"/>
+            <p14:sldId id="332"/>
             <p14:sldId id="329"/>
           </p14:sldIdLst>
         </p14:section>
@@ -293,7 +299,7 @@
           <a:p>
             <a:fld id="{D8A39DB1-8325-48EE-BEF6-3041915F6829}" type="datetimeFigureOut">
               <a:rPr lang="ko-KR" altLang="en-US" smtClean="0"/>
-              <a:t>2021-10-15</a:t>
+              <a:t>2021-10-17</a:t>
             </a:fld>
             <a:endParaRPr lang="ko-KR" altLang="en-US"/>
           </a:p>
@@ -17303,15 +17309,7 @@
             </a:pPr>
             <a:r>
               <a:rPr lang="en-US" altLang="ko-KR" dirty="0"/>
-              <a:t>(</a:t>
-            </a:r>
-            <a:r>
-              <a:rPr lang="ko-KR" altLang="en-US" dirty="0"/>
-              <a:t>단계별 </a:t>
-            </a:r>
-            <a:r>
-              <a:rPr lang="en-US" altLang="ko-KR" dirty="0"/>
-              <a:t>ID</a:t>
+              <a:t>(ID</a:t>
             </a:r>
             <a:r>
               <a:rPr lang="ko-KR" altLang="en-US" dirty="0"/>
@@ -18214,8 +18212,8 @@
         </p:nvSpPr>
         <p:spPr>
           <a:xfrm>
-            <a:off x="220453" y="738231"/>
-            <a:ext cx="7154523" cy="5155066"/>
+            <a:off x="363984" y="824496"/>
+            <a:ext cx="4826578" cy="1253998"/>
           </a:xfrm>
           <a:prstGeom prst="rect">
             <a:avLst/>
@@ -18253,7 +18251,19 @@
             </a:pPr>
             <a:r>
               <a:rPr lang="en-US" altLang="ko-KR" sz="1300" dirty="0"/>
-              <a:t>     1. TABLE FULL SCAN : </a:t>
+              <a:t>     1. </a:t>
+            </a:r>
+            <a:r>
+              <a:rPr lang="en-US" altLang="ko-KR" sz="1300" b="1" dirty="0">
+                <a:solidFill>
+                  <a:srgbClr val="FF0000"/>
+                </a:solidFill>
+              </a:rPr>
+              <a:t>TABLE FULL SCAN </a:t>
+            </a:r>
+            <a:r>
+              <a:rPr lang="en-US" altLang="ko-KR" sz="1300" dirty="0"/>
+              <a:t>: </a:t>
             </a:r>
             <a:r>
               <a:rPr lang="ko-KR" altLang="en-US" sz="1300" dirty="0"/>
@@ -18291,7 +18301,19 @@
             </a:pPr>
             <a:r>
               <a:rPr lang="en-US" altLang="ko-KR" sz="1300" dirty="0"/>
-              <a:t>     3. INDEX SCAN       : </a:t>
+              <a:t>     3. </a:t>
+            </a:r>
+            <a:r>
+              <a:rPr lang="en-US" altLang="ko-KR" sz="1300" b="1" dirty="0">
+                <a:solidFill>
+                  <a:srgbClr val="FF0000"/>
+                </a:solidFill>
+              </a:rPr>
+              <a:t>INDEX SCAN</a:t>
+            </a:r>
+            <a:r>
+              <a:rPr lang="en-US" altLang="ko-KR" sz="1300" dirty="0"/>
+              <a:t>       : </a:t>
             </a:r>
             <a:r>
               <a:rPr lang="ko-KR" altLang="en-US" sz="1300" dirty="0"/>
@@ -18301,281 +18323,427 @@
               <a:rPr lang="en-US" altLang="ko-KR" sz="1300" dirty="0"/>
               <a:t>SCAN</a:t>
             </a:r>
-          </a:p>
-          <a:p>
-            <a:pPr>
-              <a:lnSpc>
-                <a:spcPct val="150000"/>
-              </a:lnSpc>
-            </a:pPr>
-            <a:endParaRPr lang="en-US" altLang="ko-KR" sz="1300" dirty="0"/>
-          </a:p>
-          <a:p>
-            <a:pPr marL="285750" indent="-285750">
-              <a:lnSpc>
-                <a:spcPct val="150000"/>
-              </a:lnSpc>
-              <a:buFont typeface="Arial" panose="020B0604020202020204" pitchFamily="34" charset="0"/>
-              <a:buChar char="•"/>
-            </a:pPr>
-            <a:r>
-              <a:rPr lang="ko-KR" altLang="en-US" sz="1300" dirty="0"/>
-              <a:t>개발자들의 편견     </a:t>
-            </a:r>
-            <a:r>
-              <a:rPr lang="en-US" altLang="ko-KR" sz="1300" dirty="0"/>
-              <a:t>: TABLE FULL SCAN</a:t>
-            </a:r>
-            <a:r>
-              <a:rPr lang="ko-KR" altLang="en-US" sz="1300" dirty="0"/>
-              <a:t>은 성능이 좋지 않고</a:t>
-            </a:r>
-            <a:r>
-              <a:rPr lang="en-US" altLang="ko-KR" sz="1300" dirty="0"/>
-              <a:t>, INDEX SCAN</a:t>
-            </a:r>
-            <a:r>
-              <a:rPr lang="ko-KR" altLang="en-US" sz="1300" dirty="0"/>
-              <a:t>은 성능이 좋음</a:t>
-            </a:r>
-            <a:endParaRPr lang="en-US" altLang="ko-KR" sz="1300" dirty="0"/>
-          </a:p>
-          <a:p>
-            <a:pPr marL="285750" indent="-285750">
-              <a:lnSpc>
-                <a:spcPct val="150000"/>
-              </a:lnSpc>
-              <a:buFont typeface="Arial" panose="020B0604020202020204" pitchFamily="34" charset="0"/>
-              <a:buChar char="•"/>
-            </a:pPr>
-            <a:r>
-              <a:rPr lang="en-US" altLang="ko-KR" sz="1300" dirty="0"/>
-              <a:t>INDEX SCAN        : </a:t>
-            </a:r>
-            <a:r>
-              <a:rPr lang="ko-KR" altLang="en-US" sz="1300" dirty="0"/>
-              <a:t>많은 데이터에서 일부분만 </a:t>
-            </a:r>
-            <a:r>
-              <a:rPr lang="en-US" altLang="ko-KR" sz="1300" dirty="0"/>
-              <a:t>SELECT</a:t>
-            </a:r>
-            <a:r>
-              <a:rPr lang="ko-KR" altLang="en-US" sz="1300" dirty="0"/>
-              <a:t>하는 경우 유리함</a:t>
-            </a:r>
-            <a:endParaRPr lang="en-US" altLang="ko-KR" sz="1300" dirty="0"/>
-          </a:p>
-          <a:p>
-            <a:pPr marL="285750" indent="-285750">
-              <a:lnSpc>
-                <a:spcPct val="150000"/>
-              </a:lnSpc>
-              <a:buFont typeface="Arial" panose="020B0604020202020204" pitchFamily="34" charset="0"/>
-              <a:buChar char="•"/>
-            </a:pPr>
-            <a:r>
-              <a:rPr lang="en-US" altLang="ko-KR" sz="1300" dirty="0"/>
-              <a:t>TABLE FULL SCAN : </a:t>
-            </a:r>
-            <a:r>
-              <a:rPr lang="ko-KR" altLang="en-US" sz="1300" dirty="0"/>
-              <a:t>대부분의 데이터를 </a:t>
-            </a:r>
-            <a:r>
-              <a:rPr lang="en-US" altLang="ko-KR" sz="1300" dirty="0"/>
-              <a:t>SELECT</a:t>
-            </a:r>
-            <a:r>
-              <a:rPr lang="ko-KR" altLang="en-US" sz="1300" dirty="0"/>
-              <a:t>하는 경우 유리함</a:t>
-            </a:r>
-            <a:endParaRPr lang="en-US" altLang="ko-KR" sz="1300" dirty="0"/>
-          </a:p>
-          <a:p>
-            <a:pPr marL="285750" indent="-285750">
-              <a:lnSpc>
-                <a:spcPct val="150000"/>
-              </a:lnSpc>
-              <a:buFont typeface="Arial" panose="020B0604020202020204" pitchFamily="34" charset="0"/>
-              <a:buChar char="•"/>
-            </a:pPr>
-            <a:endParaRPr lang="en-US" altLang="ko-KR" sz="1300" dirty="0"/>
-          </a:p>
-          <a:p>
-            <a:pPr marL="285750" indent="-285750">
-              <a:lnSpc>
-                <a:spcPct val="150000"/>
-              </a:lnSpc>
-              <a:buFont typeface="Arial" panose="020B0604020202020204" pitchFamily="34" charset="0"/>
-              <a:buChar char="•"/>
-            </a:pPr>
-            <a:r>
-              <a:rPr lang="en-US" altLang="ko-KR" sz="1300" dirty="0"/>
-              <a:t>TABLE FULL SCAN</a:t>
-            </a:r>
-            <a:r>
-              <a:rPr lang="ko-KR" altLang="en-US" sz="1300" dirty="0"/>
-              <a:t>을 선택하는 경우</a:t>
-            </a:r>
-            <a:endParaRPr lang="en-US" altLang="ko-KR" sz="1300" dirty="0"/>
-          </a:p>
-          <a:p>
-            <a:pPr>
-              <a:lnSpc>
-                <a:spcPct val="150000"/>
-              </a:lnSpc>
-            </a:pPr>
-            <a:r>
-              <a:rPr lang="en-US" altLang="ko-KR" sz="1300" dirty="0"/>
-              <a:t>     1. </a:t>
-            </a:r>
-            <a:r>
-              <a:rPr lang="ko-KR" altLang="en-US" sz="1300" dirty="0"/>
-              <a:t>조건절의 컬럼에 </a:t>
-            </a:r>
-            <a:r>
-              <a:rPr lang="en-US" altLang="ko-KR" sz="1300" dirty="0"/>
-              <a:t>INDEX</a:t>
-            </a:r>
-            <a:r>
-              <a:rPr lang="ko-KR" altLang="en-US" sz="1300" dirty="0"/>
-              <a:t>가 없는 경우</a:t>
-            </a:r>
-            <a:endParaRPr lang="en-US" altLang="ko-KR" sz="1300" dirty="0"/>
-          </a:p>
-          <a:p>
-            <a:pPr>
-              <a:lnSpc>
-                <a:spcPct val="150000"/>
-              </a:lnSpc>
-            </a:pPr>
-            <a:r>
-              <a:rPr lang="en-US" altLang="ko-KR" sz="1300" dirty="0"/>
-              <a:t>     2. INDEX</a:t>
-            </a:r>
-            <a:r>
-              <a:rPr lang="ko-KR" altLang="en-US" sz="1300" dirty="0"/>
-              <a:t>가 있으나</a:t>
-            </a:r>
-            <a:r>
-              <a:rPr lang="en-US" altLang="ko-KR" sz="1300" dirty="0"/>
-              <a:t>, </a:t>
-            </a:r>
-            <a:r>
-              <a:rPr lang="ko-KR" altLang="en-US" sz="1300" dirty="0"/>
-              <a:t>조건을 만족하는 데이터가 테이블의 많은 양을 차지하는 경우</a:t>
-            </a:r>
-            <a:endParaRPr lang="en-US" altLang="ko-KR" sz="1300" dirty="0"/>
-          </a:p>
-          <a:p>
-            <a:pPr>
-              <a:lnSpc>
-                <a:spcPct val="150000"/>
-              </a:lnSpc>
-            </a:pPr>
-            <a:r>
-              <a:rPr lang="en-US" altLang="ko-KR" sz="1300" dirty="0"/>
-              <a:t>     3. INDEX</a:t>
-            </a:r>
-            <a:r>
-              <a:rPr lang="ko-KR" altLang="en-US" sz="1300" dirty="0"/>
-              <a:t>가 있으나</a:t>
-            </a:r>
-            <a:r>
-              <a:rPr lang="en-US" altLang="ko-KR" sz="1300" dirty="0"/>
-              <a:t>, </a:t>
-            </a:r>
-            <a:r>
-              <a:rPr lang="ko-KR" altLang="en-US" sz="1300" dirty="0"/>
-              <a:t>테이블의 데이터가 적어 </a:t>
-            </a:r>
-            <a:r>
-              <a:rPr lang="en-US" altLang="ko-KR" sz="1300" dirty="0"/>
-              <a:t>FULL SCAN</a:t>
-            </a:r>
-            <a:r>
-              <a:rPr lang="ko-KR" altLang="en-US" sz="1300" dirty="0"/>
-              <a:t>이 유리한 경우</a:t>
-            </a:r>
-            <a:endParaRPr lang="en-US" altLang="ko-KR" sz="1300" dirty="0"/>
-          </a:p>
-          <a:p>
-            <a:pPr>
-              <a:lnSpc>
-                <a:spcPct val="150000"/>
-              </a:lnSpc>
-            </a:pPr>
-            <a:endParaRPr lang="en-US" altLang="ko-KR" sz="1300" dirty="0"/>
-          </a:p>
-          <a:p>
-            <a:pPr marL="285750" indent="-285750">
-              <a:lnSpc>
-                <a:spcPct val="150000"/>
-              </a:lnSpc>
-              <a:buFont typeface="Arial" panose="020B0604020202020204" pitchFamily="34" charset="0"/>
-              <a:buChar char="•"/>
-            </a:pPr>
-            <a:r>
-              <a:rPr lang="en-US" altLang="ko-KR" sz="1300" dirty="0"/>
-              <a:t>ROWID SCAN</a:t>
-            </a:r>
-            <a:r>
-              <a:rPr lang="ko-KR" altLang="en-US" sz="1300" dirty="0"/>
-              <a:t>을 선택하는 경우</a:t>
-            </a:r>
-            <a:endParaRPr lang="en-US" altLang="ko-KR" sz="1300" dirty="0"/>
-          </a:p>
-          <a:p>
-            <a:pPr>
-              <a:lnSpc>
-                <a:spcPct val="150000"/>
-              </a:lnSpc>
-            </a:pPr>
-            <a:r>
-              <a:rPr lang="en-US" altLang="ko-KR" sz="1300" dirty="0"/>
-              <a:t>     1. </a:t>
-            </a:r>
-            <a:r>
-              <a:rPr lang="ko-KR" altLang="en-US" sz="1300" dirty="0"/>
-              <a:t>조건절에 </a:t>
-            </a:r>
-            <a:r>
-              <a:rPr lang="en-US" altLang="ko-KR" sz="1300" dirty="0"/>
-              <a:t>ROWID</a:t>
-            </a:r>
-            <a:r>
-              <a:rPr lang="ko-KR" altLang="en-US" sz="1300" dirty="0"/>
-              <a:t>를 명시하는 경우</a:t>
-            </a:r>
-            <a:endParaRPr lang="en-US" altLang="ko-KR" sz="1300" dirty="0"/>
-          </a:p>
-          <a:p>
-            <a:pPr>
-              <a:lnSpc>
-                <a:spcPct val="150000"/>
-              </a:lnSpc>
-            </a:pPr>
-            <a:r>
-              <a:rPr lang="en-US" altLang="ko-KR" sz="1300" dirty="0"/>
-              <a:t>     2. INDEX SCAN</a:t>
-            </a:r>
-            <a:r>
-              <a:rPr lang="ko-KR" altLang="en-US" sz="1300" dirty="0"/>
-              <a:t>을 통해 </a:t>
-            </a:r>
-            <a:r>
-              <a:rPr lang="en-US" altLang="ko-KR" sz="1300" dirty="0"/>
-              <a:t>ROWID</a:t>
-            </a:r>
-            <a:r>
-              <a:rPr lang="ko-KR" altLang="en-US" sz="1300" dirty="0"/>
-              <a:t> 조회 후 테이블에 접근할 경우</a:t>
-            </a:r>
-            <a:endParaRPr lang="en-US" altLang="ko-KR" sz="1300" dirty="0"/>
           </a:p>
         </p:txBody>
       </p:sp>
+      <p:grpSp>
+        <p:nvGrpSpPr>
+          <p:cNvPr id="6" name="그룹 5">
+            <a:extLst>
+              <a:ext uri="{FF2B5EF4-FFF2-40B4-BE49-F238E27FC236}">
+                <a16:creationId xmlns:a16="http://schemas.microsoft.com/office/drawing/2014/main" id="{EC3F6FBA-4341-475B-BA79-D43ADC33E4D5}"/>
+              </a:ext>
+            </a:extLst>
+          </p:cNvPr>
+          <p:cNvGrpSpPr/>
+          <p:nvPr/>
+        </p:nvGrpSpPr>
+        <p:grpSpPr>
+          <a:xfrm>
+            <a:off x="363984" y="2441349"/>
+            <a:ext cx="7538444" cy="2973136"/>
+            <a:chOff x="363984" y="1103915"/>
+            <a:chExt cx="7538444" cy="2973136"/>
+          </a:xfrm>
+        </p:grpSpPr>
+        <p:sp>
+          <p:nvSpPr>
+            <p:cNvPr id="7" name="직사각형 6">
+              <a:extLst>
+                <a:ext uri="{FF2B5EF4-FFF2-40B4-BE49-F238E27FC236}">
+                  <a16:creationId xmlns:a16="http://schemas.microsoft.com/office/drawing/2014/main" id="{40BEC6FF-6CA7-4E27-9BA1-5D5BBC4A4364}"/>
+                </a:ext>
+              </a:extLst>
+            </p:cNvPr>
+            <p:cNvSpPr/>
+            <p:nvPr/>
+          </p:nvSpPr>
+          <p:spPr>
+            <a:xfrm>
+              <a:off x="366747" y="1456089"/>
+              <a:ext cx="7535681" cy="2620962"/>
+            </a:xfrm>
+            <a:prstGeom prst="rect">
+              <a:avLst/>
+            </a:prstGeom>
+            <a:noFill/>
+          </p:spPr>
+          <p:style>
+            <a:lnRef idx="2">
+              <a:schemeClr val="accent1">
+                <a:shade val="50000"/>
+              </a:schemeClr>
+            </a:lnRef>
+            <a:fillRef idx="1">
+              <a:schemeClr val="accent1"/>
+            </a:fillRef>
+            <a:effectRef idx="0">
+              <a:schemeClr val="accent1"/>
+            </a:effectRef>
+            <a:fontRef idx="minor">
+              <a:schemeClr val="lt1"/>
+            </a:fontRef>
+          </p:style>
+          <p:txBody>
+            <a:bodyPr rtlCol="0" anchor="ctr"/>
+            <a:lstStyle/>
+            <a:p>
+              <a:pPr algn="ctr"/>
+              <a:endParaRPr lang="ko-KR" altLang="en-US">
+                <a:latin typeface="나눔고딕" panose="020B0600000101010101" charset="-127"/>
+                <a:ea typeface="나눔고딕" panose="020B0600000101010101" charset="-127"/>
+              </a:endParaRPr>
+            </a:p>
+          </p:txBody>
+        </p:sp>
+        <p:sp>
+          <p:nvSpPr>
+            <p:cNvPr id="8" name="자유형 23">
+              <a:extLst>
+                <a:ext uri="{FF2B5EF4-FFF2-40B4-BE49-F238E27FC236}">
+                  <a16:creationId xmlns:a16="http://schemas.microsoft.com/office/drawing/2014/main" id="{8BCD5CE6-B1B5-44AE-A1DC-02AD34A29AA1}"/>
+                </a:ext>
+              </a:extLst>
+            </p:cNvPr>
+            <p:cNvSpPr>
+              <a:spLocks noChangeArrowheads="1"/>
+            </p:cNvSpPr>
+            <p:nvPr/>
+          </p:nvSpPr>
+          <p:spPr bwMode="gray">
+            <a:xfrm>
+              <a:off x="363984" y="1103915"/>
+              <a:ext cx="2344710" cy="352174"/>
+            </a:xfrm>
+            <a:custGeom>
+              <a:avLst/>
+              <a:gdLst>
+                <a:gd name="connsiteX0" fmla="*/ 48729 w 1587995"/>
+                <a:gd name="connsiteY0" fmla="*/ 0 h 292361"/>
+                <a:gd name="connsiteX1" fmla="*/ 1539267 w 1587995"/>
+                <a:gd name="connsiteY1" fmla="*/ 0 h 292361"/>
+                <a:gd name="connsiteX2" fmla="*/ 1587995 w 1587995"/>
+                <a:gd name="connsiteY2" fmla="*/ 48728 h 292361"/>
+                <a:gd name="connsiteX3" fmla="*/ 1587995 w 1587995"/>
+                <a:gd name="connsiteY3" fmla="*/ 243633 h 292361"/>
+                <a:gd name="connsiteX4" fmla="*/ 1587994 w 1587995"/>
+                <a:gd name="connsiteY4" fmla="*/ 243636 h 292361"/>
+                <a:gd name="connsiteX5" fmla="*/ 1587994 w 1587995"/>
+                <a:gd name="connsiteY5" fmla="*/ 292361 h 292361"/>
+                <a:gd name="connsiteX6" fmla="*/ 1539267 w 1587995"/>
+                <a:gd name="connsiteY6" fmla="*/ 292361 h 292361"/>
+                <a:gd name="connsiteX7" fmla="*/ 48729 w 1587995"/>
+                <a:gd name="connsiteY7" fmla="*/ 292361 h 292361"/>
+                <a:gd name="connsiteX8" fmla="*/ 0 w 1587995"/>
+                <a:gd name="connsiteY8" fmla="*/ 292361 h 292361"/>
+                <a:gd name="connsiteX9" fmla="*/ 0 w 1587995"/>
+                <a:gd name="connsiteY9" fmla="*/ 152400 h 292361"/>
+                <a:gd name="connsiteX10" fmla="*/ 1 w 1587995"/>
+                <a:gd name="connsiteY10" fmla="*/ 152400 h 292361"/>
+                <a:gd name="connsiteX11" fmla="*/ 1 w 1587995"/>
+                <a:gd name="connsiteY11" fmla="*/ 48728 h 292361"/>
+                <a:gd name="connsiteX12" fmla="*/ 48729 w 1587995"/>
+                <a:gd name="connsiteY12" fmla="*/ 0 h 292361"/>
+              </a:gdLst>
+              <a:ahLst/>
+              <a:cxnLst>
+                <a:cxn ang="0">
+                  <a:pos x="connsiteX0" y="connsiteY0"/>
+                </a:cxn>
+                <a:cxn ang="0">
+                  <a:pos x="connsiteX1" y="connsiteY1"/>
+                </a:cxn>
+                <a:cxn ang="0">
+                  <a:pos x="connsiteX2" y="connsiteY2"/>
+                </a:cxn>
+                <a:cxn ang="0">
+                  <a:pos x="connsiteX3" y="connsiteY3"/>
+                </a:cxn>
+                <a:cxn ang="0">
+                  <a:pos x="connsiteX4" y="connsiteY4"/>
+                </a:cxn>
+                <a:cxn ang="0">
+                  <a:pos x="connsiteX5" y="connsiteY5"/>
+                </a:cxn>
+                <a:cxn ang="0">
+                  <a:pos x="connsiteX6" y="connsiteY6"/>
+                </a:cxn>
+                <a:cxn ang="0">
+                  <a:pos x="connsiteX7" y="connsiteY7"/>
+                </a:cxn>
+                <a:cxn ang="0">
+                  <a:pos x="connsiteX8" y="connsiteY8"/>
+                </a:cxn>
+                <a:cxn ang="0">
+                  <a:pos x="connsiteX9" y="connsiteY9"/>
+                </a:cxn>
+                <a:cxn ang="0">
+                  <a:pos x="connsiteX10" y="connsiteY10"/>
+                </a:cxn>
+                <a:cxn ang="0">
+                  <a:pos x="connsiteX11" y="connsiteY11"/>
+                </a:cxn>
+                <a:cxn ang="0">
+                  <a:pos x="connsiteX12" y="connsiteY12"/>
+                </a:cxn>
+              </a:cxnLst>
+              <a:rect l="l" t="t" r="r" b="b"/>
+              <a:pathLst>
+                <a:path w="1587995" h="292361">
+                  <a:moveTo>
+                    <a:pt x="48729" y="0"/>
+                  </a:moveTo>
+                  <a:lnTo>
+                    <a:pt x="1539267" y="0"/>
+                  </a:lnTo>
+                  <a:cubicBezTo>
+                    <a:pt x="1566179" y="0"/>
+                    <a:pt x="1587995" y="21816"/>
+                    <a:pt x="1587995" y="48728"/>
+                  </a:cubicBezTo>
+                  <a:lnTo>
+                    <a:pt x="1587995" y="243633"/>
+                  </a:lnTo>
+                  <a:lnTo>
+                    <a:pt x="1587994" y="243636"/>
+                  </a:lnTo>
+                  <a:lnTo>
+                    <a:pt x="1587994" y="292361"/>
+                  </a:lnTo>
+                  <a:lnTo>
+                    <a:pt x="1539267" y="292361"/>
+                  </a:lnTo>
+                  <a:lnTo>
+                    <a:pt x="48729" y="292361"/>
+                  </a:lnTo>
+                  <a:lnTo>
+                    <a:pt x="0" y="292361"/>
+                  </a:lnTo>
+                  <a:lnTo>
+                    <a:pt x="0" y="152400"/>
+                  </a:lnTo>
+                  <a:lnTo>
+                    <a:pt x="1" y="152400"/>
+                  </a:lnTo>
+                  <a:lnTo>
+                    <a:pt x="1" y="48728"/>
+                  </a:lnTo>
+                  <a:cubicBezTo>
+                    <a:pt x="1" y="21816"/>
+                    <a:pt x="21817" y="0"/>
+                    <a:pt x="48729" y="0"/>
+                  </a:cubicBezTo>
+                  <a:close/>
+                </a:path>
+              </a:pathLst>
+            </a:custGeom>
+            <a:solidFill>
+              <a:srgbClr val="002060"/>
+            </a:solidFill>
+            <a:ln w="9525" algn="ctr">
+              <a:solidFill>
+                <a:srgbClr val="002060"/>
+              </a:solidFill>
+              <a:miter lim="800000"/>
+              <a:headEnd/>
+              <a:tailEnd/>
+            </a:ln>
+            <a:effectLst>
+              <a:outerShdw blurRad="50800" dist="38100" dir="2700000" algn="tl" rotWithShape="0">
+                <a:prstClr val="black">
+                  <a:alpha val="40000"/>
+                </a:prstClr>
+              </a:outerShdw>
+            </a:effectLst>
+          </p:spPr>
+          <p:txBody>
+            <a:bodyPr wrap="square" lIns="72000" tIns="36000" rIns="72000" bIns="36000" anchor="ctr">
+              <a:noAutofit/>
+            </a:bodyPr>
+            <a:lstStyle/>
+            <a:p>
+              <a:pPr marR="0" lvl="0" algn="ctr" defTabSz="411163" eaLnBrk="0" fontAlgn="base" latinLnBrk="0" hangingPunct="0">
+                <a:spcBef>
+                  <a:spcPct val="0"/>
+                </a:spcBef>
+                <a:spcAft>
+                  <a:spcPct val="0"/>
+                </a:spcAft>
+                <a:buSzPct val="90000"/>
+                <a:tabLst>
+                  <a:tab pos="85725" algn="l"/>
+                </a:tabLst>
+                <a:defRPr/>
+              </a:pPr>
+              <a:r>
+                <a:rPr kumimoji="1" lang="ko-KR" altLang="en-US" sz="1200" b="1" i="0" u="none" strike="noStrike" kern="0" cap="none" spc="0" normalizeH="0" baseline="0" noProof="0" dirty="0">
+                  <a:ln>
+                    <a:noFill/>
+                  </a:ln>
+                  <a:solidFill>
+                    <a:schemeClr val="bg1"/>
+                  </a:solidFill>
+                  <a:effectLst/>
+                  <a:uLnTx/>
+                  <a:uFillTx/>
+                  <a:latin typeface="나눔고딕" panose="020B0600000101010101" charset="-127"/>
+                  <a:ea typeface="나눔고딕" panose="020B0600000101010101" charset="-127"/>
+                </a:rPr>
+                <a:t>실행계획 내 </a:t>
+              </a:r>
+              <a:r>
+                <a:rPr kumimoji="1" lang="en-US" altLang="ko-KR" sz="1200" b="1" i="0" u="none" strike="noStrike" kern="0" cap="none" spc="0" normalizeH="0" baseline="0" noProof="0" dirty="0">
+                  <a:ln>
+                    <a:noFill/>
+                  </a:ln>
+                  <a:solidFill>
+                    <a:schemeClr val="bg1"/>
+                  </a:solidFill>
+                  <a:effectLst/>
+                  <a:uLnTx/>
+                  <a:uFillTx/>
+                  <a:latin typeface="나눔고딕" panose="020B0600000101010101" charset="-127"/>
+                  <a:ea typeface="나눔고딕" panose="020B0600000101010101" charset="-127"/>
+                </a:rPr>
+                <a:t>SCAN OPERATION</a:t>
+              </a:r>
+            </a:p>
+          </p:txBody>
+        </p:sp>
+        <p:pic>
+          <p:nvPicPr>
+            <p:cNvPr id="9" name="Picture 2">
+              <a:extLst>
+                <a:ext uri="{FF2B5EF4-FFF2-40B4-BE49-F238E27FC236}">
+                  <a16:creationId xmlns:a16="http://schemas.microsoft.com/office/drawing/2014/main" id="{AE74CFAF-7ED7-430B-BD05-C54E8A91DC15}"/>
+                </a:ext>
+              </a:extLst>
+            </p:cNvPr>
+            <p:cNvPicPr>
+              <a:picLocks noChangeAspect="1" noChangeArrowheads="1"/>
+            </p:cNvPicPr>
+            <p:nvPr/>
+          </p:nvPicPr>
+          <p:blipFill>
+            <a:blip r:embed="rId2">
+              <a:extLst>
+                <a:ext uri="{28A0092B-C50C-407E-A947-70E740481C1C}">
+                  <a14:useLocalDpi xmlns:a14="http://schemas.microsoft.com/office/drawing/2010/main" val="0"/>
+                </a:ext>
+              </a:extLst>
+            </a:blip>
+            <a:srcRect/>
+            <a:stretch>
+              <a:fillRect/>
+            </a:stretch>
+          </p:blipFill>
+          <p:spPr bwMode="auto">
+            <a:xfrm>
+              <a:off x="491616" y="1576872"/>
+              <a:ext cx="7229924" cy="2399708"/>
+            </a:xfrm>
+            <a:prstGeom prst="rect">
+              <a:avLst/>
+            </a:prstGeom>
+            <a:noFill/>
+            <a:extLst>
+              <a:ext uri="{909E8E84-426E-40DD-AFC4-6F175D3DCCD1}">
+                <a14:hiddenFill xmlns:a14="http://schemas.microsoft.com/office/drawing/2010/main">
+                  <a:solidFill>
+                    <a:srgbClr val="FFFFFF"/>
+                  </a:solidFill>
+                </a14:hiddenFill>
+              </a:ext>
+            </a:extLst>
+          </p:spPr>
+        </p:pic>
+      </p:grpSp>
+      <p:cxnSp>
+        <p:nvCxnSpPr>
+          <p:cNvPr id="10" name="직선 연결선 9">
+            <a:extLst>
+              <a:ext uri="{FF2B5EF4-FFF2-40B4-BE49-F238E27FC236}">
+                <a16:creationId xmlns:a16="http://schemas.microsoft.com/office/drawing/2014/main" id="{6B38D96C-6479-45EC-A5BC-8F87B3BE0926}"/>
+              </a:ext>
+            </a:extLst>
+          </p:cNvPr>
+          <p:cNvCxnSpPr>
+            <a:cxnSpLocks/>
+          </p:cNvCxnSpPr>
+          <p:nvPr/>
+        </p:nvCxnSpPr>
+        <p:spPr>
+          <a:xfrm>
+            <a:off x="1414133" y="5090607"/>
+            <a:ext cx="1294561" cy="0"/>
+          </a:xfrm>
+          <a:prstGeom prst="line">
+            <a:avLst/>
+          </a:prstGeom>
+          <a:ln w="19050">
+            <a:solidFill>
+              <a:srgbClr val="FF0000"/>
+            </a:solidFill>
+          </a:ln>
+        </p:spPr>
+        <p:style>
+          <a:lnRef idx="1">
+            <a:schemeClr val="accent1"/>
+          </a:lnRef>
+          <a:fillRef idx="0">
+            <a:schemeClr val="accent1"/>
+          </a:fillRef>
+          <a:effectRef idx="0">
+            <a:schemeClr val="accent1"/>
+          </a:effectRef>
+          <a:fontRef idx="minor">
+            <a:schemeClr val="tx1"/>
+          </a:fontRef>
+        </p:style>
+      </p:cxnSp>
+      <p:cxnSp>
+        <p:nvCxnSpPr>
+          <p:cNvPr id="13" name="직선 연결선 12">
+            <a:extLst>
+              <a:ext uri="{FF2B5EF4-FFF2-40B4-BE49-F238E27FC236}">
+                <a16:creationId xmlns:a16="http://schemas.microsoft.com/office/drawing/2014/main" id="{1727584E-D257-4367-B48B-7CCBE5FE064E}"/>
+              </a:ext>
+            </a:extLst>
+          </p:cNvPr>
+          <p:cNvCxnSpPr>
+            <a:cxnSpLocks/>
+          </p:cNvCxnSpPr>
+          <p:nvPr/>
+        </p:nvCxnSpPr>
+        <p:spPr>
+          <a:xfrm>
+            <a:off x="1414133" y="4621905"/>
+            <a:ext cx="1294561" cy="0"/>
+          </a:xfrm>
+          <a:prstGeom prst="line">
+            <a:avLst/>
+          </a:prstGeom>
+          <a:ln w="19050">
+            <a:solidFill>
+              <a:srgbClr val="FF0000"/>
+            </a:solidFill>
+          </a:ln>
+        </p:spPr>
+        <p:style>
+          <a:lnRef idx="1">
+            <a:schemeClr val="accent1"/>
+          </a:lnRef>
+          <a:fillRef idx="0">
+            <a:schemeClr val="accent1"/>
+          </a:fillRef>
+          <a:effectRef idx="0">
+            <a:schemeClr val="accent1"/>
+          </a:effectRef>
+          <a:fontRef idx="minor">
+            <a:schemeClr val="tx1"/>
+          </a:fontRef>
+        </p:style>
+      </p:cxnSp>
     </p:spTree>
     <p:extLst>
       <p:ext uri="{BB962C8B-B14F-4D97-AF65-F5344CB8AC3E}">
@@ -18632,7 +18800,7 @@
                 <a:latin typeface="나눔고딕" panose="020B0600000101010101" charset="-127"/>
                 <a:ea typeface="나눔고딕" panose="020B0600000101010101" charset="-127"/>
               </a:rPr>
-              <a:t>3. SCAN OPERATION</a:t>
+              <a:t>4. TABLE FULL SCAN</a:t>
             </a:r>
             <a:endParaRPr lang="ko-KR" altLang="en-US" dirty="0">
               <a:latin typeface="나눔고딕" panose="020B0600000101010101" charset="-127"/>
@@ -18726,12 +18894,311 @@
           </a:p>
         </p:txBody>
       </p:sp>
+      <p:grpSp>
+        <p:nvGrpSpPr>
+          <p:cNvPr id="3" name="그룹 2">
+            <a:extLst>
+              <a:ext uri="{FF2B5EF4-FFF2-40B4-BE49-F238E27FC236}">
+                <a16:creationId xmlns:a16="http://schemas.microsoft.com/office/drawing/2014/main" id="{A086BB5D-78B4-45E3-82CD-5DA7940A0BE7}"/>
+              </a:ext>
+            </a:extLst>
+          </p:cNvPr>
+          <p:cNvGrpSpPr/>
+          <p:nvPr/>
+        </p:nvGrpSpPr>
+        <p:grpSpPr>
+          <a:xfrm>
+            <a:off x="2414723" y="2026640"/>
+            <a:ext cx="4980493" cy="3450598"/>
+            <a:chOff x="1084638" y="850269"/>
+            <a:chExt cx="7736721" cy="4776649"/>
+          </a:xfrm>
+        </p:grpSpPr>
+        <p:pic>
+          <p:nvPicPr>
+            <p:cNvPr id="11" name="그림 10">
+              <a:extLst>
+                <a:ext uri="{FF2B5EF4-FFF2-40B4-BE49-F238E27FC236}">
+                  <a16:creationId xmlns:a16="http://schemas.microsoft.com/office/drawing/2014/main" id="{CF5729D9-F261-412E-B38F-AF76D06E0E5A}"/>
+                </a:ext>
+              </a:extLst>
+            </p:cNvPr>
+            <p:cNvPicPr>
+              <a:picLocks noChangeAspect="1"/>
+            </p:cNvPicPr>
+            <p:nvPr/>
+          </p:nvPicPr>
+          <p:blipFill>
+            <a:blip r:embed="rId2"/>
+            <a:stretch>
+              <a:fillRect/>
+            </a:stretch>
+          </p:blipFill>
+          <p:spPr>
+            <a:xfrm>
+              <a:off x="1084642" y="1156815"/>
+              <a:ext cx="7736717" cy="4470103"/>
+            </a:xfrm>
+            <a:prstGeom prst="rect">
+              <a:avLst/>
+            </a:prstGeom>
+          </p:spPr>
+        </p:pic>
+        <p:sp>
+          <p:nvSpPr>
+            <p:cNvPr id="6" name="직사각형 5">
+              <a:extLst>
+                <a:ext uri="{FF2B5EF4-FFF2-40B4-BE49-F238E27FC236}">
+                  <a16:creationId xmlns:a16="http://schemas.microsoft.com/office/drawing/2014/main" id="{2438CC5E-8A61-4CE1-B59B-A184B0FF351D}"/>
+                </a:ext>
+              </a:extLst>
+            </p:cNvPr>
+            <p:cNvSpPr/>
+            <p:nvPr/>
+          </p:nvSpPr>
+          <p:spPr>
+            <a:xfrm>
+              <a:off x="1084641" y="1202443"/>
+              <a:ext cx="7662544" cy="4378848"/>
+            </a:xfrm>
+            <a:prstGeom prst="rect">
+              <a:avLst/>
+            </a:prstGeom>
+            <a:noFill/>
+          </p:spPr>
+          <p:style>
+            <a:lnRef idx="2">
+              <a:schemeClr val="accent1">
+                <a:shade val="50000"/>
+              </a:schemeClr>
+            </a:lnRef>
+            <a:fillRef idx="1">
+              <a:schemeClr val="accent1"/>
+            </a:fillRef>
+            <a:effectRef idx="0">
+              <a:schemeClr val="accent1"/>
+            </a:effectRef>
+            <a:fontRef idx="minor">
+              <a:schemeClr val="lt1"/>
+            </a:fontRef>
+          </p:style>
+          <p:txBody>
+            <a:bodyPr rtlCol="0" anchor="ctr"/>
+            <a:lstStyle/>
+            <a:p>
+              <a:pPr algn="ctr"/>
+              <a:endParaRPr lang="ko-KR" altLang="en-US">
+                <a:latin typeface="나눔고딕" panose="020B0600000101010101" charset="-127"/>
+                <a:ea typeface="나눔고딕" panose="020B0600000101010101" charset="-127"/>
+              </a:endParaRPr>
+            </a:p>
+          </p:txBody>
+        </p:sp>
+        <p:sp>
+          <p:nvSpPr>
+            <p:cNvPr id="8" name="자유형 23">
+              <a:extLst>
+                <a:ext uri="{FF2B5EF4-FFF2-40B4-BE49-F238E27FC236}">
+                  <a16:creationId xmlns:a16="http://schemas.microsoft.com/office/drawing/2014/main" id="{5740F4AD-9ABA-4A89-AEAF-317F52A355FD}"/>
+                </a:ext>
+              </a:extLst>
+            </p:cNvPr>
+            <p:cNvSpPr>
+              <a:spLocks noChangeArrowheads="1"/>
+            </p:cNvSpPr>
+            <p:nvPr/>
+          </p:nvSpPr>
+          <p:spPr bwMode="gray">
+            <a:xfrm>
+              <a:off x="1084638" y="850269"/>
+              <a:ext cx="2283568" cy="352175"/>
+            </a:xfrm>
+            <a:custGeom>
+              <a:avLst/>
+              <a:gdLst>
+                <a:gd name="connsiteX0" fmla="*/ 48729 w 1587995"/>
+                <a:gd name="connsiteY0" fmla="*/ 0 h 292361"/>
+                <a:gd name="connsiteX1" fmla="*/ 1539267 w 1587995"/>
+                <a:gd name="connsiteY1" fmla="*/ 0 h 292361"/>
+                <a:gd name="connsiteX2" fmla="*/ 1587995 w 1587995"/>
+                <a:gd name="connsiteY2" fmla="*/ 48728 h 292361"/>
+                <a:gd name="connsiteX3" fmla="*/ 1587995 w 1587995"/>
+                <a:gd name="connsiteY3" fmla="*/ 243633 h 292361"/>
+                <a:gd name="connsiteX4" fmla="*/ 1587994 w 1587995"/>
+                <a:gd name="connsiteY4" fmla="*/ 243636 h 292361"/>
+                <a:gd name="connsiteX5" fmla="*/ 1587994 w 1587995"/>
+                <a:gd name="connsiteY5" fmla="*/ 292361 h 292361"/>
+                <a:gd name="connsiteX6" fmla="*/ 1539267 w 1587995"/>
+                <a:gd name="connsiteY6" fmla="*/ 292361 h 292361"/>
+                <a:gd name="connsiteX7" fmla="*/ 48729 w 1587995"/>
+                <a:gd name="connsiteY7" fmla="*/ 292361 h 292361"/>
+                <a:gd name="connsiteX8" fmla="*/ 0 w 1587995"/>
+                <a:gd name="connsiteY8" fmla="*/ 292361 h 292361"/>
+                <a:gd name="connsiteX9" fmla="*/ 0 w 1587995"/>
+                <a:gd name="connsiteY9" fmla="*/ 152400 h 292361"/>
+                <a:gd name="connsiteX10" fmla="*/ 1 w 1587995"/>
+                <a:gd name="connsiteY10" fmla="*/ 152400 h 292361"/>
+                <a:gd name="connsiteX11" fmla="*/ 1 w 1587995"/>
+                <a:gd name="connsiteY11" fmla="*/ 48728 h 292361"/>
+                <a:gd name="connsiteX12" fmla="*/ 48729 w 1587995"/>
+                <a:gd name="connsiteY12" fmla="*/ 0 h 292361"/>
+              </a:gdLst>
+              <a:ahLst/>
+              <a:cxnLst>
+                <a:cxn ang="0">
+                  <a:pos x="connsiteX0" y="connsiteY0"/>
+                </a:cxn>
+                <a:cxn ang="0">
+                  <a:pos x="connsiteX1" y="connsiteY1"/>
+                </a:cxn>
+                <a:cxn ang="0">
+                  <a:pos x="connsiteX2" y="connsiteY2"/>
+                </a:cxn>
+                <a:cxn ang="0">
+                  <a:pos x="connsiteX3" y="connsiteY3"/>
+                </a:cxn>
+                <a:cxn ang="0">
+                  <a:pos x="connsiteX4" y="connsiteY4"/>
+                </a:cxn>
+                <a:cxn ang="0">
+                  <a:pos x="connsiteX5" y="connsiteY5"/>
+                </a:cxn>
+                <a:cxn ang="0">
+                  <a:pos x="connsiteX6" y="connsiteY6"/>
+                </a:cxn>
+                <a:cxn ang="0">
+                  <a:pos x="connsiteX7" y="connsiteY7"/>
+                </a:cxn>
+                <a:cxn ang="0">
+                  <a:pos x="connsiteX8" y="connsiteY8"/>
+                </a:cxn>
+                <a:cxn ang="0">
+                  <a:pos x="connsiteX9" y="connsiteY9"/>
+                </a:cxn>
+                <a:cxn ang="0">
+                  <a:pos x="connsiteX10" y="connsiteY10"/>
+                </a:cxn>
+                <a:cxn ang="0">
+                  <a:pos x="connsiteX11" y="connsiteY11"/>
+                </a:cxn>
+                <a:cxn ang="0">
+                  <a:pos x="connsiteX12" y="connsiteY12"/>
+                </a:cxn>
+              </a:cxnLst>
+              <a:rect l="l" t="t" r="r" b="b"/>
+              <a:pathLst>
+                <a:path w="1587995" h="292361">
+                  <a:moveTo>
+                    <a:pt x="48729" y="0"/>
+                  </a:moveTo>
+                  <a:lnTo>
+                    <a:pt x="1539267" y="0"/>
+                  </a:lnTo>
+                  <a:cubicBezTo>
+                    <a:pt x="1566179" y="0"/>
+                    <a:pt x="1587995" y="21816"/>
+                    <a:pt x="1587995" y="48728"/>
+                  </a:cubicBezTo>
+                  <a:lnTo>
+                    <a:pt x="1587995" y="243633"/>
+                  </a:lnTo>
+                  <a:lnTo>
+                    <a:pt x="1587994" y="243636"/>
+                  </a:lnTo>
+                  <a:lnTo>
+                    <a:pt x="1587994" y="292361"/>
+                  </a:lnTo>
+                  <a:lnTo>
+                    <a:pt x="1539267" y="292361"/>
+                  </a:lnTo>
+                  <a:lnTo>
+                    <a:pt x="48729" y="292361"/>
+                  </a:lnTo>
+                  <a:lnTo>
+                    <a:pt x="0" y="292361"/>
+                  </a:lnTo>
+                  <a:lnTo>
+                    <a:pt x="0" y="152400"/>
+                  </a:lnTo>
+                  <a:lnTo>
+                    <a:pt x="1" y="152400"/>
+                  </a:lnTo>
+                  <a:lnTo>
+                    <a:pt x="1" y="48728"/>
+                  </a:lnTo>
+                  <a:cubicBezTo>
+                    <a:pt x="1" y="21816"/>
+                    <a:pt x="21817" y="0"/>
+                    <a:pt x="48729" y="0"/>
+                  </a:cubicBezTo>
+                  <a:close/>
+                </a:path>
+              </a:pathLst>
+            </a:custGeom>
+            <a:solidFill>
+              <a:srgbClr val="002060"/>
+            </a:solidFill>
+            <a:ln w="9525" algn="ctr">
+              <a:solidFill>
+                <a:srgbClr val="002060"/>
+              </a:solidFill>
+              <a:miter lim="800000"/>
+              <a:headEnd/>
+              <a:tailEnd/>
+            </a:ln>
+            <a:effectLst>
+              <a:outerShdw blurRad="50800" dist="38100" dir="2700000" algn="tl" rotWithShape="0">
+                <a:prstClr val="black">
+                  <a:alpha val="40000"/>
+                </a:prstClr>
+              </a:outerShdw>
+            </a:effectLst>
+          </p:spPr>
+          <p:txBody>
+            <a:bodyPr wrap="square" lIns="72000" tIns="36000" rIns="72000" bIns="36000" anchor="ctr">
+              <a:noAutofit/>
+            </a:bodyPr>
+            <a:lstStyle/>
+            <a:p>
+              <a:pPr marR="0" lvl="0" algn="ctr" defTabSz="411163" eaLnBrk="0" fontAlgn="base" latinLnBrk="0" hangingPunct="0">
+                <a:spcBef>
+                  <a:spcPct val="0"/>
+                </a:spcBef>
+                <a:spcAft>
+                  <a:spcPct val="0"/>
+                </a:spcAft>
+                <a:buSzPct val="90000"/>
+                <a:tabLst>
+                  <a:tab pos="85725" algn="l"/>
+                </a:tabLst>
+                <a:defRPr/>
+              </a:pPr>
+              <a:r>
+                <a:rPr kumimoji="1" lang="en-US" altLang="ko-KR" sz="1200" b="1" i="0" u="none" strike="noStrike" kern="0" cap="none" spc="0" normalizeH="0" baseline="0" noProof="0" dirty="0">
+                  <a:ln>
+                    <a:noFill/>
+                  </a:ln>
+                  <a:solidFill>
+                    <a:schemeClr val="bg1"/>
+                  </a:solidFill>
+                  <a:effectLst/>
+                  <a:uLnTx/>
+                  <a:uFillTx/>
+                  <a:latin typeface="나눔고딕" panose="020B0600000101010101" charset="-127"/>
+                  <a:ea typeface="나눔고딕" panose="020B0600000101010101" charset="-127"/>
+                </a:rPr>
+                <a:t>TABLE FULL SCAN</a:t>
+              </a:r>
+            </a:p>
+          </p:txBody>
+        </p:sp>
+      </p:grpSp>
       <p:sp>
         <p:nvSpPr>
-          <p:cNvPr id="3" name="TextBox 2">
+          <p:cNvPr id="12" name="TextBox 11">
             <a:extLst>
               <a:ext uri="{FF2B5EF4-FFF2-40B4-BE49-F238E27FC236}">
-                <a16:creationId xmlns:a16="http://schemas.microsoft.com/office/drawing/2014/main" id="{43BD4B0A-C817-40FC-8794-1A803D7B2883}"/>
+                <a16:creationId xmlns:a16="http://schemas.microsoft.com/office/drawing/2014/main" id="{61A3678A-9D5F-4785-94BB-CC6DEB7638AC}"/>
               </a:ext>
             </a:extLst>
           </p:cNvPr>
@@ -18740,8 +19207,8 @@
         </p:nvSpPr>
         <p:spPr>
           <a:xfrm>
-            <a:off x="217129" y="637563"/>
-            <a:ext cx="9688871" cy="3354573"/>
+            <a:off x="363984" y="5544393"/>
+            <a:ext cx="9081973" cy="740203"/>
           </a:xfrm>
           <a:prstGeom prst="rect">
             <a:avLst/>
@@ -18762,8 +19229,89 @@
               <a:buChar char="•"/>
             </a:pPr>
             <a:r>
+              <a:rPr lang="en-US" altLang="ko-KR" sz="1500" dirty="0"/>
+              <a:t>HWM(High Water Mark, </a:t>
+            </a:r>
+            <a:r>
+              <a:rPr lang="ko-KR" altLang="en-US" sz="1500" dirty="0"/>
+              <a:t>고수위 마크</a:t>
+            </a:r>
+            <a:r>
+              <a:rPr lang="en-US" altLang="ko-KR" sz="1500" dirty="0"/>
+              <a:t>)</a:t>
+            </a:r>
+            <a:r>
+              <a:rPr lang="ko-KR" altLang="en-US" sz="1500" dirty="0"/>
+              <a:t>는 테이블에 데이터가 쓰여졌던 블록 상의 최상위 위치를 의미</a:t>
+            </a:r>
+            <a:endParaRPr lang="en-US" altLang="ko-KR" sz="1500" dirty="0"/>
+          </a:p>
+          <a:p>
+            <a:pPr marL="285750" indent="-285750">
+              <a:lnSpc>
+                <a:spcPct val="150000"/>
+              </a:lnSpc>
+              <a:buFont typeface="Arial" panose="020B0604020202020204" pitchFamily="34" charset="0"/>
+              <a:buChar char="•"/>
+            </a:pPr>
+            <a:r>
+              <a:rPr lang="en-US" altLang="ko-KR" sz="1500" dirty="0"/>
+              <a:t>HWM</a:t>
+            </a:r>
+            <a:r>
+              <a:rPr lang="ko-KR" altLang="en-US" sz="1500" dirty="0"/>
+              <a:t>까지 테이블의 모든 데이터를 읽어야 하기 때문에</a:t>
+            </a:r>
+            <a:r>
+              <a:rPr lang="en-US" altLang="ko-KR" sz="1500" dirty="0"/>
+              <a:t>, </a:t>
+            </a:r>
+            <a:r>
+              <a:rPr lang="ko-KR" altLang="en-US" sz="1500" dirty="0"/>
+              <a:t>모든 결과를 찾을 때까지 시간이 오래 걸림</a:t>
+            </a:r>
+            <a:endParaRPr lang="en-US" altLang="ko-KR" sz="1500" dirty="0"/>
+          </a:p>
+        </p:txBody>
+      </p:sp>
+      <p:sp>
+        <p:nvSpPr>
+          <p:cNvPr id="13" name="TextBox 12">
+            <a:extLst>
+              <a:ext uri="{FF2B5EF4-FFF2-40B4-BE49-F238E27FC236}">
+                <a16:creationId xmlns:a16="http://schemas.microsoft.com/office/drawing/2014/main" id="{291B8812-6E7F-4ADA-8377-5EACB7DCC78A}"/>
+              </a:ext>
+            </a:extLst>
+          </p:cNvPr>
+          <p:cNvSpPr txBox="1"/>
+          <p:nvPr/>
+        </p:nvSpPr>
+        <p:spPr>
+          <a:xfrm>
+            <a:off x="363984" y="645439"/>
+            <a:ext cx="6555705" cy="1253998"/>
+          </a:xfrm>
+          <a:prstGeom prst="rect">
+            <a:avLst/>
+          </a:prstGeom>
+          <a:noFill/>
+        </p:spPr>
+        <p:txBody>
+          <a:bodyPr wrap="none" rtlCol="0">
+            <a:spAutoFit/>
+          </a:bodyPr>
+          <a:lstStyle/>
+          <a:p>
+            <a:pPr marL="285750" indent="-285750">
+              <a:lnSpc>
+                <a:spcPct val="150000"/>
+              </a:lnSpc>
+              <a:buFont typeface="Arial" panose="020B0604020202020204" pitchFamily="34" charset="0"/>
+              <a:buChar char="•"/>
+            </a:pPr>
+            <a:r>
               <a:rPr lang="en-US" altLang="ko-KR" sz="1300" dirty="0"/>
-              <a:t>INDEX SCAN</a:t>
+              <a:t>TABLE FULL SCAN</a:t>
             </a:r>
             <a:r>
               <a:rPr lang="ko-KR" altLang="en-US" sz="1300" dirty="0"/>
@@ -18779,19 +19327,19 @@
             </a:pPr>
             <a:r>
               <a:rPr lang="en-US" altLang="ko-KR" sz="1300" dirty="0"/>
-              <a:t>     1. INDEX UNIQUE SCAN : UNIQUE INDEX</a:t>
+              <a:t>     1. </a:t>
             </a:r>
             <a:r>
               <a:rPr lang="ko-KR" altLang="en-US" sz="1300" dirty="0"/>
-              <a:t>를 이용하여</a:t>
+              <a:t>조건절의 컬럼에 </a:t>
             </a:r>
             <a:r>
               <a:rPr lang="en-US" altLang="ko-KR" sz="1300" dirty="0"/>
-              <a:t>, </a:t>
+              <a:t>INDEX</a:t>
             </a:r>
             <a:r>
               <a:rPr lang="ko-KR" altLang="en-US" sz="1300" dirty="0"/>
-              <a:t>데이터 블록에 접근</a:t>
+              <a:t>가 없는 경우</a:t>
             </a:r>
             <a:endParaRPr lang="en-US" altLang="ko-KR" sz="1300" dirty="0"/>
           </a:p>
@@ -18803,19 +19351,19 @@
             </a:pPr>
             <a:r>
               <a:rPr lang="en-US" altLang="ko-KR" sz="1300" dirty="0"/>
-              <a:t>                                       </a:t>
+              <a:t>     2. INDEX</a:t>
             </a:r>
             <a:r>
               <a:rPr lang="ko-KR" altLang="en-US" sz="1300" dirty="0"/>
-              <a:t>한 건 이하의 </a:t>
+              <a:t>가 있으나</a:t>
             </a:r>
             <a:r>
               <a:rPr lang="en-US" altLang="ko-KR" sz="1300" dirty="0"/>
-              <a:t>ROWID</a:t>
+              <a:t>, </a:t>
             </a:r>
             <a:r>
               <a:rPr lang="ko-KR" altLang="en-US" sz="1300" dirty="0"/>
-              <a:t>를 반환하는 방식</a:t>
+              <a:t>조건을 만족하는 데이터가 테이블의 많은 양을 차지하는 경우</a:t>
             </a:r>
             <a:endParaRPr lang="en-US" altLang="ko-KR" sz="1300" dirty="0"/>
           </a:p>
@@ -18827,264 +19375,182 @@
             </a:pPr>
             <a:r>
               <a:rPr lang="en-US" altLang="ko-KR" sz="1300" dirty="0"/>
-              <a:t>                                       </a:t>
-            </a:r>
-            <a:r>
-              <a:rPr lang="en-US" altLang="ko-KR" sz="1300" b="1" dirty="0">
-                <a:solidFill>
-                  <a:srgbClr val="FF0000"/>
-                </a:solidFill>
+              <a:t>     3. INDEX</a:t>
+            </a:r>
+            <a:r>
+              <a:rPr lang="ko-KR" altLang="en-US" sz="1300" dirty="0"/>
+              <a:t>가 있으나</a:t>
+            </a:r>
+            <a:r>
+              <a:rPr lang="en-US" altLang="ko-KR" sz="1300" dirty="0"/>
+              <a:t>, </a:t>
+            </a:r>
+            <a:r>
+              <a:rPr lang="ko-KR" altLang="en-US" sz="1300" dirty="0"/>
+              <a:t>테이블의 데이터가 적어 </a:t>
+            </a:r>
+            <a:r>
+              <a:rPr lang="en-US" altLang="ko-KR" sz="1300" dirty="0"/>
+              <a:t>FULL SCAN</a:t>
+            </a:r>
+            <a:r>
+              <a:rPr lang="ko-KR" altLang="en-US" sz="1300" dirty="0"/>
+              <a:t>이 유리한 경우</a:t>
+            </a:r>
+            <a:endParaRPr lang="en-US" altLang="ko-KR" sz="1300" dirty="0"/>
+          </a:p>
+        </p:txBody>
+      </p:sp>
+    </p:spTree>
+    <p:extLst>
+      <p:ext uri="{BB962C8B-B14F-4D97-AF65-F5344CB8AC3E}">
+        <p14:creationId xmlns:p14="http://schemas.microsoft.com/office/powerpoint/2010/main" val="2043914154"/>
+      </p:ext>
+    </p:extLst>
+  </p:cSld>
+  <p:clrMapOvr>
+    <a:masterClrMapping/>
+  </p:clrMapOvr>
+</p:sld>
+</file>
+
+<file path=ppt/slides/slide28.xml><?xml version="1.0" encoding="utf-8"?>
+<p:sld xmlns:a="http://schemas.openxmlformats.org/drawingml/2006/main" xmlns:r="http://schemas.openxmlformats.org/officeDocument/2006/relationships" xmlns:p="http://schemas.openxmlformats.org/presentationml/2006/main">
+  <p:cSld>
+    <p:spTree>
+      <p:nvGrpSpPr>
+        <p:cNvPr id="1" name=""/>
+        <p:cNvGrpSpPr/>
+        <p:nvPr/>
+      </p:nvGrpSpPr>
+      <p:grpSpPr>
+        <a:xfrm>
+          <a:off x="0" y="0"/>
+          <a:ext cx="0" cy="0"/>
+          <a:chOff x="0" y="0"/>
+          <a:chExt cx="0" cy="0"/>
+        </a:xfrm>
+      </p:grpSpPr>
+      <p:sp>
+        <p:nvSpPr>
+          <p:cNvPr id="47" name="텍스트 개체 틀 3">
+            <a:extLst>
+              <a:ext uri="{FF2B5EF4-FFF2-40B4-BE49-F238E27FC236}">
+                <a16:creationId xmlns:a16="http://schemas.microsoft.com/office/drawing/2014/main" id="{BD6E26C7-2547-444C-8643-2B2EEE99F2F4}"/>
+              </a:ext>
+            </a:extLst>
+          </p:cNvPr>
+          <p:cNvSpPr>
+            <a:spLocks noGrp="1"/>
+          </p:cNvSpPr>
+          <p:nvPr>
+            <p:ph type="body" sz="quarter" idx="13"/>
+          </p:nvPr>
+        </p:nvSpPr>
+        <p:spPr>
+          <a:xfrm>
+            <a:off x="6747393" y="62621"/>
+            <a:ext cx="2822735" cy="390525"/>
+          </a:xfrm>
+        </p:spPr>
+        <p:txBody>
+          <a:bodyPr/>
+          <a:lstStyle/>
+          <a:p>
+            <a:r>
+              <a:rPr lang="en-US" altLang="ko-KR" dirty="0">
+                <a:latin typeface="나눔고딕" panose="020D0604000000000000" pitchFamily="50" charset="-127"/>
+                <a:ea typeface="나눔고딕" panose="020D0604000000000000" pitchFamily="50" charset="-127"/>
               </a:rPr>
-              <a:t>UNIQUE INDEX</a:t>
-            </a:r>
-            <a:r>
-              <a:rPr lang="ko-KR" altLang="en-US" sz="1300" b="1" dirty="0">
-                <a:solidFill>
-                  <a:srgbClr val="FF0000"/>
-                </a:solidFill>
+              <a:t>Ⅱ. </a:t>
+            </a:r>
+            <a:r>
+              <a:rPr lang="ko-KR" altLang="en-US" dirty="0">
+                <a:latin typeface="나눔고딕" panose="020D0604000000000000" pitchFamily="50" charset="-127"/>
+                <a:ea typeface="나눔고딕" panose="020D0604000000000000" pitchFamily="50" charset="-127"/>
               </a:rPr>
-              <a:t>를 구성하는 모든 컬럼이 조건절에 </a:t>
-            </a:r>
-            <a:r>
-              <a:rPr lang="en-US" altLang="ko-KR" sz="1300" b="1" dirty="0">
-                <a:solidFill>
-                  <a:srgbClr val="FF0000"/>
-                </a:solidFill>
+              <a:t>실행계획</a:t>
+            </a:r>
+          </a:p>
+        </p:txBody>
+      </p:sp>
+      <p:sp>
+        <p:nvSpPr>
+          <p:cNvPr id="14" name="슬라이드 번호 개체 틀 2">
+            <a:extLst>
+              <a:ext uri="{FF2B5EF4-FFF2-40B4-BE49-F238E27FC236}">
+                <a16:creationId xmlns:a16="http://schemas.microsoft.com/office/drawing/2014/main" id="{E3626C26-BF47-4717-80D4-21BA55993E00}"/>
+              </a:ext>
+            </a:extLst>
+          </p:cNvPr>
+          <p:cNvSpPr>
+            <a:spLocks noGrp="1"/>
+          </p:cNvSpPr>
+          <p:nvPr>
+            <p:ph type="sldNum" sz="quarter" idx="12"/>
+          </p:nvPr>
+        </p:nvSpPr>
+        <p:spPr>
+          <a:xfrm>
+            <a:off x="4439346" y="6528442"/>
+            <a:ext cx="1029301" cy="276999"/>
+          </a:xfrm>
+        </p:spPr>
+        <p:txBody>
+          <a:bodyPr>
+            <a:normAutofit fontScale="92500"/>
+          </a:bodyPr>
+          <a:lstStyle/>
+          <a:p>
+            <a:fld id="{EBB166B3-33A6-45CA-B81B-F13BE7654232}" type="slidenum">
+              <a:rPr lang="ko-KR" altLang="en-US" smtClean="0">
+                <a:latin typeface="나눔고딕" panose="020B0600000101010101" charset="-127"/>
+                <a:ea typeface="나눔고딕" panose="020B0600000101010101" charset="-127"/>
               </a:rPr>
-              <a:t>‘=‘</a:t>
-            </a:r>
-            <a:r>
-              <a:rPr lang="ko-KR" altLang="en-US" sz="1300" b="1" dirty="0">
-                <a:solidFill>
-                  <a:srgbClr val="FF0000"/>
-                </a:solidFill>
-              </a:rPr>
-              <a:t>로 명시된 경우 발생</a:t>
-            </a:r>
-            <a:endParaRPr lang="en-US" altLang="ko-KR" sz="1300" b="1" dirty="0">
-              <a:solidFill>
-                <a:srgbClr val="FF0000"/>
-              </a:solidFill>
+              <a:t>27</a:t>
+            </a:fld>
+            <a:endParaRPr lang="ko-KR" altLang="en-US" dirty="0">
+              <a:latin typeface="나눔고딕" panose="020B0600000101010101" charset="-127"/>
+              <a:ea typeface="나눔고딕" panose="020B0600000101010101" charset="-127"/>
             </a:endParaRPr>
           </a:p>
+        </p:txBody>
+      </p:sp>
+      <p:sp>
+        <p:nvSpPr>
+          <p:cNvPr id="3" name="TextBox 2">
+            <a:extLst>
+              <a:ext uri="{FF2B5EF4-FFF2-40B4-BE49-F238E27FC236}">
+                <a16:creationId xmlns:a16="http://schemas.microsoft.com/office/drawing/2014/main" id="{43BD4B0A-C817-40FC-8794-1A803D7B2883}"/>
+              </a:ext>
+            </a:extLst>
+          </p:cNvPr>
+          <p:cNvSpPr txBox="1"/>
+          <p:nvPr/>
+        </p:nvSpPr>
+        <p:spPr>
+          <a:xfrm>
+            <a:off x="217129" y="637563"/>
+            <a:ext cx="473206" cy="353751"/>
+          </a:xfrm>
+          <a:prstGeom prst="rect">
+            <a:avLst/>
+          </a:prstGeom>
+          <a:noFill/>
+        </p:spPr>
+        <p:txBody>
+          <a:bodyPr wrap="none" rtlCol="0">
+            <a:spAutoFit/>
+          </a:bodyPr>
+          <a:lstStyle/>
           <a:p>
-            <a:pPr>
+            <a:pPr marL="285750" indent="-285750">
               <a:lnSpc>
                 <a:spcPct val="150000"/>
               </a:lnSpc>
+              <a:buFont typeface="Arial" panose="020B0604020202020204" pitchFamily="34" charset="0"/>
+              <a:buChar char="•"/>
             </a:pPr>
-            <a:r>
-              <a:rPr lang="en-US" altLang="ko-KR" sz="1300" dirty="0"/>
-              <a:t>     2. INDEX RANGE SCAN : INDEX</a:t>
-            </a:r>
-            <a:r>
-              <a:rPr lang="ko-KR" altLang="en-US" sz="1300" dirty="0"/>
-              <a:t>를 이용한 데이터 블록 접근 중</a:t>
-            </a:r>
-            <a:r>
-              <a:rPr lang="en-US" altLang="ko-KR" sz="1300" dirty="0"/>
-              <a:t>, </a:t>
-            </a:r>
-            <a:r>
-              <a:rPr lang="ko-KR" altLang="en-US" sz="1300" dirty="0"/>
-              <a:t>가장 일반적인 방식</a:t>
-            </a:r>
-            <a:endParaRPr lang="en-US" altLang="ko-KR" sz="1300" dirty="0"/>
-          </a:p>
-          <a:p>
-            <a:pPr>
-              <a:lnSpc>
-                <a:spcPct val="150000"/>
-              </a:lnSpc>
-            </a:pPr>
-            <a:r>
-              <a:rPr lang="en-US" altLang="ko-KR" sz="1300" dirty="0"/>
-              <a:t> 	                      INDEX</a:t>
-            </a:r>
-            <a:r>
-              <a:rPr lang="ko-KR" altLang="en-US" sz="1300" dirty="0"/>
-              <a:t>를 구성하는 선두 컬럼에 대해 범위 검색을 하는 방식</a:t>
-            </a:r>
-            <a:endParaRPr lang="en-US" altLang="ko-KR" sz="1300" dirty="0"/>
-          </a:p>
-          <a:p>
-            <a:pPr>
-              <a:lnSpc>
-                <a:spcPct val="150000"/>
-              </a:lnSpc>
-            </a:pPr>
-            <a:r>
-              <a:rPr lang="en-US" altLang="ko-KR" sz="1300" dirty="0"/>
-              <a:t>                                     </a:t>
-            </a:r>
-            <a:r>
-              <a:rPr lang="en-US" altLang="ko-KR" sz="1300" b="1" dirty="0">
-                <a:solidFill>
-                  <a:srgbClr val="FF0000"/>
-                </a:solidFill>
-              </a:rPr>
-              <a:t>INDEX</a:t>
-            </a:r>
-            <a:r>
-              <a:rPr lang="ko-KR" altLang="en-US" sz="1300" b="1" dirty="0">
-                <a:solidFill>
-                  <a:srgbClr val="FF0000"/>
-                </a:solidFill>
-              </a:rPr>
-              <a:t>를 구성하는 선두 컬럼이 조건절에 비교연산</a:t>
-            </a:r>
-            <a:r>
-              <a:rPr lang="en-US" altLang="ko-KR" sz="1300" b="1" dirty="0">
-                <a:solidFill>
-                  <a:srgbClr val="FF0000"/>
-                </a:solidFill>
-              </a:rPr>
-              <a:t>(&lt;, &gt;, BETWEEN, LIKE)</a:t>
-            </a:r>
-            <a:r>
-              <a:rPr lang="ko-KR" altLang="en-US" sz="1300" b="1" dirty="0">
-                <a:solidFill>
-                  <a:srgbClr val="FF0000"/>
-                </a:solidFill>
-              </a:rPr>
-              <a:t>되어질 때</a:t>
-            </a:r>
-            <a:r>
-              <a:rPr lang="en-US" altLang="ko-KR" sz="1300" b="1" dirty="0">
-                <a:solidFill>
-                  <a:srgbClr val="FF0000"/>
-                </a:solidFill>
-              </a:rPr>
-              <a:t>, </a:t>
-            </a:r>
-            <a:r>
-              <a:rPr lang="ko-KR" altLang="en-US" sz="1300" b="1" dirty="0">
-                <a:solidFill>
-                  <a:srgbClr val="FF0000"/>
-                </a:solidFill>
-              </a:rPr>
-              <a:t>이 방식으로</a:t>
-            </a:r>
-            <a:endParaRPr lang="en-US" altLang="ko-KR" sz="1300" b="1" dirty="0">
-              <a:solidFill>
-                <a:srgbClr val="FF0000"/>
-              </a:solidFill>
-            </a:endParaRPr>
-          </a:p>
-          <a:p>
-            <a:pPr>
-              <a:lnSpc>
-                <a:spcPct val="150000"/>
-              </a:lnSpc>
-            </a:pPr>
-            <a:r>
-              <a:rPr lang="en-US" altLang="ko-KR" sz="1300" b="1" dirty="0">
-                <a:solidFill>
-                  <a:srgbClr val="FF0000"/>
-                </a:solidFill>
-              </a:rPr>
-              <a:t>                                     </a:t>
-            </a:r>
-            <a:r>
-              <a:rPr lang="ko-KR" altLang="en-US" sz="1300" b="1" dirty="0">
-                <a:solidFill>
-                  <a:srgbClr val="FF0000"/>
-                </a:solidFill>
-              </a:rPr>
-              <a:t>처리됨</a:t>
-            </a:r>
-            <a:endParaRPr lang="en-US" altLang="ko-KR" sz="1300" b="1" dirty="0">
-              <a:solidFill>
-                <a:srgbClr val="FF0000"/>
-              </a:solidFill>
-            </a:endParaRPr>
-          </a:p>
-          <a:p>
-            <a:pPr>
-              <a:lnSpc>
-                <a:spcPct val="150000"/>
-              </a:lnSpc>
-            </a:pPr>
-            <a:r>
-              <a:rPr lang="en-US" altLang="ko-KR" sz="1300" dirty="0"/>
-              <a:t>     3. INDEX FULL SCAN    : </a:t>
-            </a:r>
-            <a:r>
-              <a:rPr lang="ko-KR" altLang="en-US" sz="1300" dirty="0"/>
-              <a:t>최적의 </a:t>
-            </a:r>
-            <a:r>
-              <a:rPr lang="en-US" altLang="ko-KR" sz="1300" dirty="0"/>
-              <a:t>INDEX</a:t>
-            </a:r>
-            <a:r>
-              <a:rPr lang="ko-KR" altLang="en-US" sz="1300" dirty="0"/>
-              <a:t>가 없을 때</a:t>
-            </a:r>
-            <a:r>
-              <a:rPr lang="en-US" altLang="ko-KR" sz="1300" dirty="0"/>
-              <a:t>, </a:t>
-            </a:r>
-            <a:r>
-              <a:rPr lang="ko-KR" altLang="en-US" sz="1300" dirty="0"/>
-              <a:t>차선으로 선택되는 방식</a:t>
-            </a:r>
-            <a:endParaRPr lang="en-US" altLang="ko-KR" sz="1300" dirty="0"/>
-          </a:p>
-          <a:p>
-            <a:pPr>
-              <a:lnSpc>
-                <a:spcPct val="150000"/>
-              </a:lnSpc>
-            </a:pPr>
-            <a:r>
-              <a:rPr lang="en-US" altLang="ko-KR" sz="1300" dirty="0"/>
-              <a:t>                                     INEDX </a:t>
-            </a:r>
-            <a:r>
-              <a:rPr lang="ko-KR" altLang="en-US" sz="1300" dirty="0"/>
-              <a:t>선두 컬럼이 조건절에 없으면</a:t>
-            </a:r>
-            <a:r>
-              <a:rPr lang="en-US" altLang="ko-KR" sz="1300" dirty="0"/>
-              <a:t> TABLE FULL SCAN</a:t>
-            </a:r>
-            <a:r>
-              <a:rPr lang="ko-KR" altLang="en-US" sz="1300" dirty="0"/>
-              <a:t>을 고려하나</a:t>
-            </a:r>
-            <a:r>
-              <a:rPr lang="en-US" altLang="ko-KR" sz="1300" dirty="0"/>
-              <a:t>, TABLE FULL SCAN</a:t>
-            </a:r>
-            <a:r>
-              <a:rPr lang="ko-KR" altLang="en-US" sz="1300" dirty="0"/>
-              <a:t>보다 </a:t>
-            </a:r>
-            <a:r>
-              <a:rPr lang="en-US" altLang="ko-KR" sz="1300" dirty="0"/>
-              <a:t>I/O</a:t>
-            </a:r>
-            <a:r>
-              <a:rPr lang="ko-KR" altLang="en-US" sz="1300" dirty="0"/>
-              <a:t>를</a:t>
-            </a:r>
-            <a:endParaRPr lang="en-US" altLang="ko-KR" sz="1300" dirty="0"/>
-          </a:p>
-          <a:p>
-            <a:pPr>
-              <a:lnSpc>
-                <a:spcPct val="150000"/>
-              </a:lnSpc>
-            </a:pPr>
-            <a:r>
-              <a:rPr lang="en-US" altLang="ko-KR" sz="1300" dirty="0"/>
-              <a:t>                                     </a:t>
-            </a:r>
-            <a:r>
-              <a:rPr lang="ko-KR" altLang="en-US" sz="1300" dirty="0"/>
-              <a:t>줄일 수 있거나 정렬된 결과를 쉽게 얻을 수 있을 경우 선택</a:t>
-            </a:r>
             <a:endParaRPr lang="en-US" altLang="ko-KR" sz="1300" dirty="0"/>
           </a:p>
         </p:txBody>
@@ -19103,8 +19569,8 @@
         </p:nvGrpSpPr>
         <p:grpSpPr>
           <a:xfrm>
-            <a:off x="1957638" y="4064390"/>
-            <a:ext cx="5990724" cy="2328097"/>
+            <a:off x="1447096" y="753189"/>
+            <a:ext cx="7011807" cy="2741852"/>
             <a:chOff x="1957638" y="4064390"/>
             <a:chExt cx="5990724" cy="2328097"/>
           </a:xfrm>
@@ -19501,10 +19967,379 @@
           </p:txBody>
         </p:sp>
       </p:grpSp>
+      <p:sp>
+        <p:nvSpPr>
+          <p:cNvPr id="16" name="제목 1">
+            <a:extLst>
+              <a:ext uri="{FF2B5EF4-FFF2-40B4-BE49-F238E27FC236}">
+                <a16:creationId xmlns:a16="http://schemas.microsoft.com/office/drawing/2014/main" id="{BDE76D3B-C372-4CA3-A4FD-33642B295B4F}"/>
+              </a:ext>
+            </a:extLst>
+          </p:cNvPr>
+          <p:cNvSpPr>
+            <a:spLocks noGrp="1"/>
+          </p:cNvSpPr>
+          <p:nvPr>
+            <p:ph type="title"/>
+          </p:nvPr>
+        </p:nvSpPr>
+        <p:spPr>
+          <a:xfrm>
+            <a:off x="363984" y="53269"/>
+            <a:ext cx="6587232" cy="408372"/>
+          </a:xfrm>
+        </p:spPr>
+        <p:txBody>
+          <a:bodyPr/>
+          <a:lstStyle/>
+          <a:p>
+            <a:r>
+              <a:rPr lang="en-US" altLang="ko-KR" dirty="0">
+                <a:latin typeface="나눔고딕" panose="020B0600000101010101" charset="-127"/>
+                <a:ea typeface="나눔고딕" panose="020B0600000101010101" charset="-127"/>
+              </a:rPr>
+              <a:t>5. INDEX SCAN </a:t>
+            </a:r>
+            <a:endParaRPr lang="ko-KR" altLang="en-US" dirty="0">
+              <a:latin typeface="나눔고딕" panose="020B0600000101010101" charset="-127"/>
+              <a:ea typeface="나눔고딕" panose="020B0600000101010101" charset="-127"/>
+            </a:endParaRPr>
+          </a:p>
+        </p:txBody>
+      </p:sp>
+      <p:sp>
+        <p:nvSpPr>
+          <p:cNvPr id="13" name="TextBox 12">
+            <a:extLst>
+              <a:ext uri="{FF2B5EF4-FFF2-40B4-BE49-F238E27FC236}">
+                <a16:creationId xmlns:a16="http://schemas.microsoft.com/office/drawing/2014/main" id="{B96F22CE-989A-4718-B72A-E7079D7F3053}"/>
+              </a:ext>
+            </a:extLst>
+          </p:cNvPr>
+          <p:cNvSpPr txBox="1"/>
+          <p:nvPr/>
+        </p:nvSpPr>
+        <p:spPr>
+          <a:xfrm>
+            <a:off x="217129" y="3558125"/>
+            <a:ext cx="8735084" cy="1854162"/>
+          </a:xfrm>
+          <a:prstGeom prst="rect">
+            <a:avLst/>
+          </a:prstGeom>
+          <a:noFill/>
+        </p:spPr>
+        <p:txBody>
+          <a:bodyPr wrap="none" rtlCol="0">
+            <a:spAutoFit/>
+          </a:bodyPr>
+          <a:lstStyle/>
+          <a:p>
+            <a:pPr marL="285750" indent="-285750">
+              <a:lnSpc>
+                <a:spcPct val="150000"/>
+              </a:lnSpc>
+              <a:buFont typeface="Arial" panose="020B0604020202020204" pitchFamily="34" charset="0"/>
+              <a:buChar char="•"/>
+            </a:pPr>
+            <a:r>
+              <a:rPr lang="en-US" altLang="ko-KR" sz="1300" dirty="0"/>
+              <a:t>INDEX</a:t>
+            </a:r>
+            <a:r>
+              <a:rPr lang="ko-KR" altLang="en-US" sz="1300" dirty="0"/>
+              <a:t>는 추가적인 쓰기 작업과 테이블의 검색 속도를 향상시키기 위한 자료구조임</a:t>
+            </a:r>
+            <a:endParaRPr lang="en-US" altLang="ko-KR" sz="1300" dirty="0"/>
+          </a:p>
+          <a:p>
+            <a:pPr marL="285750" indent="-285750">
+              <a:lnSpc>
+                <a:spcPct val="150000"/>
+              </a:lnSpc>
+              <a:buFont typeface="Arial" panose="020B0604020202020204" pitchFamily="34" charset="0"/>
+              <a:buChar char="•"/>
+            </a:pPr>
+            <a:r>
+              <a:rPr lang="ko-KR" altLang="en-US" sz="1300" dirty="0"/>
+              <a:t>우리가 책에서 원하는 내용을 찾을 때</a:t>
+            </a:r>
+            <a:r>
+              <a:rPr lang="en-US" altLang="ko-KR" sz="1300" dirty="0"/>
+              <a:t> </a:t>
+            </a:r>
+            <a:r>
+              <a:rPr lang="ko-KR" altLang="en-US" sz="1300" dirty="0"/>
+              <a:t>책의 모든 페이지를 들춰보며 해당 내용을 찾는다면</a:t>
+            </a:r>
+            <a:r>
+              <a:rPr lang="en-US" altLang="ko-KR" sz="1300" dirty="0"/>
+              <a:t>, </a:t>
+            </a:r>
+            <a:r>
+              <a:rPr lang="ko-KR" altLang="en-US" sz="1300" dirty="0"/>
+              <a:t>많은 시간이 소요됨</a:t>
+            </a:r>
+            <a:endParaRPr lang="en-US" altLang="ko-KR" sz="1300" dirty="0"/>
+          </a:p>
+          <a:p>
+            <a:pPr marL="285750" indent="-285750">
+              <a:lnSpc>
+                <a:spcPct val="150000"/>
+              </a:lnSpc>
+              <a:buFont typeface="Arial" panose="020B0604020202020204" pitchFamily="34" charset="0"/>
+              <a:buChar char="•"/>
+            </a:pPr>
+            <a:r>
+              <a:rPr lang="ko-KR" altLang="en-US" sz="1300" dirty="0"/>
+              <a:t>대신</a:t>
+            </a:r>
+            <a:r>
+              <a:rPr lang="en-US" altLang="ko-KR" sz="1300" dirty="0"/>
+              <a:t>, </a:t>
+            </a:r>
+            <a:r>
+              <a:rPr lang="ko-KR" altLang="en-US" sz="1300" dirty="0"/>
+              <a:t>책의 맨 앞 또는 맨 뒤에 존재하는 색인을 참조한다면</a:t>
+            </a:r>
+            <a:r>
+              <a:rPr lang="en-US" altLang="ko-KR" sz="1300" dirty="0"/>
+              <a:t> </a:t>
+            </a:r>
+            <a:r>
+              <a:rPr lang="ko-KR" altLang="en-US" sz="1300" dirty="0"/>
+              <a:t>원하는 내용을 빨리 찾을 수 있음</a:t>
+            </a:r>
+            <a:endParaRPr lang="en-US" altLang="ko-KR" sz="1300" dirty="0"/>
+          </a:p>
+          <a:p>
+            <a:pPr marL="285750" indent="-285750">
+              <a:lnSpc>
+                <a:spcPct val="150000"/>
+              </a:lnSpc>
+              <a:buFont typeface="Arial" panose="020B0604020202020204" pitchFamily="34" charset="0"/>
+              <a:buChar char="•"/>
+            </a:pPr>
+            <a:r>
+              <a:rPr lang="ko-KR" altLang="en-US" sz="1300" dirty="0"/>
+              <a:t>데이터베이스의 </a:t>
+            </a:r>
+            <a:r>
+              <a:rPr lang="en-US" altLang="ko-KR" sz="1300" dirty="0"/>
+              <a:t>INDEX</a:t>
+            </a:r>
+            <a:r>
+              <a:rPr lang="ko-KR" altLang="en-US" sz="1300" dirty="0"/>
+              <a:t>는 </a:t>
+            </a:r>
+            <a:r>
+              <a:rPr lang="en-US" altLang="ko-KR" sz="1300" dirty="0"/>
+              <a:t>‘</a:t>
+            </a:r>
+            <a:r>
+              <a:rPr lang="ko-KR" altLang="en-US" sz="1300" dirty="0"/>
+              <a:t>책의 색인</a:t>
+            </a:r>
+            <a:r>
+              <a:rPr lang="en-US" altLang="ko-KR" sz="1300" dirty="0"/>
+              <a:t>’</a:t>
+            </a:r>
+            <a:r>
+              <a:rPr lang="ko-KR" altLang="en-US" sz="1300" dirty="0"/>
+              <a:t>과 같은 역할을 수행함</a:t>
+            </a:r>
+            <a:endParaRPr lang="en-US" altLang="ko-KR" sz="1300" dirty="0"/>
+          </a:p>
+          <a:p>
+            <a:pPr marL="285750" indent="-285750">
+              <a:lnSpc>
+                <a:spcPct val="150000"/>
+              </a:lnSpc>
+              <a:buFont typeface="Arial" panose="020B0604020202020204" pitchFamily="34" charset="0"/>
+              <a:buChar char="•"/>
+            </a:pPr>
+            <a:r>
+              <a:rPr lang="ko-KR" altLang="en-US" sz="1300" dirty="0"/>
+              <a:t>테이블 내 특정 레코드를 조회할 때</a:t>
+            </a:r>
+            <a:r>
+              <a:rPr lang="en-US" altLang="ko-KR" sz="1300" dirty="0"/>
+              <a:t> </a:t>
+            </a:r>
+            <a:r>
+              <a:rPr lang="ko-KR" altLang="en-US" sz="1300" dirty="0"/>
+              <a:t>테이블 내 모든 레코드를 들춰본다면</a:t>
+            </a:r>
+            <a:r>
+              <a:rPr lang="en-US" altLang="ko-KR" sz="1300" dirty="0"/>
+              <a:t>, </a:t>
+            </a:r>
+            <a:r>
+              <a:rPr lang="ko-KR" altLang="en-US" sz="1300" dirty="0"/>
+              <a:t>많은 시간이 소요됨</a:t>
+            </a:r>
+            <a:endParaRPr lang="en-US" altLang="ko-KR" sz="1300" dirty="0"/>
+          </a:p>
+          <a:p>
+            <a:pPr marL="285750" indent="-285750">
+              <a:lnSpc>
+                <a:spcPct val="150000"/>
+              </a:lnSpc>
+              <a:buFont typeface="Arial" panose="020B0604020202020204" pitchFamily="34" charset="0"/>
+              <a:buChar char="•"/>
+            </a:pPr>
+            <a:r>
+              <a:rPr lang="ko-KR" altLang="en-US" sz="1300" dirty="0"/>
+              <a:t>대신</a:t>
+            </a:r>
+            <a:r>
+              <a:rPr lang="en-US" altLang="ko-KR" sz="1300" dirty="0"/>
+              <a:t>, </a:t>
+            </a:r>
+            <a:r>
+              <a:rPr lang="ko-KR" altLang="en-US" sz="1300" dirty="0"/>
+              <a:t>레코드의 주소를 포함한 </a:t>
+            </a:r>
+            <a:r>
+              <a:rPr lang="en-US" altLang="ko-KR" sz="1300" dirty="0"/>
+              <a:t>INDEX</a:t>
+            </a:r>
+            <a:r>
+              <a:rPr lang="ko-KR" altLang="en-US" sz="1300" dirty="0"/>
+              <a:t>를 참조한다면</a:t>
+            </a:r>
+            <a:r>
+              <a:rPr lang="en-US" altLang="ko-KR" sz="1300" dirty="0"/>
+              <a:t>, </a:t>
+            </a:r>
+            <a:r>
+              <a:rPr lang="ko-KR" altLang="en-US" sz="1300" dirty="0"/>
+              <a:t>특정 레코드를 빠르게 조회할 수 있음</a:t>
+            </a:r>
+            <a:endParaRPr lang="en-US" altLang="ko-KR" sz="1300" dirty="0"/>
+          </a:p>
+        </p:txBody>
+      </p:sp>
+      <p:sp>
+        <p:nvSpPr>
+          <p:cNvPr id="15" name="원호 14">
+            <a:extLst>
+              <a:ext uri="{FF2B5EF4-FFF2-40B4-BE49-F238E27FC236}">
+                <a16:creationId xmlns:a16="http://schemas.microsoft.com/office/drawing/2014/main" id="{748DAFE7-350B-4D95-8CEB-044E18609AF7}"/>
+              </a:ext>
+            </a:extLst>
+          </p:cNvPr>
+          <p:cNvSpPr/>
+          <p:nvPr/>
+        </p:nvSpPr>
+        <p:spPr>
+          <a:xfrm rot="18339133">
+            <a:off x="7812736" y="1716746"/>
+            <a:ext cx="1145535" cy="957002"/>
+          </a:xfrm>
+          <a:prstGeom prst="arc">
+            <a:avLst>
+              <a:gd name="adj1" fmla="val 17619960"/>
+              <a:gd name="adj2" fmla="val 0"/>
+            </a:avLst>
+          </a:prstGeom>
+          <a:ln>
+            <a:solidFill>
+              <a:srgbClr val="FF0000"/>
+            </a:solidFill>
+            <a:headEnd type="triangle"/>
+            <a:tailEnd type="none"/>
+          </a:ln>
+        </p:spPr>
+        <p:style>
+          <a:lnRef idx="1">
+            <a:schemeClr val="accent1"/>
+          </a:lnRef>
+          <a:fillRef idx="0">
+            <a:schemeClr val="accent1"/>
+          </a:fillRef>
+          <a:effectRef idx="0">
+            <a:schemeClr val="accent1"/>
+          </a:effectRef>
+          <a:fontRef idx="minor">
+            <a:schemeClr val="tx1"/>
+          </a:fontRef>
+        </p:style>
+        <p:txBody>
+          <a:bodyPr rtlCol="0" anchor="ctr"/>
+          <a:lstStyle/>
+          <a:p>
+            <a:pPr algn="ctr"/>
+            <a:endParaRPr lang="ko-KR" altLang="en-US"/>
+          </a:p>
+        </p:txBody>
+      </p:sp>
+      <p:sp>
+        <p:nvSpPr>
+          <p:cNvPr id="2" name="TextBox 1">
+            <a:extLst>
+              <a:ext uri="{FF2B5EF4-FFF2-40B4-BE49-F238E27FC236}">
+                <a16:creationId xmlns:a16="http://schemas.microsoft.com/office/drawing/2014/main" id="{67C3D485-0899-4627-B716-FE32F80308F9}"/>
+              </a:ext>
+            </a:extLst>
+          </p:cNvPr>
+          <p:cNvSpPr txBox="1"/>
+          <p:nvPr/>
+        </p:nvSpPr>
+        <p:spPr>
+          <a:xfrm>
+            <a:off x="8449065" y="1767002"/>
+            <a:ext cx="1404461" cy="553998"/>
+          </a:xfrm>
+          <a:prstGeom prst="rect">
+            <a:avLst/>
+          </a:prstGeom>
+          <a:noFill/>
+        </p:spPr>
+        <p:txBody>
+          <a:bodyPr wrap="square" rtlCol="0">
+            <a:spAutoFit/>
+          </a:bodyPr>
+          <a:lstStyle/>
+          <a:p>
+            <a:r>
+              <a:rPr lang="en-US" altLang="ko-KR" sz="1000" dirty="0"/>
+              <a:t>INDEX </a:t>
+            </a:r>
+            <a:r>
+              <a:rPr lang="ko-KR" altLang="en-US" sz="1000" dirty="0"/>
+              <a:t>내 </a:t>
+            </a:r>
+            <a:r>
+              <a:rPr lang="en-US" altLang="ko-KR" sz="1000" dirty="0"/>
+              <a:t>‘ROWID’</a:t>
+            </a:r>
+            <a:r>
+              <a:rPr lang="ko-KR" altLang="en-US" sz="1000" dirty="0"/>
+              <a:t>가 </a:t>
+            </a:r>
+            <a:r>
+              <a:rPr lang="en-US" altLang="ko-KR" sz="1000" dirty="0"/>
+              <a:t>‘POINTER’</a:t>
+            </a:r>
+            <a:r>
+              <a:rPr lang="ko-KR" altLang="en-US" sz="1000" dirty="0"/>
+              <a:t>역할을 </a:t>
+            </a:r>
+            <a:endParaRPr lang="en-US" altLang="ko-KR" sz="1000" dirty="0"/>
+          </a:p>
+          <a:p>
+            <a:r>
+              <a:rPr lang="ko-KR" altLang="en-US" sz="1000" dirty="0"/>
+              <a:t>수행</a:t>
+            </a:r>
+          </a:p>
+        </p:txBody>
+      </p:sp>
     </p:spTree>
     <p:extLst>
       <p:ext uri="{BB962C8B-B14F-4D97-AF65-F5344CB8AC3E}">
-        <p14:creationId xmlns:p14="http://schemas.microsoft.com/office/powerpoint/2010/main" val="4237486263"/>
+        <p14:creationId xmlns:p14="http://schemas.microsoft.com/office/powerpoint/2010/main" val="1473279457"/>
       </p:ext>
     </p:extLst>
   </p:cSld>
@@ -19514,7 +20349,1148 @@
 </p:sld>
 </file>
 
-<file path=ppt/slides/slide28.xml><?xml version="1.0" encoding="utf-8"?>
+<file path=ppt/slides/slide29.xml><?xml version="1.0" encoding="utf-8"?>
+<p:sld xmlns:a="http://schemas.openxmlformats.org/drawingml/2006/main" xmlns:r="http://schemas.openxmlformats.org/officeDocument/2006/relationships" xmlns:p="http://schemas.openxmlformats.org/presentationml/2006/main">
+  <p:cSld>
+    <p:spTree>
+      <p:nvGrpSpPr>
+        <p:cNvPr id="1" name=""/>
+        <p:cNvGrpSpPr/>
+        <p:nvPr/>
+      </p:nvGrpSpPr>
+      <p:grpSpPr>
+        <a:xfrm>
+          <a:off x="0" y="0"/>
+          <a:ext cx="0" cy="0"/>
+          <a:chOff x="0" y="0"/>
+          <a:chExt cx="0" cy="0"/>
+        </a:xfrm>
+      </p:grpSpPr>
+      <p:sp>
+        <p:nvSpPr>
+          <p:cNvPr id="47" name="텍스트 개체 틀 3">
+            <a:extLst>
+              <a:ext uri="{FF2B5EF4-FFF2-40B4-BE49-F238E27FC236}">
+                <a16:creationId xmlns:a16="http://schemas.microsoft.com/office/drawing/2014/main" id="{BD6E26C7-2547-444C-8643-2B2EEE99F2F4}"/>
+              </a:ext>
+            </a:extLst>
+          </p:cNvPr>
+          <p:cNvSpPr>
+            <a:spLocks noGrp="1"/>
+          </p:cNvSpPr>
+          <p:nvPr>
+            <p:ph type="body" sz="quarter" idx="13"/>
+          </p:nvPr>
+        </p:nvSpPr>
+        <p:spPr>
+          <a:xfrm>
+            <a:off x="6747393" y="62621"/>
+            <a:ext cx="2822735" cy="390525"/>
+          </a:xfrm>
+        </p:spPr>
+        <p:txBody>
+          <a:bodyPr/>
+          <a:lstStyle/>
+          <a:p>
+            <a:r>
+              <a:rPr lang="en-US" altLang="ko-KR" dirty="0">
+                <a:latin typeface="나눔고딕" panose="020D0604000000000000" pitchFamily="50" charset="-127"/>
+                <a:ea typeface="나눔고딕" panose="020D0604000000000000" pitchFamily="50" charset="-127"/>
+              </a:rPr>
+              <a:t>Ⅱ. </a:t>
+            </a:r>
+            <a:r>
+              <a:rPr lang="ko-KR" altLang="en-US" dirty="0">
+                <a:latin typeface="나눔고딕" panose="020D0604000000000000" pitchFamily="50" charset="-127"/>
+                <a:ea typeface="나눔고딕" panose="020D0604000000000000" pitchFamily="50" charset="-127"/>
+              </a:rPr>
+              <a:t>실행계획</a:t>
+            </a:r>
+          </a:p>
+        </p:txBody>
+      </p:sp>
+      <p:sp>
+        <p:nvSpPr>
+          <p:cNvPr id="14" name="슬라이드 번호 개체 틀 2">
+            <a:extLst>
+              <a:ext uri="{FF2B5EF4-FFF2-40B4-BE49-F238E27FC236}">
+                <a16:creationId xmlns:a16="http://schemas.microsoft.com/office/drawing/2014/main" id="{E3626C26-BF47-4717-80D4-21BA55993E00}"/>
+              </a:ext>
+            </a:extLst>
+          </p:cNvPr>
+          <p:cNvSpPr>
+            <a:spLocks noGrp="1"/>
+          </p:cNvSpPr>
+          <p:nvPr>
+            <p:ph type="sldNum" sz="quarter" idx="12"/>
+          </p:nvPr>
+        </p:nvSpPr>
+        <p:spPr>
+          <a:xfrm>
+            <a:off x="4439346" y="6528442"/>
+            <a:ext cx="1029301" cy="276999"/>
+          </a:xfrm>
+        </p:spPr>
+        <p:txBody>
+          <a:bodyPr>
+            <a:normAutofit fontScale="92500"/>
+          </a:bodyPr>
+          <a:lstStyle/>
+          <a:p>
+            <a:fld id="{EBB166B3-33A6-45CA-B81B-F13BE7654232}" type="slidenum">
+              <a:rPr lang="ko-KR" altLang="en-US" smtClean="0">
+                <a:latin typeface="나눔고딕" panose="020B0600000101010101" charset="-127"/>
+                <a:ea typeface="나눔고딕" panose="020B0600000101010101" charset="-127"/>
+              </a:rPr>
+              <a:t>28</a:t>
+            </a:fld>
+            <a:endParaRPr lang="ko-KR" altLang="en-US" dirty="0">
+              <a:latin typeface="나눔고딕" panose="020B0600000101010101" charset="-127"/>
+              <a:ea typeface="나눔고딕" panose="020B0600000101010101" charset="-127"/>
+            </a:endParaRPr>
+          </a:p>
+        </p:txBody>
+      </p:sp>
+      <p:sp>
+        <p:nvSpPr>
+          <p:cNvPr id="3" name="TextBox 2">
+            <a:extLst>
+              <a:ext uri="{FF2B5EF4-FFF2-40B4-BE49-F238E27FC236}">
+                <a16:creationId xmlns:a16="http://schemas.microsoft.com/office/drawing/2014/main" id="{43BD4B0A-C817-40FC-8794-1A803D7B2883}"/>
+              </a:ext>
+            </a:extLst>
+          </p:cNvPr>
+          <p:cNvSpPr txBox="1"/>
+          <p:nvPr/>
+        </p:nvSpPr>
+        <p:spPr>
+          <a:xfrm>
+            <a:off x="217129" y="637563"/>
+            <a:ext cx="473206" cy="353751"/>
+          </a:xfrm>
+          <a:prstGeom prst="rect">
+            <a:avLst/>
+          </a:prstGeom>
+          <a:noFill/>
+        </p:spPr>
+        <p:txBody>
+          <a:bodyPr wrap="none" rtlCol="0">
+            <a:spAutoFit/>
+          </a:bodyPr>
+          <a:lstStyle/>
+          <a:p>
+            <a:pPr marL="285750" indent="-285750">
+              <a:lnSpc>
+                <a:spcPct val="150000"/>
+              </a:lnSpc>
+              <a:buFont typeface="Arial" panose="020B0604020202020204" pitchFamily="34" charset="0"/>
+              <a:buChar char="•"/>
+            </a:pPr>
+            <a:endParaRPr lang="en-US" altLang="ko-KR" sz="1300" dirty="0"/>
+          </a:p>
+        </p:txBody>
+      </p:sp>
+      <p:sp>
+        <p:nvSpPr>
+          <p:cNvPr id="16" name="제목 1">
+            <a:extLst>
+              <a:ext uri="{FF2B5EF4-FFF2-40B4-BE49-F238E27FC236}">
+                <a16:creationId xmlns:a16="http://schemas.microsoft.com/office/drawing/2014/main" id="{BDE76D3B-C372-4CA3-A4FD-33642B295B4F}"/>
+              </a:ext>
+            </a:extLst>
+          </p:cNvPr>
+          <p:cNvSpPr>
+            <a:spLocks noGrp="1"/>
+          </p:cNvSpPr>
+          <p:nvPr>
+            <p:ph type="title"/>
+          </p:nvPr>
+        </p:nvSpPr>
+        <p:spPr>
+          <a:xfrm>
+            <a:off x="363984" y="53269"/>
+            <a:ext cx="6587232" cy="408372"/>
+          </a:xfrm>
+        </p:spPr>
+        <p:txBody>
+          <a:bodyPr/>
+          <a:lstStyle/>
+          <a:p>
+            <a:r>
+              <a:rPr lang="en-US" altLang="ko-KR" dirty="0">
+                <a:latin typeface="나눔고딕" panose="020B0600000101010101" charset="-127"/>
+                <a:ea typeface="나눔고딕" panose="020B0600000101010101" charset="-127"/>
+              </a:rPr>
+              <a:t>5. INDEX SCAN </a:t>
+            </a:r>
+            <a:endParaRPr lang="ko-KR" altLang="en-US" dirty="0">
+              <a:latin typeface="나눔고딕" panose="020B0600000101010101" charset="-127"/>
+              <a:ea typeface="나눔고딕" panose="020B0600000101010101" charset="-127"/>
+            </a:endParaRPr>
+          </a:p>
+        </p:txBody>
+      </p:sp>
+      <p:grpSp>
+        <p:nvGrpSpPr>
+          <p:cNvPr id="20" name="그룹 19">
+            <a:extLst>
+              <a:ext uri="{FF2B5EF4-FFF2-40B4-BE49-F238E27FC236}">
+                <a16:creationId xmlns:a16="http://schemas.microsoft.com/office/drawing/2014/main" id="{CF0EE886-7CB6-4BF5-9A86-29A86E355F40}"/>
+              </a:ext>
+            </a:extLst>
+          </p:cNvPr>
+          <p:cNvGrpSpPr/>
+          <p:nvPr/>
+        </p:nvGrpSpPr>
+        <p:grpSpPr>
+          <a:xfrm>
+            <a:off x="217129" y="814438"/>
+            <a:ext cx="5424038" cy="4915927"/>
+            <a:chOff x="1527178" y="894637"/>
+            <a:chExt cx="5424038" cy="3798133"/>
+          </a:xfrm>
+        </p:grpSpPr>
+        <p:sp>
+          <p:nvSpPr>
+            <p:cNvPr id="8" name="직사각형 7">
+              <a:extLst>
+                <a:ext uri="{FF2B5EF4-FFF2-40B4-BE49-F238E27FC236}">
+                  <a16:creationId xmlns:a16="http://schemas.microsoft.com/office/drawing/2014/main" id="{A93E00CC-A66B-450A-8596-8280E92C984D}"/>
+                </a:ext>
+              </a:extLst>
+            </p:cNvPr>
+            <p:cNvSpPr/>
+            <p:nvPr/>
+          </p:nvSpPr>
+          <p:spPr>
+            <a:xfrm>
+              <a:off x="1536997" y="1174009"/>
+              <a:ext cx="5414219" cy="3518761"/>
+            </a:xfrm>
+            <a:prstGeom prst="rect">
+              <a:avLst/>
+            </a:prstGeom>
+            <a:noFill/>
+          </p:spPr>
+          <p:style>
+            <a:lnRef idx="2">
+              <a:schemeClr val="accent1">
+                <a:shade val="50000"/>
+              </a:schemeClr>
+            </a:lnRef>
+            <a:fillRef idx="1">
+              <a:schemeClr val="accent1"/>
+            </a:fillRef>
+            <a:effectRef idx="0">
+              <a:schemeClr val="accent1"/>
+            </a:effectRef>
+            <a:fontRef idx="minor">
+              <a:schemeClr val="lt1"/>
+            </a:fontRef>
+          </p:style>
+          <p:txBody>
+            <a:bodyPr rtlCol="0" anchor="ctr"/>
+            <a:lstStyle/>
+            <a:p>
+              <a:pPr algn="ctr"/>
+              <a:endParaRPr lang="ko-KR" altLang="en-US">
+                <a:latin typeface="나눔고딕" panose="020B0600000101010101" charset="-127"/>
+                <a:ea typeface="나눔고딕" panose="020B0600000101010101" charset="-127"/>
+              </a:endParaRPr>
+            </a:p>
+          </p:txBody>
+        </p:sp>
+        <p:sp>
+          <p:nvSpPr>
+            <p:cNvPr id="9" name="자유형 23">
+              <a:extLst>
+                <a:ext uri="{FF2B5EF4-FFF2-40B4-BE49-F238E27FC236}">
+                  <a16:creationId xmlns:a16="http://schemas.microsoft.com/office/drawing/2014/main" id="{970EE929-A530-4385-9184-D84EFDF06EF8}"/>
+                </a:ext>
+              </a:extLst>
+            </p:cNvPr>
+            <p:cNvSpPr>
+              <a:spLocks noChangeArrowheads="1"/>
+            </p:cNvSpPr>
+            <p:nvPr/>
+          </p:nvSpPr>
+          <p:spPr bwMode="gray">
+            <a:xfrm>
+              <a:off x="1527178" y="894637"/>
+              <a:ext cx="1724304" cy="273315"/>
+            </a:xfrm>
+            <a:custGeom>
+              <a:avLst/>
+              <a:gdLst>
+                <a:gd name="connsiteX0" fmla="*/ 48729 w 1587995"/>
+                <a:gd name="connsiteY0" fmla="*/ 0 h 292361"/>
+                <a:gd name="connsiteX1" fmla="*/ 1539267 w 1587995"/>
+                <a:gd name="connsiteY1" fmla="*/ 0 h 292361"/>
+                <a:gd name="connsiteX2" fmla="*/ 1587995 w 1587995"/>
+                <a:gd name="connsiteY2" fmla="*/ 48728 h 292361"/>
+                <a:gd name="connsiteX3" fmla="*/ 1587995 w 1587995"/>
+                <a:gd name="connsiteY3" fmla="*/ 243633 h 292361"/>
+                <a:gd name="connsiteX4" fmla="*/ 1587994 w 1587995"/>
+                <a:gd name="connsiteY4" fmla="*/ 243636 h 292361"/>
+                <a:gd name="connsiteX5" fmla="*/ 1587994 w 1587995"/>
+                <a:gd name="connsiteY5" fmla="*/ 292361 h 292361"/>
+                <a:gd name="connsiteX6" fmla="*/ 1539267 w 1587995"/>
+                <a:gd name="connsiteY6" fmla="*/ 292361 h 292361"/>
+                <a:gd name="connsiteX7" fmla="*/ 48729 w 1587995"/>
+                <a:gd name="connsiteY7" fmla="*/ 292361 h 292361"/>
+                <a:gd name="connsiteX8" fmla="*/ 0 w 1587995"/>
+                <a:gd name="connsiteY8" fmla="*/ 292361 h 292361"/>
+                <a:gd name="connsiteX9" fmla="*/ 0 w 1587995"/>
+                <a:gd name="connsiteY9" fmla="*/ 152400 h 292361"/>
+                <a:gd name="connsiteX10" fmla="*/ 1 w 1587995"/>
+                <a:gd name="connsiteY10" fmla="*/ 152400 h 292361"/>
+                <a:gd name="connsiteX11" fmla="*/ 1 w 1587995"/>
+                <a:gd name="connsiteY11" fmla="*/ 48728 h 292361"/>
+                <a:gd name="connsiteX12" fmla="*/ 48729 w 1587995"/>
+                <a:gd name="connsiteY12" fmla="*/ 0 h 292361"/>
+              </a:gdLst>
+              <a:ahLst/>
+              <a:cxnLst>
+                <a:cxn ang="0">
+                  <a:pos x="connsiteX0" y="connsiteY0"/>
+                </a:cxn>
+                <a:cxn ang="0">
+                  <a:pos x="connsiteX1" y="connsiteY1"/>
+                </a:cxn>
+                <a:cxn ang="0">
+                  <a:pos x="connsiteX2" y="connsiteY2"/>
+                </a:cxn>
+                <a:cxn ang="0">
+                  <a:pos x="connsiteX3" y="connsiteY3"/>
+                </a:cxn>
+                <a:cxn ang="0">
+                  <a:pos x="connsiteX4" y="connsiteY4"/>
+                </a:cxn>
+                <a:cxn ang="0">
+                  <a:pos x="connsiteX5" y="connsiteY5"/>
+                </a:cxn>
+                <a:cxn ang="0">
+                  <a:pos x="connsiteX6" y="connsiteY6"/>
+                </a:cxn>
+                <a:cxn ang="0">
+                  <a:pos x="connsiteX7" y="connsiteY7"/>
+                </a:cxn>
+                <a:cxn ang="0">
+                  <a:pos x="connsiteX8" y="connsiteY8"/>
+                </a:cxn>
+                <a:cxn ang="0">
+                  <a:pos x="connsiteX9" y="connsiteY9"/>
+                </a:cxn>
+                <a:cxn ang="0">
+                  <a:pos x="connsiteX10" y="connsiteY10"/>
+                </a:cxn>
+                <a:cxn ang="0">
+                  <a:pos x="connsiteX11" y="connsiteY11"/>
+                </a:cxn>
+                <a:cxn ang="0">
+                  <a:pos x="connsiteX12" y="connsiteY12"/>
+                </a:cxn>
+              </a:cxnLst>
+              <a:rect l="l" t="t" r="r" b="b"/>
+              <a:pathLst>
+                <a:path w="1587995" h="292361">
+                  <a:moveTo>
+                    <a:pt x="48729" y="0"/>
+                  </a:moveTo>
+                  <a:lnTo>
+                    <a:pt x="1539267" y="0"/>
+                  </a:lnTo>
+                  <a:cubicBezTo>
+                    <a:pt x="1566179" y="0"/>
+                    <a:pt x="1587995" y="21816"/>
+                    <a:pt x="1587995" y="48728"/>
+                  </a:cubicBezTo>
+                  <a:lnTo>
+                    <a:pt x="1587995" y="243633"/>
+                  </a:lnTo>
+                  <a:lnTo>
+                    <a:pt x="1587994" y="243636"/>
+                  </a:lnTo>
+                  <a:lnTo>
+                    <a:pt x="1587994" y="292361"/>
+                  </a:lnTo>
+                  <a:lnTo>
+                    <a:pt x="1539267" y="292361"/>
+                  </a:lnTo>
+                  <a:lnTo>
+                    <a:pt x="48729" y="292361"/>
+                  </a:lnTo>
+                  <a:lnTo>
+                    <a:pt x="0" y="292361"/>
+                  </a:lnTo>
+                  <a:lnTo>
+                    <a:pt x="0" y="152400"/>
+                  </a:lnTo>
+                  <a:lnTo>
+                    <a:pt x="1" y="152400"/>
+                  </a:lnTo>
+                  <a:lnTo>
+                    <a:pt x="1" y="48728"/>
+                  </a:lnTo>
+                  <a:cubicBezTo>
+                    <a:pt x="1" y="21816"/>
+                    <a:pt x="21817" y="0"/>
+                    <a:pt x="48729" y="0"/>
+                  </a:cubicBezTo>
+                  <a:close/>
+                </a:path>
+              </a:pathLst>
+            </a:custGeom>
+            <a:solidFill>
+              <a:srgbClr val="002060"/>
+            </a:solidFill>
+            <a:ln w="9525" algn="ctr">
+              <a:solidFill>
+                <a:srgbClr val="002060"/>
+              </a:solidFill>
+              <a:miter lim="800000"/>
+              <a:headEnd/>
+              <a:tailEnd/>
+            </a:ln>
+            <a:effectLst>
+              <a:outerShdw blurRad="50800" dist="38100" dir="2700000" algn="tl" rotWithShape="0">
+                <a:prstClr val="black">
+                  <a:alpha val="40000"/>
+                </a:prstClr>
+              </a:outerShdw>
+            </a:effectLst>
+          </p:spPr>
+          <p:txBody>
+            <a:bodyPr wrap="square" lIns="72000" tIns="36000" rIns="72000" bIns="36000" anchor="ctr">
+              <a:noAutofit/>
+            </a:bodyPr>
+            <a:lstStyle/>
+            <a:p>
+              <a:pPr marR="0" lvl="0" algn="ctr" defTabSz="411163" eaLnBrk="0" fontAlgn="base" latinLnBrk="0" hangingPunct="0">
+                <a:spcBef>
+                  <a:spcPct val="0"/>
+                </a:spcBef>
+                <a:spcAft>
+                  <a:spcPct val="0"/>
+                </a:spcAft>
+                <a:buSzPct val="90000"/>
+                <a:tabLst>
+                  <a:tab pos="85725" algn="l"/>
+                </a:tabLst>
+                <a:defRPr/>
+              </a:pPr>
+              <a:r>
+                <a:rPr kumimoji="1" lang="en-US" altLang="ko-KR" sz="1200" b="1" kern="0" dirty="0">
+                  <a:solidFill>
+                    <a:schemeClr val="bg1"/>
+                  </a:solidFill>
+                  <a:latin typeface="나눔고딕" panose="020B0600000101010101" charset="-127"/>
+                  <a:ea typeface="나눔고딕" panose="020B0600000101010101" charset="-127"/>
+                </a:rPr>
+                <a:t>INDEX</a:t>
+              </a:r>
+              <a:endParaRPr kumimoji="1" lang="en-US" altLang="ko-KR" sz="1200" b="1" i="0" u="none" strike="noStrike" kern="0" cap="none" spc="0" normalizeH="0" baseline="0" noProof="0" dirty="0">
+                <a:ln>
+                  <a:noFill/>
+                </a:ln>
+                <a:solidFill>
+                  <a:schemeClr val="bg1"/>
+                </a:solidFill>
+                <a:effectLst/>
+                <a:uLnTx/>
+                <a:uFillTx/>
+                <a:latin typeface="나눔고딕" panose="020B0600000101010101" charset="-127"/>
+                <a:ea typeface="나눔고딕" panose="020B0600000101010101" charset="-127"/>
+              </a:endParaRPr>
+            </a:p>
+          </p:txBody>
+        </p:sp>
+        <p:pic>
+          <p:nvPicPr>
+            <p:cNvPr id="17" name="그림 16">
+              <a:extLst>
+                <a:ext uri="{FF2B5EF4-FFF2-40B4-BE49-F238E27FC236}">
+                  <a16:creationId xmlns:a16="http://schemas.microsoft.com/office/drawing/2014/main" id="{0F97DBCB-6605-421F-97F9-472C2111737B}"/>
+                </a:ext>
+              </a:extLst>
+            </p:cNvPr>
+            <p:cNvPicPr>
+              <a:picLocks noChangeAspect="1"/>
+            </p:cNvPicPr>
+            <p:nvPr/>
+          </p:nvPicPr>
+          <p:blipFill>
+            <a:blip r:embed="rId2"/>
+            <a:stretch>
+              <a:fillRect/>
+            </a:stretch>
+          </p:blipFill>
+          <p:spPr>
+            <a:xfrm>
+              <a:off x="1687003" y="1300995"/>
+              <a:ext cx="2152650" cy="3257550"/>
+            </a:xfrm>
+            <a:prstGeom prst="rect">
+              <a:avLst/>
+            </a:prstGeom>
+          </p:spPr>
+        </p:pic>
+        <p:pic>
+          <p:nvPicPr>
+            <p:cNvPr id="19" name="그림 18">
+              <a:extLst>
+                <a:ext uri="{FF2B5EF4-FFF2-40B4-BE49-F238E27FC236}">
+                  <a16:creationId xmlns:a16="http://schemas.microsoft.com/office/drawing/2014/main" id="{D4E51349-2E44-4ACB-9015-8B6D608C7293}"/>
+                </a:ext>
+              </a:extLst>
+            </p:cNvPr>
+            <p:cNvPicPr>
+              <a:picLocks noChangeAspect="1"/>
+            </p:cNvPicPr>
+            <p:nvPr/>
+          </p:nvPicPr>
+          <p:blipFill>
+            <a:blip r:embed="rId3"/>
+            <a:stretch>
+              <a:fillRect/>
+            </a:stretch>
+          </p:blipFill>
+          <p:spPr>
+            <a:xfrm>
+              <a:off x="3989659" y="1291470"/>
+              <a:ext cx="2800350" cy="3267075"/>
+            </a:xfrm>
+            <a:prstGeom prst="rect">
+              <a:avLst/>
+            </a:prstGeom>
+          </p:spPr>
+        </p:pic>
+      </p:grpSp>
+      <p:sp>
+        <p:nvSpPr>
+          <p:cNvPr id="22" name="TextBox 21">
+            <a:extLst>
+              <a:ext uri="{FF2B5EF4-FFF2-40B4-BE49-F238E27FC236}">
+                <a16:creationId xmlns:a16="http://schemas.microsoft.com/office/drawing/2014/main" id="{2C4FBADD-7B85-40EA-AA64-8B2ED1482AC2}"/>
+              </a:ext>
+            </a:extLst>
+          </p:cNvPr>
+          <p:cNvSpPr txBox="1"/>
+          <p:nvPr/>
+        </p:nvSpPr>
+        <p:spPr>
+          <a:xfrm>
+            <a:off x="5641167" y="1107957"/>
+            <a:ext cx="4310795" cy="3868367"/>
+          </a:xfrm>
+          <a:prstGeom prst="rect">
+            <a:avLst/>
+          </a:prstGeom>
+          <a:noFill/>
+        </p:spPr>
+        <p:txBody>
+          <a:bodyPr wrap="none" rtlCol="0">
+            <a:spAutoFit/>
+          </a:bodyPr>
+          <a:lstStyle/>
+          <a:p>
+            <a:pPr marL="171450" indent="-171450">
+              <a:lnSpc>
+                <a:spcPct val="150000"/>
+              </a:lnSpc>
+              <a:buFont typeface="Arial" panose="020B0604020202020204" pitchFamily="34" charset="0"/>
+              <a:buChar char="•"/>
+            </a:pPr>
+            <a:r>
+              <a:rPr lang="en-US" altLang="ko-KR" sz="1100" b="1" dirty="0">
+                <a:solidFill>
+                  <a:srgbClr val="FF0000"/>
+                </a:solidFill>
+              </a:rPr>
+              <a:t>INDEX</a:t>
+            </a:r>
+            <a:r>
+              <a:rPr lang="ko-KR" altLang="en-US" sz="1100" b="1" dirty="0">
+                <a:solidFill>
+                  <a:srgbClr val="FF0000"/>
+                </a:solidFill>
+              </a:rPr>
+              <a:t>는 </a:t>
+            </a:r>
+            <a:r>
+              <a:rPr lang="en-US" altLang="ko-KR" sz="1100" b="1" dirty="0">
+                <a:solidFill>
+                  <a:srgbClr val="FF0000"/>
+                </a:solidFill>
+              </a:rPr>
+              <a:t>‘INDEX</a:t>
+            </a:r>
+            <a:r>
+              <a:rPr lang="ko-KR" altLang="en-US" sz="1100" b="1" dirty="0">
+                <a:solidFill>
+                  <a:srgbClr val="FF0000"/>
+                </a:solidFill>
+              </a:rPr>
+              <a:t> </a:t>
+            </a:r>
+            <a:r>
+              <a:rPr lang="en-US" altLang="ko-KR" sz="1100" b="1" dirty="0">
+                <a:solidFill>
+                  <a:srgbClr val="FF0000"/>
+                </a:solidFill>
+              </a:rPr>
+              <a:t>KEY’</a:t>
+            </a:r>
+            <a:r>
+              <a:rPr lang="ko-KR" altLang="en-US" sz="1100" b="1" dirty="0">
+                <a:solidFill>
+                  <a:srgbClr val="FF0000"/>
+                </a:solidFill>
+              </a:rPr>
+              <a:t>로 정렬되어 있음</a:t>
+            </a:r>
+            <a:endParaRPr lang="en-US" altLang="ko-KR" sz="1100" b="1" dirty="0">
+              <a:solidFill>
+                <a:srgbClr val="FF0000"/>
+              </a:solidFill>
+            </a:endParaRPr>
+          </a:p>
+          <a:p>
+            <a:pPr marL="171450" indent="-171450">
+              <a:lnSpc>
+                <a:spcPct val="150000"/>
+              </a:lnSpc>
+              <a:buFont typeface="Arial" panose="020B0604020202020204" pitchFamily="34" charset="0"/>
+              <a:buChar char="•"/>
+            </a:pPr>
+            <a:r>
+              <a:rPr lang="ko-KR" altLang="en-US" sz="1100" b="1" dirty="0">
+                <a:solidFill>
+                  <a:srgbClr val="FF0000"/>
+                </a:solidFill>
+              </a:rPr>
+              <a:t>이에 따라 원하는 데이터를 빠르게 조회함</a:t>
+            </a:r>
+            <a:endParaRPr lang="en-US" altLang="ko-KR" sz="1100" b="1" dirty="0">
+              <a:solidFill>
+                <a:srgbClr val="FF0000"/>
+              </a:solidFill>
+            </a:endParaRPr>
+          </a:p>
+          <a:p>
+            <a:pPr marL="171450" indent="-171450">
+              <a:lnSpc>
+                <a:spcPct val="150000"/>
+              </a:lnSpc>
+              <a:buFont typeface="Arial" panose="020B0604020202020204" pitchFamily="34" charset="0"/>
+              <a:buChar char="•"/>
+            </a:pPr>
+            <a:r>
+              <a:rPr lang="en-US" altLang="ko-KR" sz="1100" dirty="0"/>
+              <a:t>INDEX</a:t>
+            </a:r>
+            <a:r>
+              <a:rPr lang="ko-KR" altLang="en-US" sz="1100" dirty="0"/>
+              <a:t>는 </a:t>
+            </a:r>
+            <a:r>
+              <a:rPr lang="en-US" altLang="ko-KR" sz="1100" dirty="0"/>
+              <a:t>INDEX KEY</a:t>
+            </a:r>
+            <a:r>
+              <a:rPr lang="ko-KR" altLang="en-US" sz="1100" dirty="0"/>
+              <a:t>를 기준으로 오름차순 및 내림차순</a:t>
+            </a:r>
+            <a:endParaRPr lang="en-US" altLang="ko-KR" sz="1100" dirty="0"/>
+          </a:p>
+          <a:p>
+            <a:pPr>
+              <a:lnSpc>
+                <a:spcPct val="150000"/>
+              </a:lnSpc>
+            </a:pPr>
+            <a:r>
+              <a:rPr lang="en-US" altLang="ko-KR" sz="1100" dirty="0"/>
+              <a:t>   </a:t>
+            </a:r>
+            <a:r>
+              <a:rPr lang="ko-KR" altLang="en-US" sz="1100" dirty="0"/>
+              <a:t>탐색이 가능함</a:t>
+            </a:r>
+            <a:endParaRPr lang="en-US" altLang="ko-KR" sz="1100" dirty="0"/>
+          </a:p>
+          <a:p>
+            <a:pPr marL="171450" indent="-171450">
+              <a:lnSpc>
+                <a:spcPct val="150000"/>
+              </a:lnSpc>
+              <a:buFont typeface="Arial" panose="020B0604020202020204" pitchFamily="34" charset="0"/>
+              <a:buChar char="•"/>
+            </a:pPr>
+            <a:r>
+              <a:rPr lang="ko-KR" altLang="en-US" sz="1100" dirty="0"/>
+              <a:t>하나의 테이블에 여러 개의 </a:t>
+            </a:r>
+            <a:r>
+              <a:rPr lang="en-US" altLang="ko-KR" sz="1100" dirty="0"/>
+              <a:t>INDEX</a:t>
+            </a:r>
+            <a:r>
+              <a:rPr lang="ko-KR" altLang="en-US" sz="1100" dirty="0"/>
+              <a:t>를 생성할 수 있음</a:t>
+            </a:r>
+            <a:endParaRPr lang="en-US" altLang="ko-KR" sz="1100" dirty="0"/>
+          </a:p>
+          <a:p>
+            <a:pPr>
+              <a:lnSpc>
+                <a:spcPct val="150000"/>
+              </a:lnSpc>
+            </a:pPr>
+            <a:endParaRPr lang="en-US" altLang="ko-KR" sz="1100" dirty="0"/>
+          </a:p>
+          <a:p>
+            <a:pPr marL="171450" indent="-171450">
+              <a:lnSpc>
+                <a:spcPct val="150000"/>
+              </a:lnSpc>
+              <a:buFont typeface="Arial" panose="020B0604020202020204" pitchFamily="34" charset="0"/>
+              <a:buChar char="•"/>
+            </a:pPr>
+            <a:r>
+              <a:rPr lang="en-US" altLang="ko-KR" sz="1100" dirty="0"/>
+              <a:t>Unique INDEX : </a:t>
+            </a:r>
+            <a:r>
+              <a:rPr lang="ko-KR" altLang="en-US" sz="1100" dirty="0"/>
+              <a:t>해당 </a:t>
+            </a:r>
+            <a:r>
+              <a:rPr lang="en-US" altLang="ko-KR" sz="1100" dirty="0"/>
+              <a:t>INDEX</a:t>
+            </a:r>
+            <a:r>
+              <a:rPr lang="ko-KR" altLang="en-US" sz="1100" dirty="0"/>
+              <a:t>에 중복된 값이 없음</a:t>
+            </a:r>
+            <a:endParaRPr lang="en-US" altLang="ko-KR" sz="1100" dirty="0"/>
+          </a:p>
+          <a:p>
+            <a:pPr>
+              <a:lnSpc>
+                <a:spcPct val="150000"/>
+              </a:lnSpc>
+            </a:pPr>
+            <a:r>
+              <a:rPr lang="en-US" altLang="ko-KR" sz="1100" dirty="0"/>
+              <a:t>                        </a:t>
+            </a:r>
+            <a:r>
+              <a:rPr lang="ko-KR" altLang="en-US" sz="1100" dirty="0"/>
+              <a:t>정의된 </a:t>
+            </a:r>
+            <a:r>
+              <a:rPr lang="en-US" altLang="ko-KR" sz="1100" dirty="0"/>
+              <a:t>PK</a:t>
+            </a:r>
+            <a:r>
+              <a:rPr lang="ko-KR" altLang="en-US" sz="1100" dirty="0"/>
+              <a:t>에 의해 자동으로 생성되는 </a:t>
+            </a:r>
+            <a:r>
+              <a:rPr lang="en-US" altLang="ko-KR" sz="1100" dirty="0"/>
+              <a:t>INDEX</a:t>
+            </a:r>
+            <a:r>
+              <a:rPr lang="ko-KR" altLang="en-US" sz="1100" dirty="0"/>
+              <a:t>는</a:t>
+            </a:r>
+            <a:endParaRPr lang="en-US" altLang="ko-KR" sz="1100" dirty="0"/>
+          </a:p>
+          <a:p>
+            <a:pPr>
+              <a:lnSpc>
+                <a:spcPct val="150000"/>
+              </a:lnSpc>
+            </a:pPr>
+            <a:r>
+              <a:rPr lang="en-US" altLang="ko-KR" sz="1100" dirty="0"/>
+              <a:t>                        Unique INDEX</a:t>
+            </a:r>
+            <a:r>
+              <a:rPr lang="ko-KR" altLang="en-US" sz="1100" dirty="0"/>
+              <a:t>임</a:t>
+            </a:r>
+            <a:endParaRPr lang="en-US" altLang="ko-KR" sz="1100" dirty="0"/>
+          </a:p>
+          <a:p>
+            <a:pPr marL="171450" indent="-171450">
+              <a:lnSpc>
+                <a:spcPct val="150000"/>
+              </a:lnSpc>
+              <a:buFont typeface="Arial" panose="020B0604020202020204" pitchFamily="34" charset="0"/>
+              <a:buChar char="•"/>
+            </a:pPr>
+            <a:r>
+              <a:rPr lang="en-US" altLang="ko-KR" sz="1100" dirty="0"/>
+              <a:t>Non Unique INDEX : </a:t>
+            </a:r>
+            <a:r>
+              <a:rPr lang="ko-KR" altLang="en-US" sz="1100" dirty="0"/>
+              <a:t>해당 </a:t>
+            </a:r>
+            <a:r>
+              <a:rPr lang="en-US" altLang="ko-KR" sz="1100" dirty="0"/>
+              <a:t>INDEX</a:t>
+            </a:r>
+            <a:r>
+              <a:rPr lang="ko-KR" altLang="en-US" sz="1100" dirty="0"/>
+              <a:t>에 중복된 값 허용</a:t>
+            </a:r>
+            <a:endParaRPr lang="en-US" altLang="ko-KR" sz="1100" dirty="0"/>
+          </a:p>
+          <a:p>
+            <a:pPr marL="171450" indent="-171450">
+              <a:lnSpc>
+                <a:spcPct val="150000"/>
+              </a:lnSpc>
+              <a:buFont typeface="Arial" panose="020B0604020202020204" pitchFamily="34" charset="0"/>
+              <a:buChar char="•"/>
+            </a:pPr>
+            <a:endParaRPr lang="en-US" altLang="ko-KR" sz="1100" dirty="0"/>
+          </a:p>
+          <a:p>
+            <a:pPr marL="171450" indent="-171450">
+              <a:lnSpc>
+                <a:spcPct val="150000"/>
+              </a:lnSpc>
+              <a:buFont typeface="Arial" panose="020B0604020202020204" pitchFamily="34" charset="0"/>
+              <a:buChar char="•"/>
+            </a:pPr>
+            <a:r>
+              <a:rPr lang="ko-KR" altLang="en-US" sz="1100" dirty="0"/>
+              <a:t>하나의 </a:t>
+            </a:r>
+            <a:r>
+              <a:rPr lang="en-US" altLang="ko-KR" sz="1100" dirty="0"/>
+              <a:t>INDEX</a:t>
+            </a:r>
+            <a:r>
+              <a:rPr lang="ko-KR" altLang="en-US" sz="1100" dirty="0"/>
+              <a:t>는 여러 개의 컬럼으로 구성될 수 있음</a:t>
+            </a:r>
+            <a:endParaRPr lang="en-US" altLang="ko-KR" sz="1100" dirty="0"/>
+          </a:p>
+          <a:p>
+            <a:pPr marL="171450" indent="-171450">
+              <a:lnSpc>
+                <a:spcPct val="150000"/>
+              </a:lnSpc>
+              <a:buFont typeface="Arial" panose="020B0604020202020204" pitchFamily="34" charset="0"/>
+              <a:buChar char="•"/>
+            </a:pPr>
+            <a:r>
+              <a:rPr lang="en-US" altLang="ko-KR" sz="1100" dirty="0"/>
+              <a:t>Single Column INDEX : </a:t>
+            </a:r>
+            <a:r>
+              <a:rPr lang="ko-KR" altLang="en-US" sz="1100" dirty="0"/>
+              <a:t>한 개의 컬럼으로 구성된 </a:t>
+            </a:r>
+            <a:r>
+              <a:rPr lang="en-US" altLang="ko-KR" sz="1100" dirty="0"/>
+              <a:t>INDEX</a:t>
+            </a:r>
+          </a:p>
+          <a:p>
+            <a:pPr marL="171450" indent="-171450">
+              <a:lnSpc>
+                <a:spcPct val="150000"/>
+              </a:lnSpc>
+              <a:buFont typeface="Arial" panose="020B0604020202020204" pitchFamily="34" charset="0"/>
+              <a:buChar char="•"/>
+            </a:pPr>
+            <a:r>
+              <a:rPr lang="en-US" altLang="ko-KR" sz="1100" dirty="0"/>
+              <a:t>Composite INDEX : </a:t>
+            </a:r>
+            <a:r>
+              <a:rPr lang="ko-KR" altLang="en-US" sz="1100" dirty="0"/>
+              <a:t>두 개 이상의 컬럼으로 구성된 </a:t>
+            </a:r>
+            <a:r>
+              <a:rPr lang="en-US" altLang="ko-KR" sz="1100" dirty="0"/>
+              <a:t>INDEX</a:t>
+            </a:r>
+          </a:p>
+          <a:p>
+            <a:pPr>
+              <a:lnSpc>
+                <a:spcPct val="150000"/>
+              </a:lnSpc>
+            </a:pPr>
+            <a:r>
+              <a:rPr lang="en-US" altLang="ko-KR" sz="1100" dirty="0"/>
+              <a:t>                             </a:t>
+            </a:r>
+            <a:r>
+              <a:rPr lang="ko-KR" altLang="en-US" sz="1100" dirty="0"/>
+              <a:t>컬럼을 지정한 순서에 따라 정렬 실시</a:t>
+            </a:r>
+            <a:endParaRPr lang="en-US" altLang="ko-KR" sz="1100" dirty="0"/>
+          </a:p>
+        </p:txBody>
+      </p:sp>
+      <p:cxnSp>
+        <p:nvCxnSpPr>
+          <p:cNvPr id="27" name="직선 연결선 26">
+            <a:extLst>
+              <a:ext uri="{FF2B5EF4-FFF2-40B4-BE49-F238E27FC236}">
+                <a16:creationId xmlns:a16="http://schemas.microsoft.com/office/drawing/2014/main" id="{EF00D81C-F021-4A24-B96C-A5116CE13955}"/>
+              </a:ext>
+            </a:extLst>
+          </p:cNvPr>
+          <p:cNvCxnSpPr>
+            <a:cxnSpLocks/>
+          </p:cNvCxnSpPr>
+          <p:nvPr/>
+        </p:nvCxnSpPr>
+        <p:spPr>
+          <a:xfrm>
+            <a:off x="845389" y="5539385"/>
+            <a:ext cx="0" cy="499106"/>
+          </a:xfrm>
+          <a:prstGeom prst="line">
+            <a:avLst/>
+          </a:prstGeom>
+          <a:ln>
+            <a:solidFill>
+              <a:srgbClr val="FF0000"/>
+            </a:solidFill>
+          </a:ln>
+        </p:spPr>
+        <p:style>
+          <a:lnRef idx="1">
+            <a:schemeClr val="accent1"/>
+          </a:lnRef>
+          <a:fillRef idx="0">
+            <a:schemeClr val="accent1"/>
+          </a:fillRef>
+          <a:effectRef idx="0">
+            <a:schemeClr val="accent1"/>
+          </a:effectRef>
+          <a:fontRef idx="minor">
+            <a:schemeClr val="tx1"/>
+          </a:fontRef>
+        </p:style>
+      </p:cxnSp>
+      <p:cxnSp>
+        <p:nvCxnSpPr>
+          <p:cNvPr id="29" name="직선 연결선 28">
+            <a:extLst>
+              <a:ext uri="{FF2B5EF4-FFF2-40B4-BE49-F238E27FC236}">
+                <a16:creationId xmlns:a16="http://schemas.microsoft.com/office/drawing/2014/main" id="{94DCB95A-2380-494B-A6A6-BE1F62C2D01C}"/>
+              </a:ext>
+            </a:extLst>
+          </p:cNvPr>
+          <p:cNvCxnSpPr>
+            <a:cxnSpLocks/>
+          </p:cNvCxnSpPr>
+          <p:nvPr/>
+        </p:nvCxnSpPr>
+        <p:spPr>
+          <a:xfrm>
+            <a:off x="1854679" y="5539385"/>
+            <a:ext cx="0" cy="499106"/>
+          </a:xfrm>
+          <a:prstGeom prst="line">
+            <a:avLst/>
+          </a:prstGeom>
+          <a:ln>
+            <a:solidFill>
+              <a:srgbClr val="FF0000"/>
+            </a:solidFill>
+          </a:ln>
+        </p:spPr>
+        <p:style>
+          <a:lnRef idx="1">
+            <a:schemeClr val="accent1"/>
+          </a:lnRef>
+          <a:fillRef idx="0">
+            <a:schemeClr val="accent1"/>
+          </a:fillRef>
+          <a:effectRef idx="0">
+            <a:schemeClr val="accent1"/>
+          </a:effectRef>
+          <a:fontRef idx="minor">
+            <a:schemeClr val="tx1"/>
+          </a:fontRef>
+        </p:style>
+      </p:cxnSp>
+      <p:cxnSp>
+        <p:nvCxnSpPr>
+          <p:cNvPr id="34" name="직선 연결선 33">
+            <a:extLst>
+              <a:ext uri="{FF2B5EF4-FFF2-40B4-BE49-F238E27FC236}">
+                <a16:creationId xmlns:a16="http://schemas.microsoft.com/office/drawing/2014/main" id="{94ECF766-4CBF-4E58-9AAC-8972A0F6ADDB}"/>
+              </a:ext>
+            </a:extLst>
+          </p:cNvPr>
+          <p:cNvCxnSpPr/>
+          <p:nvPr/>
+        </p:nvCxnSpPr>
+        <p:spPr>
+          <a:xfrm>
+            <a:off x="845389" y="6038491"/>
+            <a:ext cx="1009290" cy="0"/>
+          </a:xfrm>
+          <a:prstGeom prst="line">
+            <a:avLst/>
+          </a:prstGeom>
+          <a:ln>
+            <a:solidFill>
+              <a:srgbClr val="FF0000"/>
+            </a:solidFill>
+          </a:ln>
+        </p:spPr>
+        <p:style>
+          <a:lnRef idx="1">
+            <a:schemeClr val="accent1"/>
+          </a:lnRef>
+          <a:fillRef idx="0">
+            <a:schemeClr val="accent1"/>
+          </a:fillRef>
+          <a:effectRef idx="0">
+            <a:schemeClr val="accent1"/>
+          </a:effectRef>
+          <a:fontRef idx="minor">
+            <a:schemeClr val="tx1"/>
+          </a:fontRef>
+        </p:style>
+      </p:cxnSp>
+      <p:sp>
+        <p:nvSpPr>
+          <p:cNvPr id="36" name="원호 35">
+            <a:extLst>
+              <a:ext uri="{FF2B5EF4-FFF2-40B4-BE49-F238E27FC236}">
+                <a16:creationId xmlns:a16="http://schemas.microsoft.com/office/drawing/2014/main" id="{6DFF047C-1D38-4E27-BF64-0A0AD0817C9C}"/>
+              </a:ext>
+            </a:extLst>
+          </p:cNvPr>
+          <p:cNvSpPr/>
+          <p:nvPr/>
+        </p:nvSpPr>
+        <p:spPr>
+          <a:xfrm rot="8962677">
+            <a:off x="1515405" y="5211992"/>
+            <a:ext cx="1190443" cy="1052423"/>
+          </a:xfrm>
+          <a:prstGeom prst="arc">
+            <a:avLst/>
+          </a:prstGeom>
+          <a:ln>
+            <a:solidFill>
+              <a:srgbClr val="FF0000"/>
+            </a:solidFill>
+            <a:headEnd type="triangle"/>
+          </a:ln>
+        </p:spPr>
+        <p:style>
+          <a:lnRef idx="1">
+            <a:schemeClr val="accent1"/>
+          </a:lnRef>
+          <a:fillRef idx="0">
+            <a:schemeClr val="accent1"/>
+          </a:fillRef>
+          <a:effectRef idx="0">
+            <a:schemeClr val="accent1"/>
+          </a:effectRef>
+          <a:fontRef idx="minor">
+            <a:schemeClr val="tx1"/>
+          </a:fontRef>
+        </p:style>
+        <p:txBody>
+          <a:bodyPr rtlCol="0" anchor="ctr"/>
+          <a:lstStyle/>
+          <a:p>
+            <a:pPr algn="ctr"/>
+            <a:endParaRPr lang="ko-KR" altLang="en-US"/>
+          </a:p>
+        </p:txBody>
+      </p:sp>
+      <p:sp>
+        <p:nvSpPr>
+          <p:cNvPr id="38" name="TextBox 37">
+            <a:extLst>
+              <a:ext uri="{FF2B5EF4-FFF2-40B4-BE49-F238E27FC236}">
+                <a16:creationId xmlns:a16="http://schemas.microsoft.com/office/drawing/2014/main" id="{9EDAE029-921E-437E-B3FD-84BB65C0C649}"/>
+              </a:ext>
+            </a:extLst>
+          </p:cNvPr>
+          <p:cNvSpPr txBox="1"/>
+          <p:nvPr/>
+        </p:nvSpPr>
+        <p:spPr>
+          <a:xfrm>
+            <a:off x="2363170" y="5971857"/>
+            <a:ext cx="2506012" cy="400110"/>
+          </a:xfrm>
+          <a:prstGeom prst="rect">
+            <a:avLst/>
+          </a:prstGeom>
+          <a:noFill/>
+        </p:spPr>
+        <p:txBody>
+          <a:bodyPr wrap="square" rtlCol="0">
+            <a:spAutoFit/>
+          </a:bodyPr>
+          <a:lstStyle/>
+          <a:p>
+            <a:r>
+              <a:rPr lang="ko-KR" altLang="en-US" sz="1000" dirty="0"/>
+              <a:t>해당 </a:t>
+            </a:r>
+            <a:r>
+              <a:rPr lang="en-US" altLang="ko-KR" sz="1000" dirty="0"/>
+              <a:t>INDEX</a:t>
+            </a:r>
+            <a:r>
+              <a:rPr lang="ko-KR" altLang="en-US" sz="1000" dirty="0"/>
+              <a:t>는 두 개의 컬럼으로 구성됨</a:t>
+            </a:r>
+            <a:endParaRPr lang="en-US" altLang="ko-KR" sz="1000" dirty="0"/>
+          </a:p>
+          <a:p>
+            <a:r>
+              <a:rPr lang="en-US" altLang="ko-KR" sz="1000" dirty="0"/>
+              <a:t>INDEX KEY = (FirstName, </a:t>
+            </a:r>
+            <a:r>
+              <a:rPr lang="en-US" altLang="ko-KR" sz="1000" dirty="0" err="1"/>
+              <a:t>LastName</a:t>
+            </a:r>
+            <a:r>
+              <a:rPr lang="en-US" altLang="ko-KR" sz="1000" dirty="0"/>
+              <a:t>)</a:t>
+            </a:r>
+            <a:endParaRPr lang="ko-KR" altLang="en-US" sz="1000" dirty="0"/>
+          </a:p>
+        </p:txBody>
+      </p:sp>
+    </p:spTree>
+    <p:extLst>
+      <p:ext uri="{BB962C8B-B14F-4D97-AF65-F5344CB8AC3E}">
+        <p14:creationId xmlns:p14="http://schemas.microsoft.com/office/powerpoint/2010/main" val="470375731"/>
+      </p:ext>
+    </p:extLst>
+  </p:cSld>
+  <p:clrMapOvr>
+    <a:masterClrMapping/>
+  </p:clrMapOvr>
+</p:sld>
+</file>
+
+<file path=ppt/slides/slide3.xml><?xml version="1.0" encoding="utf-8"?>
 <p:sld xmlns:a="http://schemas.openxmlformats.org/drawingml/2006/main" xmlns:r="http://schemas.openxmlformats.org/officeDocument/2006/relationships" xmlns:p="http://schemas.openxmlformats.org/presentationml/2006/main">
   <p:cSld>
     <p:spTree>
@@ -19557,15 +21533,426 @@
                 <a:latin typeface="나눔고딕" panose="020B0600000101010101" charset="-127"/>
                 <a:ea typeface="나눔고딕" panose="020B0600000101010101" charset="-127"/>
               </a:rPr>
-              <a:t>3. SCAN OPERATION</a:t>
-            </a:r>
-            <a:endParaRPr lang="ko-KR" altLang="en-US" dirty="0">
+              <a:t>1. SUBQUERY </a:t>
+            </a:r>
+            <a:r>
+              <a:rPr lang="ko-KR" altLang="en-US" dirty="0">
+                <a:latin typeface="나눔고딕" panose="020B0600000101010101" charset="-127"/>
+                <a:ea typeface="나눔고딕" panose="020B0600000101010101" charset="-127"/>
+              </a:rPr>
+              <a:t>종류</a:t>
+            </a:r>
+          </a:p>
+        </p:txBody>
+      </p:sp>
+      <p:sp>
+        <p:nvSpPr>
+          <p:cNvPr id="3" name="슬라이드 번호 개체 틀 2">
+            <a:extLst>
+              <a:ext uri="{FF2B5EF4-FFF2-40B4-BE49-F238E27FC236}">
+                <a16:creationId xmlns:a16="http://schemas.microsoft.com/office/drawing/2014/main" id="{52605890-CC5B-48CD-9CC1-694880517276}"/>
+              </a:ext>
+            </a:extLst>
+          </p:cNvPr>
+          <p:cNvSpPr>
+            <a:spLocks noGrp="1"/>
+          </p:cNvSpPr>
+          <p:nvPr>
+            <p:ph type="sldNum" sz="quarter" idx="12"/>
+          </p:nvPr>
+        </p:nvSpPr>
+        <p:spPr/>
+        <p:txBody>
+          <a:bodyPr>
+            <a:normAutofit fontScale="92500"/>
+          </a:bodyPr>
+          <a:lstStyle/>
+          <a:p>
+            <a:fld id="{EBB166B3-33A6-45CA-B81B-F13BE7654232}" type="slidenum">
+              <a:rPr lang="ko-KR" altLang="en-US" smtClean="0">
+                <a:latin typeface="나눔고딕" panose="020B0600000101010101" charset="-127"/>
+                <a:ea typeface="나눔고딕" panose="020B0600000101010101" charset="-127"/>
+              </a:rPr>
+              <a:t>2</a:t>
+            </a:fld>
+            <a:endParaRPr lang="ko-KR" altLang="en-US">
               <a:latin typeface="나눔고딕" panose="020B0600000101010101" charset="-127"/>
               <a:ea typeface="나눔고딕" panose="020B0600000101010101" charset="-127"/>
             </a:endParaRPr>
           </a:p>
         </p:txBody>
       </p:sp>
+      <p:sp>
+        <p:nvSpPr>
+          <p:cNvPr id="47" name="텍스트 개체 틀 3">
+            <a:extLst>
+              <a:ext uri="{FF2B5EF4-FFF2-40B4-BE49-F238E27FC236}">
+                <a16:creationId xmlns:a16="http://schemas.microsoft.com/office/drawing/2014/main" id="{BD6E26C7-2547-444C-8643-2B2EEE99F2F4}"/>
+              </a:ext>
+            </a:extLst>
+          </p:cNvPr>
+          <p:cNvSpPr>
+            <a:spLocks noGrp="1"/>
+          </p:cNvSpPr>
+          <p:nvPr>
+            <p:ph type="body" sz="quarter" idx="13"/>
+          </p:nvPr>
+        </p:nvSpPr>
+        <p:spPr>
+          <a:xfrm>
+            <a:off x="6747393" y="62621"/>
+            <a:ext cx="2822735" cy="390525"/>
+          </a:xfrm>
+        </p:spPr>
+        <p:txBody>
+          <a:bodyPr/>
+          <a:lstStyle/>
+          <a:p>
+            <a:r>
+              <a:rPr lang="en-US" altLang="ko-KR" dirty="0">
+                <a:latin typeface="나눔고딕" panose="020B0600000101010101" charset="-127"/>
+                <a:ea typeface="나눔고딕" panose="020B0600000101010101" charset="-127"/>
+              </a:rPr>
+              <a:t>Ⅰ. SUBQUERY </a:t>
+            </a:r>
+            <a:r>
+              <a:rPr lang="ko-KR" altLang="en-US" dirty="0">
+                <a:latin typeface="나눔고딕" panose="020B0600000101010101" charset="-127"/>
+                <a:ea typeface="나눔고딕" panose="020B0600000101010101" charset="-127"/>
+              </a:rPr>
+              <a:t>종류와 활용</a:t>
+            </a:r>
+          </a:p>
+        </p:txBody>
+      </p:sp>
+      <p:sp>
+        <p:nvSpPr>
+          <p:cNvPr id="4" name="TextBox 3">
+            <a:extLst>
+              <a:ext uri="{FF2B5EF4-FFF2-40B4-BE49-F238E27FC236}">
+                <a16:creationId xmlns:a16="http://schemas.microsoft.com/office/drawing/2014/main" id="{AADEDC90-8739-4034-9C72-9415D8188AB0}"/>
+              </a:ext>
+            </a:extLst>
+          </p:cNvPr>
+          <p:cNvSpPr txBox="1"/>
+          <p:nvPr/>
+        </p:nvSpPr>
+        <p:spPr>
+          <a:xfrm>
+            <a:off x="363984" y="855677"/>
+            <a:ext cx="8356839" cy="1441613"/>
+          </a:xfrm>
+          <a:prstGeom prst="rect">
+            <a:avLst/>
+          </a:prstGeom>
+          <a:noFill/>
+        </p:spPr>
+        <p:txBody>
+          <a:bodyPr wrap="none" rtlCol="0">
+            <a:spAutoFit/>
+          </a:bodyPr>
+          <a:lstStyle/>
+          <a:p>
+            <a:pPr marL="285750" indent="-285750">
+              <a:lnSpc>
+                <a:spcPct val="150000"/>
+              </a:lnSpc>
+              <a:buFont typeface="Arial" panose="020B0604020202020204" pitchFamily="34" charset="0"/>
+              <a:buChar char="•"/>
+            </a:pPr>
+            <a:r>
+              <a:rPr lang="en-US" altLang="ko-KR" sz="1200" dirty="0"/>
+              <a:t>SUBQUERY(</a:t>
+            </a:r>
+            <a:r>
+              <a:rPr lang="ko-KR" altLang="en-US" sz="1200" dirty="0" err="1"/>
+              <a:t>서브쿼리</a:t>
+            </a:r>
+            <a:r>
+              <a:rPr lang="en-US" altLang="ko-KR" sz="1200" dirty="0"/>
+              <a:t>) : </a:t>
+            </a:r>
+            <a:r>
+              <a:rPr lang="ko-KR" altLang="en-US" sz="1200" dirty="0"/>
+              <a:t>하나의 </a:t>
+            </a:r>
+            <a:r>
+              <a:rPr lang="en-US" altLang="ko-KR" sz="1200" dirty="0"/>
+              <a:t>SQL </a:t>
+            </a:r>
+            <a:r>
+              <a:rPr lang="ko-KR" altLang="en-US" sz="1200" dirty="0"/>
+              <a:t>문장 내에서 괄호로 묶인 별도의 </a:t>
+            </a:r>
+            <a:r>
+              <a:rPr lang="en-US" altLang="ko-KR" sz="1200" dirty="0"/>
+              <a:t>Query Block(</a:t>
+            </a:r>
+            <a:r>
+              <a:rPr lang="ko-KR" altLang="en-US" sz="1200" dirty="0"/>
+              <a:t>쿼리 블록</a:t>
+            </a:r>
+            <a:r>
+              <a:rPr lang="en-US" altLang="ko-KR" sz="1200" dirty="0"/>
+              <a:t>)</a:t>
+            </a:r>
+          </a:p>
+          <a:p>
+            <a:pPr marL="285750" indent="-285750">
+              <a:lnSpc>
+                <a:spcPct val="150000"/>
+              </a:lnSpc>
+              <a:buFont typeface="Arial" panose="020B0604020202020204" pitchFamily="34" charset="0"/>
+              <a:buChar char="•"/>
+            </a:pPr>
+            <a:r>
+              <a:rPr lang="ko-KR" altLang="en-US" sz="1200" dirty="0" err="1"/>
+              <a:t>서브쿼리</a:t>
+            </a:r>
+            <a:r>
+              <a:rPr lang="ko-KR" altLang="en-US" sz="1200" dirty="0"/>
+              <a:t> 종류</a:t>
+            </a:r>
+            <a:endParaRPr lang="en-US" altLang="ko-KR" sz="1200" dirty="0"/>
+          </a:p>
+          <a:p>
+            <a:pPr>
+              <a:lnSpc>
+                <a:spcPct val="150000"/>
+              </a:lnSpc>
+            </a:pPr>
+            <a:r>
+              <a:rPr lang="en-US" altLang="ko-KR" sz="1200" dirty="0"/>
+              <a:t>     1. SCALAR SUBQUERY : </a:t>
+            </a:r>
+            <a:r>
+              <a:rPr lang="ko-KR" altLang="en-US" sz="1200" dirty="0"/>
+              <a:t>한 레코드당 정확히 하나의 컬럼 </a:t>
+            </a:r>
+            <a:r>
+              <a:rPr lang="ko-KR" altLang="en-US" sz="1200" dirty="0" err="1"/>
+              <a:t>값만을</a:t>
+            </a:r>
+            <a:r>
+              <a:rPr lang="ko-KR" altLang="en-US" sz="1200" dirty="0"/>
+              <a:t> 반환하기 위해</a:t>
+            </a:r>
+            <a:r>
+              <a:rPr lang="en-US" altLang="ko-KR" sz="1200" dirty="0"/>
+              <a:t>, </a:t>
+            </a:r>
+            <a:r>
+              <a:rPr lang="ko-KR" altLang="en-US" sz="1200" dirty="0"/>
+              <a:t>주로 </a:t>
+            </a:r>
+            <a:r>
+              <a:rPr lang="en-US" altLang="ko-KR" sz="1200" dirty="0"/>
+              <a:t>SELECT</a:t>
+            </a:r>
+            <a:r>
+              <a:rPr lang="ko-KR" altLang="en-US" sz="1200" dirty="0"/>
+              <a:t>절에 사용된 </a:t>
+            </a:r>
+            <a:r>
+              <a:rPr lang="ko-KR" altLang="en-US" sz="1200" dirty="0" err="1"/>
+              <a:t>서브쿼리</a:t>
+            </a:r>
+            <a:endParaRPr lang="en-US" altLang="ko-KR" sz="1200" dirty="0"/>
+          </a:p>
+          <a:p>
+            <a:pPr>
+              <a:lnSpc>
+                <a:spcPct val="150000"/>
+              </a:lnSpc>
+            </a:pPr>
+            <a:r>
+              <a:rPr lang="en-US" altLang="ko-KR" sz="1200" dirty="0"/>
+              <a:t>     2. INLINE VIEW          : FROM</a:t>
+            </a:r>
+            <a:r>
+              <a:rPr lang="ko-KR" altLang="en-US" sz="1200" dirty="0"/>
+              <a:t>절에 나타나는 </a:t>
+            </a:r>
+            <a:r>
+              <a:rPr lang="ko-KR" altLang="en-US" sz="1200" dirty="0" err="1"/>
+              <a:t>서브쿼리</a:t>
+            </a:r>
+            <a:endParaRPr lang="en-US" altLang="ko-KR" sz="1200" dirty="0"/>
+          </a:p>
+          <a:p>
+            <a:pPr>
+              <a:lnSpc>
+                <a:spcPct val="150000"/>
+              </a:lnSpc>
+            </a:pPr>
+            <a:r>
+              <a:rPr lang="en-US" altLang="ko-KR" sz="1200" dirty="0"/>
+              <a:t>     3. NESTED SUBQUERY : </a:t>
+            </a:r>
+            <a:r>
+              <a:rPr lang="ko-KR" altLang="en-US" sz="1200" dirty="0"/>
+              <a:t>결과집합을 한정하기 위해 </a:t>
+            </a:r>
+            <a:r>
+              <a:rPr lang="en-US" altLang="ko-KR" sz="1200" dirty="0"/>
+              <a:t>WHERE</a:t>
+            </a:r>
+            <a:r>
+              <a:rPr lang="ko-KR" altLang="en-US" sz="1200" dirty="0"/>
+              <a:t>절에 사용된 </a:t>
+            </a:r>
+            <a:r>
+              <a:rPr lang="ko-KR" altLang="en-US" sz="1200" dirty="0" err="1"/>
+              <a:t>서브쿼리</a:t>
+            </a:r>
+            <a:r>
+              <a:rPr lang="en-US" altLang="ko-KR" sz="1200" dirty="0"/>
+              <a:t> </a:t>
+            </a:r>
+          </a:p>
+        </p:txBody>
+      </p:sp>
+      <p:grpSp>
+        <p:nvGrpSpPr>
+          <p:cNvPr id="13" name="그룹 12">
+            <a:extLst>
+              <a:ext uri="{FF2B5EF4-FFF2-40B4-BE49-F238E27FC236}">
+                <a16:creationId xmlns:a16="http://schemas.microsoft.com/office/drawing/2014/main" id="{15D4348A-13E5-4356-9401-5115AAB051B7}"/>
+              </a:ext>
+            </a:extLst>
+          </p:cNvPr>
+          <p:cNvGrpSpPr/>
+          <p:nvPr/>
+        </p:nvGrpSpPr>
+        <p:grpSpPr>
+          <a:xfrm>
+            <a:off x="606847" y="2699821"/>
+            <a:ext cx="6419850" cy="3218633"/>
+            <a:chOff x="481012" y="2672451"/>
+            <a:chExt cx="6419850" cy="3218633"/>
+          </a:xfrm>
+        </p:grpSpPr>
+        <p:pic>
+          <p:nvPicPr>
+            <p:cNvPr id="8" name="그림 7">
+              <a:extLst>
+                <a:ext uri="{FF2B5EF4-FFF2-40B4-BE49-F238E27FC236}">
+                  <a16:creationId xmlns:a16="http://schemas.microsoft.com/office/drawing/2014/main" id="{802A8635-5B4A-451C-A384-D99B63ED2245}"/>
+                </a:ext>
+              </a:extLst>
+            </p:cNvPr>
+            <p:cNvPicPr>
+              <a:picLocks noChangeAspect="1"/>
+            </p:cNvPicPr>
+            <p:nvPr/>
+          </p:nvPicPr>
+          <p:blipFill>
+            <a:blip r:embed="rId2"/>
+            <a:stretch>
+              <a:fillRect/>
+            </a:stretch>
+          </p:blipFill>
+          <p:spPr>
+            <a:xfrm>
+              <a:off x="481012" y="2672451"/>
+              <a:ext cx="6353175" cy="885825"/>
+            </a:xfrm>
+            <a:prstGeom prst="rect">
+              <a:avLst/>
+            </a:prstGeom>
+          </p:spPr>
+        </p:pic>
+        <p:pic>
+          <p:nvPicPr>
+            <p:cNvPr id="10" name="그림 9">
+              <a:extLst>
+                <a:ext uri="{FF2B5EF4-FFF2-40B4-BE49-F238E27FC236}">
+                  <a16:creationId xmlns:a16="http://schemas.microsoft.com/office/drawing/2014/main" id="{4B15A1DF-909F-4835-BAEC-EF472779AFA1}"/>
+                </a:ext>
+              </a:extLst>
+            </p:cNvPr>
+            <p:cNvPicPr>
+              <a:picLocks noChangeAspect="1"/>
+            </p:cNvPicPr>
+            <p:nvPr/>
+          </p:nvPicPr>
+          <p:blipFill>
+            <a:blip r:embed="rId3"/>
+            <a:stretch>
+              <a:fillRect/>
+            </a:stretch>
+          </p:blipFill>
+          <p:spPr>
+            <a:xfrm>
+              <a:off x="481012" y="3876955"/>
+              <a:ext cx="6419850" cy="800100"/>
+            </a:xfrm>
+            <a:prstGeom prst="rect">
+              <a:avLst/>
+            </a:prstGeom>
+          </p:spPr>
+        </p:pic>
+        <p:pic>
+          <p:nvPicPr>
+            <p:cNvPr id="12" name="그림 11">
+              <a:extLst>
+                <a:ext uri="{FF2B5EF4-FFF2-40B4-BE49-F238E27FC236}">
+                  <a16:creationId xmlns:a16="http://schemas.microsoft.com/office/drawing/2014/main" id="{8678A0D3-98F3-4E09-9B16-8F5E56A6FE21}"/>
+                </a:ext>
+              </a:extLst>
+            </p:cNvPr>
+            <p:cNvPicPr>
+              <a:picLocks noChangeAspect="1"/>
+            </p:cNvPicPr>
+            <p:nvPr/>
+          </p:nvPicPr>
+          <p:blipFill>
+            <a:blip r:embed="rId4"/>
+            <a:stretch>
+              <a:fillRect/>
+            </a:stretch>
+          </p:blipFill>
+          <p:spPr>
+            <a:xfrm>
+              <a:off x="547687" y="4995734"/>
+              <a:ext cx="6286500" cy="895350"/>
+            </a:xfrm>
+            <a:prstGeom prst="rect">
+              <a:avLst/>
+            </a:prstGeom>
+          </p:spPr>
+        </p:pic>
+      </p:grpSp>
+    </p:spTree>
+    <p:extLst>
+      <p:ext uri="{BB962C8B-B14F-4D97-AF65-F5344CB8AC3E}">
+        <p14:creationId xmlns:p14="http://schemas.microsoft.com/office/powerpoint/2010/main" val="2328535874"/>
+      </p:ext>
+    </p:extLst>
+  </p:cSld>
+  <p:clrMapOvr>
+    <a:masterClrMapping/>
+  </p:clrMapOvr>
+</p:sld>
+</file>
+
+<file path=ppt/slides/slide30.xml><?xml version="1.0" encoding="utf-8"?>
+<p:sld xmlns:a="http://schemas.openxmlformats.org/drawingml/2006/main" xmlns:r="http://schemas.openxmlformats.org/officeDocument/2006/relationships" xmlns:p="http://schemas.openxmlformats.org/presentationml/2006/main">
+  <p:cSld>
+    <p:spTree>
+      <p:nvGrpSpPr>
+        <p:cNvPr id="1" name=""/>
+        <p:cNvGrpSpPr/>
+        <p:nvPr/>
+      </p:nvGrpSpPr>
+      <p:grpSpPr>
+        <a:xfrm>
+          <a:off x="0" y="0"/>
+          <a:ext cx="0" cy="0"/>
+          <a:chOff x="0" y="0"/>
+          <a:chExt cx="0" cy="0"/>
+        </a:xfrm>
+      </p:grpSpPr>
       <p:sp>
         <p:nvSpPr>
           <p:cNvPr id="47" name="텍스트 개체 틀 3">
@@ -19642,7 +22029,7 @@
                 <a:latin typeface="나눔고딕" panose="020B0600000101010101" charset="-127"/>
                 <a:ea typeface="나눔고딕" panose="020B0600000101010101" charset="-127"/>
               </a:rPr>
-              <a:t>27</a:t>
+              <a:t>29</a:t>
             </a:fld>
             <a:endParaRPr lang="ko-KR" altLang="en-US" dirty="0">
               <a:latin typeface="나눔고딕" panose="020B0600000101010101" charset="-127"/>
@@ -19651,40 +22038,437 @@
           </a:p>
         </p:txBody>
       </p:sp>
-      <p:pic>
-        <p:nvPicPr>
-          <p:cNvPr id="11" name="그림 10">
+      <p:sp>
+        <p:nvSpPr>
+          <p:cNvPr id="3" name="TextBox 2">
             <a:extLst>
               <a:ext uri="{FF2B5EF4-FFF2-40B4-BE49-F238E27FC236}">
-                <a16:creationId xmlns:a16="http://schemas.microsoft.com/office/drawing/2014/main" id="{CF5729D9-F261-412E-B38F-AF76D06E0E5A}"/>
+                <a16:creationId xmlns:a16="http://schemas.microsoft.com/office/drawing/2014/main" id="{43BD4B0A-C817-40FC-8794-1A803D7B2883}"/>
               </a:ext>
             </a:extLst>
           </p:cNvPr>
-          <p:cNvPicPr>
-            <a:picLocks noChangeAspect="1"/>
-          </p:cNvPicPr>
+          <p:cNvSpPr txBox="1"/>
           <p:nvPr/>
-        </p:nvPicPr>
-        <p:blipFill>
-          <a:blip r:embed="rId2"/>
-          <a:stretch>
-            <a:fillRect/>
-          </a:stretch>
-        </p:blipFill>
+        </p:nvSpPr>
         <p:spPr>
           <a:xfrm>
-            <a:off x="1524000" y="852181"/>
-            <a:ext cx="6858000" cy="3962400"/>
+            <a:off x="217129" y="861850"/>
+            <a:ext cx="9688871" cy="3354573"/>
           </a:xfrm>
           <a:prstGeom prst="rect">
             <a:avLst/>
           </a:prstGeom>
+          <a:noFill/>
         </p:spPr>
-      </p:pic>
+        <p:txBody>
+          <a:bodyPr wrap="none" rtlCol="0">
+            <a:spAutoFit/>
+          </a:bodyPr>
+          <a:lstStyle/>
+          <a:p>
+            <a:pPr marL="285750" indent="-285750">
+              <a:lnSpc>
+                <a:spcPct val="150000"/>
+              </a:lnSpc>
+              <a:buFont typeface="Arial" panose="020B0604020202020204" pitchFamily="34" charset="0"/>
+              <a:buChar char="•"/>
+            </a:pPr>
+            <a:r>
+              <a:rPr lang="en-US" altLang="ko-KR" sz="1300" dirty="0"/>
+              <a:t>INDEX SCAN</a:t>
+            </a:r>
+            <a:r>
+              <a:rPr lang="ko-KR" altLang="en-US" sz="1300" dirty="0"/>
+              <a:t>을 선택하는 경우</a:t>
+            </a:r>
+            <a:endParaRPr lang="en-US" altLang="ko-KR" sz="1300" dirty="0"/>
+          </a:p>
+          <a:p>
+            <a:pPr>
+              <a:lnSpc>
+                <a:spcPct val="150000"/>
+              </a:lnSpc>
+            </a:pPr>
+            <a:r>
+              <a:rPr lang="en-US" altLang="ko-KR" sz="1300" dirty="0"/>
+              <a:t>     1. INDEX UNIQUE SCAN : UNIQUE INDEX</a:t>
+            </a:r>
+            <a:r>
+              <a:rPr lang="ko-KR" altLang="en-US" sz="1300" dirty="0"/>
+              <a:t>를 이용하여</a:t>
+            </a:r>
+            <a:r>
+              <a:rPr lang="en-US" altLang="ko-KR" sz="1300" dirty="0"/>
+              <a:t>, </a:t>
+            </a:r>
+            <a:r>
+              <a:rPr lang="ko-KR" altLang="en-US" sz="1300" dirty="0"/>
+              <a:t>데이터 블록에 접근</a:t>
+            </a:r>
+            <a:endParaRPr lang="en-US" altLang="ko-KR" sz="1300" dirty="0"/>
+          </a:p>
+          <a:p>
+            <a:pPr>
+              <a:lnSpc>
+                <a:spcPct val="150000"/>
+              </a:lnSpc>
+            </a:pPr>
+            <a:r>
+              <a:rPr lang="en-US" altLang="ko-KR" sz="1300" dirty="0"/>
+              <a:t>                                       </a:t>
+            </a:r>
+            <a:r>
+              <a:rPr lang="ko-KR" altLang="en-US" sz="1300" dirty="0"/>
+              <a:t>한 건 이하의 </a:t>
+            </a:r>
+            <a:r>
+              <a:rPr lang="en-US" altLang="ko-KR" sz="1300" dirty="0"/>
+              <a:t>ROWID</a:t>
+            </a:r>
+            <a:r>
+              <a:rPr lang="ko-KR" altLang="en-US" sz="1300" dirty="0"/>
+              <a:t>를 반환하는 방식</a:t>
+            </a:r>
+            <a:endParaRPr lang="en-US" altLang="ko-KR" sz="1300" dirty="0"/>
+          </a:p>
+          <a:p>
+            <a:pPr>
+              <a:lnSpc>
+                <a:spcPct val="150000"/>
+              </a:lnSpc>
+            </a:pPr>
+            <a:r>
+              <a:rPr lang="en-US" altLang="ko-KR" sz="1300" dirty="0"/>
+              <a:t>                                       </a:t>
+            </a:r>
+            <a:r>
+              <a:rPr lang="en-US" altLang="ko-KR" sz="1300" b="1" dirty="0">
+                <a:solidFill>
+                  <a:srgbClr val="FF0000"/>
+                </a:solidFill>
+              </a:rPr>
+              <a:t>UNIQUE INDEX</a:t>
+            </a:r>
+            <a:r>
+              <a:rPr lang="ko-KR" altLang="en-US" sz="1300" b="1" dirty="0">
+                <a:solidFill>
+                  <a:srgbClr val="FF0000"/>
+                </a:solidFill>
+              </a:rPr>
+              <a:t>를 구성하는 모든 컬럼이 조건절에 </a:t>
+            </a:r>
+            <a:r>
+              <a:rPr lang="en-US" altLang="ko-KR" sz="1300" b="1" dirty="0">
+                <a:solidFill>
+                  <a:srgbClr val="FF0000"/>
+                </a:solidFill>
+              </a:rPr>
+              <a:t>‘=‘</a:t>
+            </a:r>
+            <a:r>
+              <a:rPr lang="ko-KR" altLang="en-US" sz="1300" b="1" dirty="0">
+                <a:solidFill>
+                  <a:srgbClr val="FF0000"/>
+                </a:solidFill>
+              </a:rPr>
+              <a:t>로 명시된 경우 발생</a:t>
+            </a:r>
+            <a:endParaRPr lang="en-US" altLang="ko-KR" sz="1300" b="1" dirty="0">
+              <a:solidFill>
+                <a:srgbClr val="FF0000"/>
+              </a:solidFill>
+            </a:endParaRPr>
+          </a:p>
+          <a:p>
+            <a:pPr>
+              <a:lnSpc>
+                <a:spcPct val="150000"/>
+              </a:lnSpc>
+            </a:pPr>
+            <a:r>
+              <a:rPr lang="en-US" altLang="ko-KR" sz="1300" dirty="0"/>
+              <a:t>     2. INDEX RANGE SCAN : INDEX</a:t>
+            </a:r>
+            <a:r>
+              <a:rPr lang="ko-KR" altLang="en-US" sz="1300" dirty="0"/>
+              <a:t>를 이용한 데이터 블록 접근 중</a:t>
+            </a:r>
+            <a:r>
+              <a:rPr lang="en-US" altLang="ko-KR" sz="1300" dirty="0"/>
+              <a:t>, </a:t>
+            </a:r>
+            <a:r>
+              <a:rPr lang="ko-KR" altLang="en-US" sz="1300" dirty="0"/>
+              <a:t>가장 일반적인 방식</a:t>
+            </a:r>
+            <a:endParaRPr lang="en-US" altLang="ko-KR" sz="1300" dirty="0"/>
+          </a:p>
+          <a:p>
+            <a:pPr>
+              <a:lnSpc>
+                <a:spcPct val="150000"/>
+              </a:lnSpc>
+            </a:pPr>
+            <a:r>
+              <a:rPr lang="en-US" altLang="ko-KR" sz="1300" dirty="0"/>
+              <a:t> 	                      INDEX</a:t>
+            </a:r>
+            <a:r>
+              <a:rPr lang="ko-KR" altLang="en-US" sz="1300" dirty="0"/>
+              <a:t>를 구성하는 선두 컬럼에 대해 범위 검색을 하는 방식</a:t>
+            </a:r>
+            <a:endParaRPr lang="en-US" altLang="ko-KR" sz="1300" dirty="0"/>
+          </a:p>
+          <a:p>
+            <a:pPr>
+              <a:lnSpc>
+                <a:spcPct val="150000"/>
+              </a:lnSpc>
+            </a:pPr>
+            <a:r>
+              <a:rPr lang="en-US" altLang="ko-KR" sz="1300" dirty="0"/>
+              <a:t>                                     </a:t>
+            </a:r>
+            <a:r>
+              <a:rPr lang="en-US" altLang="ko-KR" sz="1300" b="1" dirty="0">
+                <a:solidFill>
+                  <a:srgbClr val="FF0000"/>
+                </a:solidFill>
+              </a:rPr>
+              <a:t>INDEX</a:t>
+            </a:r>
+            <a:r>
+              <a:rPr lang="ko-KR" altLang="en-US" sz="1300" b="1" dirty="0">
+                <a:solidFill>
+                  <a:srgbClr val="FF0000"/>
+                </a:solidFill>
+              </a:rPr>
+              <a:t>를 구성하는 선두 컬럼이 조건절에 비교연산</a:t>
+            </a:r>
+            <a:r>
+              <a:rPr lang="en-US" altLang="ko-KR" sz="1300" b="1" dirty="0">
+                <a:solidFill>
+                  <a:srgbClr val="FF0000"/>
+                </a:solidFill>
+              </a:rPr>
+              <a:t>(&lt;, &gt;, BETWEEN, LIKE)</a:t>
+            </a:r>
+            <a:r>
+              <a:rPr lang="ko-KR" altLang="en-US" sz="1300" b="1" dirty="0">
+                <a:solidFill>
+                  <a:srgbClr val="FF0000"/>
+                </a:solidFill>
+              </a:rPr>
+              <a:t>되어질 때</a:t>
+            </a:r>
+            <a:r>
+              <a:rPr lang="en-US" altLang="ko-KR" sz="1300" b="1" dirty="0">
+                <a:solidFill>
+                  <a:srgbClr val="FF0000"/>
+                </a:solidFill>
+              </a:rPr>
+              <a:t>, </a:t>
+            </a:r>
+            <a:r>
+              <a:rPr lang="ko-KR" altLang="en-US" sz="1300" b="1" dirty="0">
+                <a:solidFill>
+                  <a:srgbClr val="FF0000"/>
+                </a:solidFill>
+              </a:rPr>
+              <a:t>이 방식으로</a:t>
+            </a:r>
+            <a:endParaRPr lang="en-US" altLang="ko-KR" sz="1300" b="1" dirty="0">
+              <a:solidFill>
+                <a:srgbClr val="FF0000"/>
+              </a:solidFill>
+            </a:endParaRPr>
+          </a:p>
+          <a:p>
+            <a:pPr>
+              <a:lnSpc>
+                <a:spcPct val="150000"/>
+              </a:lnSpc>
+            </a:pPr>
+            <a:r>
+              <a:rPr lang="en-US" altLang="ko-KR" sz="1300" b="1" dirty="0">
+                <a:solidFill>
+                  <a:srgbClr val="FF0000"/>
+                </a:solidFill>
+              </a:rPr>
+              <a:t>                                     </a:t>
+            </a:r>
+            <a:r>
+              <a:rPr lang="ko-KR" altLang="en-US" sz="1300" b="1" dirty="0">
+                <a:solidFill>
+                  <a:srgbClr val="FF0000"/>
+                </a:solidFill>
+              </a:rPr>
+              <a:t>처리됨</a:t>
+            </a:r>
+            <a:endParaRPr lang="en-US" altLang="ko-KR" sz="1300" b="1" dirty="0">
+              <a:solidFill>
+                <a:srgbClr val="FF0000"/>
+              </a:solidFill>
+            </a:endParaRPr>
+          </a:p>
+          <a:p>
+            <a:pPr>
+              <a:lnSpc>
+                <a:spcPct val="150000"/>
+              </a:lnSpc>
+            </a:pPr>
+            <a:r>
+              <a:rPr lang="en-US" altLang="ko-KR" sz="1300" dirty="0"/>
+              <a:t>     3. INDEX FULL SCAN    : </a:t>
+            </a:r>
+            <a:r>
+              <a:rPr lang="ko-KR" altLang="en-US" sz="1300" dirty="0"/>
+              <a:t>최적의 </a:t>
+            </a:r>
+            <a:r>
+              <a:rPr lang="en-US" altLang="ko-KR" sz="1300" dirty="0"/>
+              <a:t>INDEX</a:t>
+            </a:r>
+            <a:r>
+              <a:rPr lang="ko-KR" altLang="en-US" sz="1300" dirty="0"/>
+              <a:t>가 없을 때</a:t>
+            </a:r>
+            <a:r>
+              <a:rPr lang="en-US" altLang="ko-KR" sz="1300" dirty="0"/>
+              <a:t>, </a:t>
+            </a:r>
+            <a:r>
+              <a:rPr lang="ko-KR" altLang="en-US" sz="1300" dirty="0"/>
+              <a:t>차선으로 선택되는 방식</a:t>
+            </a:r>
+            <a:endParaRPr lang="en-US" altLang="ko-KR" sz="1300" dirty="0"/>
+          </a:p>
+          <a:p>
+            <a:pPr>
+              <a:lnSpc>
+                <a:spcPct val="150000"/>
+              </a:lnSpc>
+            </a:pPr>
+            <a:r>
+              <a:rPr lang="en-US" altLang="ko-KR" sz="1300" dirty="0"/>
+              <a:t>                                     </a:t>
+            </a:r>
+            <a:r>
+              <a:rPr lang="en-US" altLang="ko-KR" sz="1300" b="1" dirty="0">
+                <a:solidFill>
+                  <a:srgbClr val="FF0000"/>
+                </a:solidFill>
+              </a:rPr>
+              <a:t>INEDX </a:t>
+            </a:r>
+            <a:r>
+              <a:rPr lang="ko-KR" altLang="en-US" sz="1300" b="1" dirty="0">
+                <a:solidFill>
+                  <a:srgbClr val="FF0000"/>
+                </a:solidFill>
+              </a:rPr>
+              <a:t>선두 컬럼이 조건절에 없으면</a:t>
+            </a:r>
+            <a:r>
+              <a:rPr lang="en-US" altLang="ko-KR" sz="1300" b="1" dirty="0">
+                <a:solidFill>
+                  <a:srgbClr val="FF0000"/>
+                </a:solidFill>
+              </a:rPr>
+              <a:t> TABLE FULL SCAN</a:t>
+            </a:r>
+            <a:r>
+              <a:rPr lang="ko-KR" altLang="en-US" sz="1300" b="1" dirty="0">
+                <a:solidFill>
+                  <a:srgbClr val="FF0000"/>
+                </a:solidFill>
+              </a:rPr>
+              <a:t>을 고려</a:t>
+            </a:r>
+            <a:r>
+              <a:rPr lang="ko-KR" altLang="en-US" sz="1300" dirty="0"/>
+              <a:t>하나</a:t>
+            </a:r>
+            <a:r>
+              <a:rPr lang="en-US" altLang="ko-KR" sz="1300" dirty="0"/>
+              <a:t>, TABLE FULL SCAN</a:t>
+            </a:r>
+            <a:r>
+              <a:rPr lang="ko-KR" altLang="en-US" sz="1300" dirty="0"/>
+              <a:t>보다 </a:t>
+            </a:r>
+            <a:r>
+              <a:rPr lang="en-US" altLang="ko-KR" sz="1300" dirty="0"/>
+              <a:t>I/O</a:t>
+            </a:r>
+            <a:r>
+              <a:rPr lang="ko-KR" altLang="en-US" sz="1300" dirty="0"/>
+              <a:t>를</a:t>
+            </a:r>
+            <a:endParaRPr lang="en-US" altLang="ko-KR" sz="1300" dirty="0"/>
+          </a:p>
+          <a:p>
+            <a:pPr>
+              <a:lnSpc>
+                <a:spcPct val="150000"/>
+              </a:lnSpc>
+            </a:pPr>
+            <a:r>
+              <a:rPr lang="en-US" altLang="ko-KR" sz="1300" dirty="0"/>
+              <a:t>                                     </a:t>
+            </a:r>
+            <a:r>
+              <a:rPr lang="ko-KR" altLang="en-US" sz="1300" dirty="0"/>
+              <a:t>줄일 수 있거나 정렬된 결과를 쉽게 얻을 수 있을 경우 선택</a:t>
+            </a:r>
+            <a:endParaRPr lang="en-US" altLang="ko-KR" sz="1300" dirty="0"/>
+          </a:p>
+        </p:txBody>
+      </p:sp>
+      <p:sp>
+        <p:nvSpPr>
+          <p:cNvPr id="16" name="제목 1">
+            <a:extLst>
+              <a:ext uri="{FF2B5EF4-FFF2-40B4-BE49-F238E27FC236}">
+                <a16:creationId xmlns:a16="http://schemas.microsoft.com/office/drawing/2014/main" id="{BDE76D3B-C372-4CA3-A4FD-33642B295B4F}"/>
+              </a:ext>
+            </a:extLst>
+          </p:cNvPr>
+          <p:cNvSpPr>
+            <a:spLocks noGrp="1"/>
+          </p:cNvSpPr>
+          <p:nvPr>
+            <p:ph type="title"/>
+          </p:nvPr>
+        </p:nvSpPr>
+        <p:spPr>
+          <a:xfrm>
+            <a:off x="363984" y="53269"/>
+            <a:ext cx="6587232" cy="408372"/>
+          </a:xfrm>
+        </p:spPr>
+        <p:txBody>
+          <a:bodyPr/>
+          <a:lstStyle/>
+          <a:p>
+            <a:r>
+              <a:rPr lang="en-US" altLang="ko-KR" dirty="0">
+                <a:latin typeface="나눔고딕" panose="020B0600000101010101" charset="-127"/>
+                <a:ea typeface="나눔고딕" panose="020B0600000101010101" charset="-127"/>
+              </a:rPr>
+              <a:t>5. INDEX SCAN </a:t>
+            </a:r>
+            <a:endParaRPr lang="ko-KR" altLang="en-US" dirty="0">
+              <a:latin typeface="나눔고딕" panose="020B0600000101010101" charset="-127"/>
+              <a:ea typeface="나눔고딕" panose="020B0600000101010101" charset="-127"/>
+            </a:endParaRPr>
+          </a:p>
+        </p:txBody>
+      </p:sp>
     </p:spTree>
     <p:extLst>
       <p:ext uri="{BB962C8B-B14F-4D97-AF65-F5344CB8AC3E}">
-        <p14:creationId xmlns:p14="http://schemas.microsoft.com/office/powerpoint/2010/main" val="2043914154"/>
+        <p14:creationId xmlns:p14="http://schemas.microsoft.com/office/powerpoint/2010/main" val="4237486263"/>
       </p:ext>
     </p:extLst>
   </p:cSld>
@@ -19694,7 +22478,7 @@
 </p:sld>
 </file>
 
-<file path=ppt/slides/slide29.xml><?xml version="1.0" encoding="utf-8"?>
+<file path=ppt/slides/slide31.xml><?xml version="1.0" encoding="utf-8"?>
 <p:sld xmlns:a="http://schemas.openxmlformats.org/drawingml/2006/main" xmlns:r="http://schemas.openxmlformats.org/officeDocument/2006/relationships" xmlns:p="http://schemas.openxmlformats.org/presentationml/2006/main">
   <p:cSld>
     <p:spTree>
@@ -19737,7 +22521,252 @@
                 <a:latin typeface="나눔고딕" panose="020B0600000101010101" charset="-127"/>
                 <a:ea typeface="나눔고딕" panose="020B0600000101010101" charset="-127"/>
               </a:rPr>
-              <a:t>3. JOIN OPERATION</a:t>
+              <a:t>6. ROWID SCAN</a:t>
+            </a:r>
+            <a:endParaRPr lang="ko-KR" altLang="en-US" dirty="0">
+              <a:latin typeface="나눔고딕" panose="020B0600000101010101" charset="-127"/>
+              <a:ea typeface="나눔고딕" panose="020B0600000101010101" charset="-127"/>
+            </a:endParaRPr>
+          </a:p>
+        </p:txBody>
+      </p:sp>
+      <p:sp>
+        <p:nvSpPr>
+          <p:cNvPr id="47" name="텍스트 개체 틀 3">
+            <a:extLst>
+              <a:ext uri="{FF2B5EF4-FFF2-40B4-BE49-F238E27FC236}">
+                <a16:creationId xmlns:a16="http://schemas.microsoft.com/office/drawing/2014/main" id="{BD6E26C7-2547-444C-8643-2B2EEE99F2F4}"/>
+              </a:ext>
+            </a:extLst>
+          </p:cNvPr>
+          <p:cNvSpPr>
+            <a:spLocks noGrp="1"/>
+          </p:cNvSpPr>
+          <p:nvPr>
+            <p:ph type="body" sz="quarter" idx="13"/>
+          </p:nvPr>
+        </p:nvSpPr>
+        <p:spPr>
+          <a:xfrm>
+            <a:off x="6747393" y="62621"/>
+            <a:ext cx="2822735" cy="390525"/>
+          </a:xfrm>
+        </p:spPr>
+        <p:txBody>
+          <a:bodyPr/>
+          <a:lstStyle/>
+          <a:p>
+            <a:r>
+              <a:rPr lang="en-US" altLang="ko-KR" dirty="0">
+                <a:latin typeface="나눔고딕" panose="020D0604000000000000" pitchFamily="50" charset="-127"/>
+                <a:ea typeface="나눔고딕" panose="020D0604000000000000" pitchFamily="50" charset="-127"/>
+              </a:rPr>
+              <a:t>Ⅱ. </a:t>
+            </a:r>
+            <a:r>
+              <a:rPr lang="ko-KR" altLang="en-US" dirty="0">
+                <a:latin typeface="나눔고딕" panose="020D0604000000000000" pitchFamily="50" charset="-127"/>
+                <a:ea typeface="나눔고딕" panose="020D0604000000000000" pitchFamily="50" charset="-127"/>
+              </a:rPr>
+              <a:t>실행계획</a:t>
+            </a:r>
+          </a:p>
+        </p:txBody>
+      </p:sp>
+      <p:sp>
+        <p:nvSpPr>
+          <p:cNvPr id="14" name="슬라이드 번호 개체 틀 2">
+            <a:extLst>
+              <a:ext uri="{FF2B5EF4-FFF2-40B4-BE49-F238E27FC236}">
+                <a16:creationId xmlns:a16="http://schemas.microsoft.com/office/drawing/2014/main" id="{E3626C26-BF47-4717-80D4-21BA55993E00}"/>
+              </a:ext>
+            </a:extLst>
+          </p:cNvPr>
+          <p:cNvSpPr>
+            <a:spLocks noGrp="1"/>
+          </p:cNvSpPr>
+          <p:nvPr>
+            <p:ph type="sldNum" sz="quarter" idx="12"/>
+          </p:nvPr>
+        </p:nvSpPr>
+        <p:spPr>
+          <a:xfrm>
+            <a:off x="4439346" y="6528442"/>
+            <a:ext cx="1029301" cy="276999"/>
+          </a:xfrm>
+        </p:spPr>
+        <p:txBody>
+          <a:bodyPr>
+            <a:normAutofit fontScale="92500"/>
+          </a:bodyPr>
+          <a:lstStyle/>
+          <a:p>
+            <a:fld id="{EBB166B3-33A6-45CA-B81B-F13BE7654232}" type="slidenum">
+              <a:rPr lang="ko-KR" altLang="en-US" smtClean="0">
+                <a:latin typeface="나눔고딕" panose="020B0600000101010101" charset="-127"/>
+                <a:ea typeface="나눔고딕" panose="020B0600000101010101" charset="-127"/>
+              </a:rPr>
+              <a:t>30</a:t>
+            </a:fld>
+            <a:endParaRPr lang="ko-KR" altLang="en-US" dirty="0">
+              <a:latin typeface="나눔고딕" panose="020B0600000101010101" charset="-127"/>
+              <a:ea typeface="나눔고딕" panose="020B0600000101010101" charset="-127"/>
+            </a:endParaRPr>
+          </a:p>
+        </p:txBody>
+      </p:sp>
+      <p:sp>
+        <p:nvSpPr>
+          <p:cNvPr id="3" name="TextBox 2">
+            <a:extLst>
+              <a:ext uri="{FF2B5EF4-FFF2-40B4-BE49-F238E27FC236}">
+                <a16:creationId xmlns:a16="http://schemas.microsoft.com/office/drawing/2014/main" id="{43BD4B0A-C817-40FC-8794-1A803D7B2883}"/>
+              </a:ext>
+            </a:extLst>
+          </p:cNvPr>
+          <p:cNvSpPr txBox="1"/>
+          <p:nvPr/>
+        </p:nvSpPr>
+        <p:spPr>
+          <a:xfrm>
+            <a:off x="220453" y="738231"/>
+            <a:ext cx="5109604" cy="953915"/>
+          </a:xfrm>
+          <a:prstGeom prst="rect">
+            <a:avLst/>
+          </a:prstGeom>
+          <a:noFill/>
+        </p:spPr>
+        <p:txBody>
+          <a:bodyPr wrap="none" rtlCol="0">
+            <a:spAutoFit/>
+          </a:bodyPr>
+          <a:lstStyle/>
+          <a:p>
+            <a:pPr marL="285750" indent="-285750">
+              <a:lnSpc>
+                <a:spcPct val="150000"/>
+              </a:lnSpc>
+              <a:buFont typeface="Arial" panose="020B0604020202020204" pitchFamily="34" charset="0"/>
+              <a:buChar char="•"/>
+            </a:pPr>
+            <a:r>
+              <a:rPr lang="en-US" altLang="ko-KR" sz="1300" dirty="0"/>
+              <a:t>ROWID SCAN</a:t>
+            </a:r>
+            <a:r>
+              <a:rPr lang="ko-KR" altLang="en-US" sz="1300" dirty="0"/>
+              <a:t>을 선택하는 경우</a:t>
+            </a:r>
+            <a:endParaRPr lang="en-US" altLang="ko-KR" sz="1300" dirty="0"/>
+          </a:p>
+          <a:p>
+            <a:pPr>
+              <a:lnSpc>
+                <a:spcPct val="150000"/>
+              </a:lnSpc>
+            </a:pPr>
+            <a:r>
+              <a:rPr lang="en-US" altLang="ko-KR" sz="1300" dirty="0"/>
+              <a:t>     1. </a:t>
+            </a:r>
+            <a:r>
+              <a:rPr lang="ko-KR" altLang="en-US" sz="1300" dirty="0"/>
+              <a:t>조건절에 </a:t>
+            </a:r>
+            <a:r>
+              <a:rPr lang="en-US" altLang="ko-KR" sz="1300" dirty="0"/>
+              <a:t>ROWID</a:t>
+            </a:r>
+            <a:r>
+              <a:rPr lang="ko-KR" altLang="en-US" sz="1300" dirty="0"/>
+              <a:t>를 명시하는 경우</a:t>
+            </a:r>
+            <a:endParaRPr lang="en-US" altLang="ko-KR" sz="1300" dirty="0"/>
+          </a:p>
+          <a:p>
+            <a:pPr>
+              <a:lnSpc>
+                <a:spcPct val="150000"/>
+              </a:lnSpc>
+            </a:pPr>
+            <a:r>
+              <a:rPr lang="en-US" altLang="ko-KR" sz="1300" dirty="0"/>
+              <a:t>     2. INDEX SCAN</a:t>
+            </a:r>
+            <a:r>
+              <a:rPr lang="ko-KR" altLang="en-US" sz="1300" dirty="0"/>
+              <a:t>을 통해 </a:t>
+            </a:r>
+            <a:r>
+              <a:rPr lang="en-US" altLang="ko-KR" sz="1300" dirty="0"/>
+              <a:t>ROWID</a:t>
+            </a:r>
+            <a:r>
+              <a:rPr lang="ko-KR" altLang="en-US" sz="1300" dirty="0"/>
+              <a:t> 조회 후 테이블에 접근할 경우</a:t>
+            </a:r>
+            <a:endParaRPr lang="en-US" altLang="ko-KR" sz="1300" dirty="0"/>
+          </a:p>
+        </p:txBody>
+      </p:sp>
+    </p:spTree>
+    <p:extLst>
+      <p:ext uri="{BB962C8B-B14F-4D97-AF65-F5344CB8AC3E}">
+        <p14:creationId xmlns:p14="http://schemas.microsoft.com/office/powerpoint/2010/main" val="2966585950"/>
+      </p:ext>
+    </p:extLst>
+  </p:cSld>
+  <p:clrMapOvr>
+    <a:masterClrMapping/>
+  </p:clrMapOvr>
+</p:sld>
+</file>
+
+<file path=ppt/slides/slide32.xml><?xml version="1.0" encoding="utf-8"?>
+<p:sld xmlns:a="http://schemas.openxmlformats.org/drawingml/2006/main" xmlns:r="http://schemas.openxmlformats.org/officeDocument/2006/relationships" xmlns:p="http://schemas.openxmlformats.org/presentationml/2006/main">
+  <p:cSld>
+    <p:spTree>
+      <p:nvGrpSpPr>
+        <p:cNvPr id="1" name=""/>
+        <p:cNvGrpSpPr/>
+        <p:nvPr/>
+      </p:nvGrpSpPr>
+      <p:grpSpPr>
+        <a:xfrm>
+          <a:off x="0" y="0"/>
+          <a:ext cx="0" cy="0"/>
+          <a:chOff x="0" y="0"/>
+          <a:chExt cx="0" cy="0"/>
+        </a:xfrm>
+      </p:grpSpPr>
+      <p:sp>
+        <p:nvSpPr>
+          <p:cNvPr id="2" name="제목 1">
+            <a:extLst>
+              <a:ext uri="{FF2B5EF4-FFF2-40B4-BE49-F238E27FC236}">
+                <a16:creationId xmlns:a16="http://schemas.microsoft.com/office/drawing/2014/main" id="{F35C43C8-4428-4D97-87C2-6ACA5057AB6C}"/>
+              </a:ext>
+            </a:extLst>
+          </p:cNvPr>
+          <p:cNvSpPr>
+            <a:spLocks noGrp="1"/>
+          </p:cNvSpPr>
+          <p:nvPr>
+            <p:ph type="title"/>
+          </p:nvPr>
+        </p:nvSpPr>
+        <p:spPr/>
+        <p:txBody>
+          <a:bodyPr/>
+          <a:lstStyle/>
+          <a:p>
+            <a:r>
+              <a:rPr lang="en-US" altLang="ko-KR" dirty="0">
+                <a:latin typeface="나눔고딕" panose="020B0600000101010101" charset="-127"/>
+                <a:ea typeface="나눔고딕" panose="020B0600000101010101" charset="-127"/>
+              </a:rPr>
+              <a:t>7. JOIN OPERATION</a:t>
             </a:r>
             <a:endParaRPr lang="ko-KR" altLang="en-US" dirty="0">
               <a:latin typeface="나눔고딕" panose="020B0600000101010101" charset="-127"/>
@@ -20127,7 +23156,7 @@
                 <a:latin typeface="나눔고딕" panose="020B0600000101010101" charset="-127"/>
                 <a:ea typeface="나눔고딕" panose="020B0600000101010101" charset="-127"/>
               </a:rPr>
-              <a:t>28</a:t>
+              <a:t>31</a:t>
             </a:fld>
             <a:endParaRPr lang="ko-KR" altLang="en-US" dirty="0">
               <a:latin typeface="나눔고딕" panose="020B0600000101010101" charset="-127"/>
@@ -20150,10 +23179,10 @@
         </p:nvGrpSpPr>
         <p:grpSpPr>
           <a:xfrm>
-            <a:off x="4975273" y="693113"/>
-            <a:ext cx="4725370" cy="3060625"/>
-            <a:chOff x="5017101" y="626001"/>
-            <a:chExt cx="4725370" cy="3060625"/>
+            <a:off x="4983662" y="713751"/>
+            <a:ext cx="4716981" cy="3039987"/>
+            <a:chOff x="5025490" y="646639"/>
+            <a:chExt cx="4716981" cy="3039987"/>
           </a:xfrm>
         </p:grpSpPr>
         <p:pic>
@@ -20269,7 +23298,7 @@
           </p:nvSpPr>
           <p:spPr bwMode="gray">
             <a:xfrm>
-              <a:off x="5017101" y="626001"/>
+              <a:off x="5025490" y="646639"/>
               <a:ext cx="1825543" cy="352174"/>
             </a:xfrm>
             <a:custGeom>
@@ -20456,452 +23485,6 @@
     <p:extLst>
       <p:ext uri="{BB962C8B-B14F-4D97-AF65-F5344CB8AC3E}">
         <p14:creationId xmlns:p14="http://schemas.microsoft.com/office/powerpoint/2010/main" val="4187868611"/>
-      </p:ext>
-    </p:extLst>
-  </p:cSld>
-  <p:clrMapOvr>
-    <a:masterClrMapping/>
-  </p:clrMapOvr>
-</p:sld>
-</file>
-
-<file path=ppt/slides/slide3.xml><?xml version="1.0" encoding="utf-8"?>
-<p:sld xmlns:a="http://schemas.openxmlformats.org/drawingml/2006/main" xmlns:r="http://schemas.openxmlformats.org/officeDocument/2006/relationships" xmlns:p="http://schemas.openxmlformats.org/presentationml/2006/main">
-  <p:cSld>
-    <p:spTree>
-      <p:nvGrpSpPr>
-        <p:cNvPr id="1" name=""/>
-        <p:cNvGrpSpPr/>
-        <p:nvPr/>
-      </p:nvGrpSpPr>
-      <p:grpSpPr>
-        <a:xfrm>
-          <a:off x="0" y="0"/>
-          <a:ext cx="0" cy="0"/>
-          <a:chOff x="0" y="0"/>
-          <a:chExt cx="0" cy="0"/>
-        </a:xfrm>
-      </p:grpSpPr>
-      <p:sp>
-        <p:nvSpPr>
-          <p:cNvPr id="2" name="제목 1">
-            <a:extLst>
-              <a:ext uri="{FF2B5EF4-FFF2-40B4-BE49-F238E27FC236}">
-                <a16:creationId xmlns:a16="http://schemas.microsoft.com/office/drawing/2014/main" id="{F35C43C8-4428-4D97-87C2-6ACA5057AB6C}"/>
-              </a:ext>
-            </a:extLst>
-          </p:cNvPr>
-          <p:cNvSpPr>
-            <a:spLocks noGrp="1"/>
-          </p:cNvSpPr>
-          <p:nvPr>
-            <p:ph type="title"/>
-          </p:nvPr>
-        </p:nvSpPr>
-        <p:spPr/>
-        <p:txBody>
-          <a:bodyPr/>
-          <a:lstStyle/>
-          <a:p>
-            <a:r>
-              <a:rPr lang="en-US" altLang="ko-KR" dirty="0">
-                <a:latin typeface="나눔고딕" panose="020B0600000101010101" charset="-127"/>
-                <a:ea typeface="나눔고딕" panose="020B0600000101010101" charset="-127"/>
-              </a:rPr>
-              <a:t>1. SUBQUERY </a:t>
-            </a:r>
-            <a:r>
-              <a:rPr lang="ko-KR" altLang="en-US" dirty="0">
-                <a:latin typeface="나눔고딕" panose="020B0600000101010101" charset="-127"/>
-                <a:ea typeface="나눔고딕" panose="020B0600000101010101" charset="-127"/>
-              </a:rPr>
-              <a:t>종류</a:t>
-            </a:r>
-          </a:p>
-        </p:txBody>
-      </p:sp>
-      <p:sp>
-        <p:nvSpPr>
-          <p:cNvPr id="3" name="슬라이드 번호 개체 틀 2">
-            <a:extLst>
-              <a:ext uri="{FF2B5EF4-FFF2-40B4-BE49-F238E27FC236}">
-                <a16:creationId xmlns:a16="http://schemas.microsoft.com/office/drawing/2014/main" id="{52605890-CC5B-48CD-9CC1-694880517276}"/>
-              </a:ext>
-            </a:extLst>
-          </p:cNvPr>
-          <p:cNvSpPr>
-            <a:spLocks noGrp="1"/>
-          </p:cNvSpPr>
-          <p:nvPr>
-            <p:ph type="sldNum" sz="quarter" idx="12"/>
-          </p:nvPr>
-        </p:nvSpPr>
-        <p:spPr/>
-        <p:txBody>
-          <a:bodyPr>
-            <a:normAutofit fontScale="92500"/>
-          </a:bodyPr>
-          <a:lstStyle/>
-          <a:p>
-            <a:fld id="{EBB166B3-33A6-45CA-B81B-F13BE7654232}" type="slidenum">
-              <a:rPr lang="ko-KR" altLang="en-US" smtClean="0">
-                <a:latin typeface="나눔고딕" panose="020B0600000101010101" charset="-127"/>
-                <a:ea typeface="나눔고딕" panose="020B0600000101010101" charset="-127"/>
-              </a:rPr>
-              <a:t>2</a:t>
-            </a:fld>
-            <a:endParaRPr lang="ko-KR" altLang="en-US">
-              <a:latin typeface="나눔고딕" panose="020B0600000101010101" charset="-127"/>
-              <a:ea typeface="나눔고딕" panose="020B0600000101010101" charset="-127"/>
-            </a:endParaRPr>
-          </a:p>
-        </p:txBody>
-      </p:sp>
-      <p:sp>
-        <p:nvSpPr>
-          <p:cNvPr id="47" name="텍스트 개체 틀 3">
-            <a:extLst>
-              <a:ext uri="{FF2B5EF4-FFF2-40B4-BE49-F238E27FC236}">
-                <a16:creationId xmlns:a16="http://schemas.microsoft.com/office/drawing/2014/main" id="{BD6E26C7-2547-444C-8643-2B2EEE99F2F4}"/>
-              </a:ext>
-            </a:extLst>
-          </p:cNvPr>
-          <p:cNvSpPr>
-            <a:spLocks noGrp="1"/>
-          </p:cNvSpPr>
-          <p:nvPr>
-            <p:ph type="body" sz="quarter" idx="13"/>
-          </p:nvPr>
-        </p:nvSpPr>
-        <p:spPr>
-          <a:xfrm>
-            <a:off x="6747393" y="62621"/>
-            <a:ext cx="2822735" cy="390525"/>
-          </a:xfrm>
-        </p:spPr>
-        <p:txBody>
-          <a:bodyPr/>
-          <a:lstStyle/>
-          <a:p>
-            <a:r>
-              <a:rPr lang="en-US" altLang="ko-KR" dirty="0">
-                <a:latin typeface="나눔고딕" panose="020B0600000101010101" charset="-127"/>
-                <a:ea typeface="나눔고딕" panose="020B0600000101010101" charset="-127"/>
-              </a:rPr>
-              <a:t>Ⅰ. SUBQUERY </a:t>
-            </a:r>
-            <a:r>
-              <a:rPr lang="ko-KR" altLang="en-US" dirty="0">
-                <a:latin typeface="나눔고딕" panose="020B0600000101010101" charset="-127"/>
-                <a:ea typeface="나눔고딕" panose="020B0600000101010101" charset="-127"/>
-              </a:rPr>
-              <a:t>종류와 활용</a:t>
-            </a:r>
-          </a:p>
-        </p:txBody>
-      </p:sp>
-      <p:sp>
-        <p:nvSpPr>
-          <p:cNvPr id="4" name="TextBox 3">
-            <a:extLst>
-              <a:ext uri="{FF2B5EF4-FFF2-40B4-BE49-F238E27FC236}">
-                <a16:creationId xmlns:a16="http://schemas.microsoft.com/office/drawing/2014/main" id="{AADEDC90-8739-4034-9C72-9415D8188AB0}"/>
-              </a:ext>
-            </a:extLst>
-          </p:cNvPr>
-          <p:cNvSpPr txBox="1"/>
-          <p:nvPr/>
-        </p:nvSpPr>
-        <p:spPr>
-          <a:xfrm>
-            <a:off x="363984" y="855677"/>
-            <a:ext cx="8356839" cy="1441613"/>
-          </a:xfrm>
-          <a:prstGeom prst="rect">
-            <a:avLst/>
-          </a:prstGeom>
-          <a:noFill/>
-        </p:spPr>
-        <p:txBody>
-          <a:bodyPr wrap="none" rtlCol="0">
-            <a:spAutoFit/>
-          </a:bodyPr>
-          <a:lstStyle/>
-          <a:p>
-            <a:pPr marL="285750" indent="-285750">
-              <a:lnSpc>
-                <a:spcPct val="150000"/>
-              </a:lnSpc>
-              <a:buFont typeface="Arial" panose="020B0604020202020204" pitchFamily="34" charset="0"/>
-              <a:buChar char="•"/>
-            </a:pPr>
-            <a:r>
-              <a:rPr lang="en-US" altLang="ko-KR" sz="1200" dirty="0"/>
-              <a:t>SUBQUERY(</a:t>
-            </a:r>
-            <a:r>
-              <a:rPr lang="ko-KR" altLang="en-US" sz="1200" dirty="0" err="1"/>
-              <a:t>서브쿼리</a:t>
-            </a:r>
-            <a:r>
-              <a:rPr lang="en-US" altLang="ko-KR" sz="1200" dirty="0"/>
-              <a:t>) : </a:t>
-            </a:r>
-            <a:r>
-              <a:rPr lang="ko-KR" altLang="en-US" sz="1200" dirty="0"/>
-              <a:t>하나의 </a:t>
-            </a:r>
-            <a:r>
-              <a:rPr lang="en-US" altLang="ko-KR" sz="1200" dirty="0"/>
-              <a:t>SQL </a:t>
-            </a:r>
-            <a:r>
-              <a:rPr lang="ko-KR" altLang="en-US" sz="1200" dirty="0"/>
-              <a:t>문장 내에서 괄호로 묶인 별도의 </a:t>
-            </a:r>
-            <a:r>
-              <a:rPr lang="en-US" altLang="ko-KR" sz="1200" dirty="0"/>
-              <a:t>Query Block(</a:t>
-            </a:r>
-            <a:r>
-              <a:rPr lang="ko-KR" altLang="en-US" sz="1200" dirty="0"/>
-              <a:t>쿼리 블록</a:t>
-            </a:r>
-            <a:r>
-              <a:rPr lang="en-US" altLang="ko-KR" sz="1200" dirty="0"/>
-              <a:t>)</a:t>
-            </a:r>
-          </a:p>
-          <a:p>
-            <a:pPr marL="285750" indent="-285750">
-              <a:lnSpc>
-                <a:spcPct val="150000"/>
-              </a:lnSpc>
-              <a:buFont typeface="Arial" panose="020B0604020202020204" pitchFamily="34" charset="0"/>
-              <a:buChar char="•"/>
-            </a:pPr>
-            <a:r>
-              <a:rPr lang="ko-KR" altLang="en-US" sz="1200" dirty="0" err="1"/>
-              <a:t>서브쿼리</a:t>
-            </a:r>
-            <a:r>
-              <a:rPr lang="ko-KR" altLang="en-US" sz="1200" dirty="0"/>
-              <a:t> 종류</a:t>
-            </a:r>
-            <a:endParaRPr lang="en-US" altLang="ko-KR" sz="1200" dirty="0"/>
-          </a:p>
-          <a:p>
-            <a:pPr>
-              <a:lnSpc>
-                <a:spcPct val="150000"/>
-              </a:lnSpc>
-            </a:pPr>
-            <a:r>
-              <a:rPr lang="en-US" altLang="ko-KR" sz="1200" dirty="0"/>
-              <a:t>     1. SCALAR SUBQUERY : </a:t>
-            </a:r>
-            <a:r>
-              <a:rPr lang="ko-KR" altLang="en-US" sz="1200" dirty="0"/>
-              <a:t>한 레코드당 정확히 하나의 컬럼 </a:t>
-            </a:r>
-            <a:r>
-              <a:rPr lang="ko-KR" altLang="en-US" sz="1200" dirty="0" err="1"/>
-              <a:t>값만을</a:t>
-            </a:r>
-            <a:r>
-              <a:rPr lang="ko-KR" altLang="en-US" sz="1200" dirty="0"/>
-              <a:t> 반환하기 위해</a:t>
-            </a:r>
-            <a:r>
-              <a:rPr lang="en-US" altLang="ko-KR" sz="1200" dirty="0"/>
-              <a:t>, </a:t>
-            </a:r>
-            <a:r>
-              <a:rPr lang="ko-KR" altLang="en-US" sz="1200" dirty="0"/>
-              <a:t>주로 </a:t>
-            </a:r>
-            <a:r>
-              <a:rPr lang="en-US" altLang="ko-KR" sz="1200" dirty="0"/>
-              <a:t>SELECT</a:t>
-            </a:r>
-            <a:r>
-              <a:rPr lang="ko-KR" altLang="en-US" sz="1200" dirty="0"/>
-              <a:t>절에 사용된 </a:t>
-            </a:r>
-            <a:r>
-              <a:rPr lang="ko-KR" altLang="en-US" sz="1200" dirty="0" err="1"/>
-              <a:t>서브쿼리</a:t>
-            </a:r>
-            <a:endParaRPr lang="en-US" altLang="ko-KR" sz="1200" dirty="0"/>
-          </a:p>
-          <a:p>
-            <a:pPr>
-              <a:lnSpc>
-                <a:spcPct val="150000"/>
-              </a:lnSpc>
-            </a:pPr>
-            <a:r>
-              <a:rPr lang="en-US" altLang="ko-KR" sz="1200" dirty="0"/>
-              <a:t>     2. INLINE VIEW          : FROM</a:t>
-            </a:r>
-            <a:r>
-              <a:rPr lang="ko-KR" altLang="en-US" sz="1200" dirty="0"/>
-              <a:t>절에 나타나는 </a:t>
-            </a:r>
-            <a:r>
-              <a:rPr lang="ko-KR" altLang="en-US" sz="1200" dirty="0" err="1"/>
-              <a:t>서브쿼리</a:t>
-            </a:r>
-            <a:endParaRPr lang="en-US" altLang="ko-KR" sz="1200" dirty="0"/>
-          </a:p>
-          <a:p>
-            <a:pPr>
-              <a:lnSpc>
-                <a:spcPct val="150000"/>
-              </a:lnSpc>
-            </a:pPr>
-            <a:r>
-              <a:rPr lang="en-US" altLang="ko-KR" sz="1200" dirty="0"/>
-              <a:t>     3. NESTED SUBQUERY : </a:t>
-            </a:r>
-            <a:r>
-              <a:rPr lang="ko-KR" altLang="en-US" sz="1200" dirty="0"/>
-              <a:t>결과집합을 한정하기 위해 </a:t>
-            </a:r>
-            <a:r>
-              <a:rPr lang="en-US" altLang="ko-KR" sz="1200" dirty="0"/>
-              <a:t>WHERE</a:t>
-            </a:r>
-            <a:r>
-              <a:rPr lang="ko-KR" altLang="en-US" sz="1200" dirty="0"/>
-              <a:t>절에 사용된 </a:t>
-            </a:r>
-            <a:r>
-              <a:rPr lang="ko-KR" altLang="en-US" sz="1200" dirty="0" err="1"/>
-              <a:t>서브쿼리</a:t>
-            </a:r>
-            <a:r>
-              <a:rPr lang="en-US" altLang="ko-KR" sz="1200" dirty="0"/>
-              <a:t> </a:t>
-            </a:r>
-          </a:p>
-        </p:txBody>
-      </p:sp>
-      <p:grpSp>
-        <p:nvGrpSpPr>
-          <p:cNvPr id="13" name="그룹 12">
-            <a:extLst>
-              <a:ext uri="{FF2B5EF4-FFF2-40B4-BE49-F238E27FC236}">
-                <a16:creationId xmlns:a16="http://schemas.microsoft.com/office/drawing/2014/main" id="{15D4348A-13E5-4356-9401-5115AAB051B7}"/>
-              </a:ext>
-            </a:extLst>
-          </p:cNvPr>
-          <p:cNvGrpSpPr/>
-          <p:nvPr/>
-        </p:nvGrpSpPr>
-        <p:grpSpPr>
-          <a:xfrm>
-            <a:off x="606847" y="2699821"/>
-            <a:ext cx="6419850" cy="3218633"/>
-            <a:chOff x="481012" y="2672451"/>
-            <a:chExt cx="6419850" cy="3218633"/>
-          </a:xfrm>
-        </p:grpSpPr>
-        <p:pic>
-          <p:nvPicPr>
-            <p:cNvPr id="8" name="그림 7">
-              <a:extLst>
-                <a:ext uri="{FF2B5EF4-FFF2-40B4-BE49-F238E27FC236}">
-                  <a16:creationId xmlns:a16="http://schemas.microsoft.com/office/drawing/2014/main" id="{802A8635-5B4A-451C-A384-D99B63ED2245}"/>
-                </a:ext>
-              </a:extLst>
-            </p:cNvPr>
-            <p:cNvPicPr>
-              <a:picLocks noChangeAspect="1"/>
-            </p:cNvPicPr>
-            <p:nvPr/>
-          </p:nvPicPr>
-          <p:blipFill>
-            <a:blip r:embed="rId2"/>
-            <a:stretch>
-              <a:fillRect/>
-            </a:stretch>
-          </p:blipFill>
-          <p:spPr>
-            <a:xfrm>
-              <a:off x="481012" y="2672451"/>
-              <a:ext cx="6353175" cy="885825"/>
-            </a:xfrm>
-            <a:prstGeom prst="rect">
-              <a:avLst/>
-            </a:prstGeom>
-          </p:spPr>
-        </p:pic>
-        <p:pic>
-          <p:nvPicPr>
-            <p:cNvPr id="10" name="그림 9">
-              <a:extLst>
-                <a:ext uri="{FF2B5EF4-FFF2-40B4-BE49-F238E27FC236}">
-                  <a16:creationId xmlns:a16="http://schemas.microsoft.com/office/drawing/2014/main" id="{4B15A1DF-909F-4835-BAEC-EF472779AFA1}"/>
-                </a:ext>
-              </a:extLst>
-            </p:cNvPr>
-            <p:cNvPicPr>
-              <a:picLocks noChangeAspect="1"/>
-            </p:cNvPicPr>
-            <p:nvPr/>
-          </p:nvPicPr>
-          <p:blipFill>
-            <a:blip r:embed="rId3"/>
-            <a:stretch>
-              <a:fillRect/>
-            </a:stretch>
-          </p:blipFill>
-          <p:spPr>
-            <a:xfrm>
-              <a:off x="481012" y="3876955"/>
-              <a:ext cx="6419850" cy="800100"/>
-            </a:xfrm>
-            <a:prstGeom prst="rect">
-              <a:avLst/>
-            </a:prstGeom>
-          </p:spPr>
-        </p:pic>
-        <p:pic>
-          <p:nvPicPr>
-            <p:cNvPr id="12" name="그림 11">
-              <a:extLst>
-                <a:ext uri="{FF2B5EF4-FFF2-40B4-BE49-F238E27FC236}">
-                  <a16:creationId xmlns:a16="http://schemas.microsoft.com/office/drawing/2014/main" id="{8678A0D3-98F3-4E09-9B16-8F5E56A6FE21}"/>
-                </a:ext>
-              </a:extLst>
-            </p:cNvPr>
-            <p:cNvPicPr>
-              <a:picLocks noChangeAspect="1"/>
-            </p:cNvPicPr>
-            <p:nvPr/>
-          </p:nvPicPr>
-          <p:blipFill>
-            <a:blip r:embed="rId4"/>
-            <a:stretch>
-              <a:fillRect/>
-            </a:stretch>
-          </p:blipFill>
-          <p:spPr>
-            <a:xfrm>
-              <a:off x="547687" y="4995734"/>
-              <a:ext cx="6286500" cy="895350"/>
-            </a:xfrm>
-            <a:prstGeom prst="rect">
-              <a:avLst/>
-            </a:prstGeom>
-          </p:spPr>
-        </p:pic>
-      </p:grpSp>
-    </p:spTree>
-    <p:extLst>
-      <p:ext uri="{BB962C8B-B14F-4D97-AF65-F5344CB8AC3E}">
-        <p14:creationId xmlns:p14="http://schemas.microsoft.com/office/powerpoint/2010/main" val="2328535874"/>
       </p:ext>
     </p:extLst>
   </p:cSld>
@@ -22269,10 +24852,10 @@
         </p:nvGrpSpPr>
         <p:grpSpPr>
           <a:xfrm>
-            <a:off x="666144" y="1135072"/>
-            <a:ext cx="5885658" cy="3730544"/>
-            <a:chOff x="275726" y="804561"/>
-            <a:chExt cx="2769478" cy="4832841"/>
+            <a:off x="670241" y="1126446"/>
+            <a:ext cx="5881561" cy="3739170"/>
+            <a:chOff x="277654" y="793386"/>
+            <a:chExt cx="2767550" cy="4844016"/>
           </a:xfrm>
         </p:grpSpPr>
         <p:sp>
@@ -22341,7 +24924,7 @@
           </p:nvSpPr>
           <p:spPr bwMode="gray">
             <a:xfrm>
-              <a:off x="275726" y="804561"/>
+              <a:off x="279785" y="793386"/>
               <a:ext cx="969531" cy="360001"/>
             </a:xfrm>
             <a:custGeom>

</xml_diff>

<commit_message>
ch2 update(scan operation examples & join operation left)
</commit_message>
<xml_diff>
--- a/SQL_seminar/SQL중상급활용_CH2.pptx
+++ b/SQL_seminar/SQL중상급활용_CH2.pptx
@@ -5,7 +5,7 @@
     <p:sldMasterId id="2147483660" r:id="rId1"/>
   </p:sldMasterIdLst>
   <p:notesMasterIdLst>
-    <p:notesMasterId r:id="rId34"/>
+    <p:notesMasterId r:id="rId36"/>
   </p:notesMasterIdLst>
   <p:sldIdLst>
     <p:sldId id="256" r:id="rId2"/>
@@ -35,11 +35,13 @@
     <p:sldId id="326" r:id="rId26"/>
     <p:sldId id="330" r:id="rId27"/>
     <p:sldId id="327" r:id="rId28"/>
-    <p:sldId id="333" r:id="rId29"/>
-    <p:sldId id="334" r:id="rId30"/>
-    <p:sldId id="331" r:id="rId31"/>
-    <p:sldId id="332" r:id="rId32"/>
-    <p:sldId id="329" r:id="rId33"/>
+    <p:sldId id="336" r:id="rId29"/>
+    <p:sldId id="333" r:id="rId30"/>
+    <p:sldId id="334" r:id="rId31"/>
+    <p:sldId id="331" r:id="rId32"/>
+    <p:sldId id="335" r:id="rId33"/>
+    <p:sldId id="332" r:id="rId34"/>
+    <p:sldId id="329" r:id="rId35"/>
   </p:sldIdLst>
   <p:sldSz cx="9906000" cy="6858000" type="A4"/>
   <p:notesSz cx="6797675" cy="9926638"/>
@@ -170,9 +172,11 @@
             <p14:sldId id="326"/>
             <p14:sldId id="330"/>
             <p14:sldId id="327"/>
+            <p14:sldId id="336"/>
             <p14:sldId id="333"/>
             <p14:sldId id="334"/>
             <p14:sldId id="331"/>
+            <p14:sldId id="335"/>
             <p14:sldId id="332"/>
             <p14:sldId id="329"/>
           </p14:sldIdLst>
@@ -18282,11 +18286,23 @@
             </a:pPr>
             <a:r>
               <a:rPr lang="en-US" altLang="ko-KR" sz="1300" dirty="0"/>
-              <a:t>     2. ROWID SCAN      : ROWID</a:t>
+              <a:t>     2. </a:t>
+            </a:r>
+            <a:r>
+              <a:rPr lang="en-US" altLang="ko-KR" sz="1300" b="1" dirty="0">
+                <a:solidFill>
+                  <a:srgbClr val="FF0000"/>
+                </a:solidFill>
+              </a:rPr>
+              <a:t>INDEX SCAN</a:t>
+            </a:r>
+            <a:r>
+              <a:rPr lang="en-US" altLang="ko-KR" sz="1300" dirty="0"/>
+              <a:t>       : </a:t>
             </a:r>
             <a:r>
               <a:rPr lang="ko-KR" altLang="en-US" sz="1300" dirty="0"/>
-              <a:t>를 기준으로 데이터를 </a:t>
+              <a:t>인덱스를 사용하여 데이터를 </a:t>
             </a:r>
             <a:r>
               <a:rPr lang="en-US" altLang="ko-KR" sz="1300" dirty="0"/>
@@ -18301,23 +18317,11 @@
             </a:pPr>
             <a:r>
               <a:rPr lang="en-US" altLang="ko-KR" sz="1300" dirty="0"/>
-              <a:t>     3. </a:t>
-            </a:r>
-            <a:r>
-              <a:rPr lang="en-US" altLang="ko-KR" sz="1300" b="1" dirty="0">
-                <a:solidFill>
-                  <a:srgbClr val="FF0000"/>
-                </a:solidFill>
-              </a:rPr>
-              <a:t>INDEX SCAN</a:t>
-            </a:r>
-            <a:r>
-              <a:rPr lang="en-US" altLang="ko-KR" sz="1300" dirty="0"/>
-              <a:t>       : </a:t>
+              <a:t>     3. ROWID SCAN      : ROWID</a:t>
             </a:r>
             <a:r>
               <a:rPr lang="ko-KR" altLang="en-US" sz="1300" dirty="0"/>
-              <a:t>인덱스를 사용하여 데이터를 </a:t>
+              <a:t>를 기준으로 데이터를 </a:t>
             </a:r>
             <a:r>
               <a:rPr lang="en-US" altLang="ko-KR" sz="1300" dirty="0"/>
@@ -19433,6 +19437,161 @@
       </p:grpSpPr>
       <p:sp>
         <p:nvSpPr>
+          <p:cNvPr id="2" name="제목 1">
+            <a:extLst>
+              <a:ext uri="{FF2B5EF4-FFF2-40B4-BE49-F238E27FC236}">
+                <a16:creationId xmlns:a16="http://schemas.microsoft.com/office/drawing/2014/main" id="{F35C43C8-4428-4D97-87C2-6ACA5057AB6C}"/>
+              </a:ext>
+            </a:extLst>
+          </p:cNvPr>
+          <p:cNvSpPr>
+            <a:spLocks noGrp="1"/>
+          </p:cNvSpPr>
+          <p:nvPr>
+            <p:ph type="title"/>
+          </p:nvPr>
+        </p:nvSpPr>
+        <p:spPr/>
+        <p:txBody>
+          <a:bodyPr/>
+          <a:lstStyle/>
+          <a:p>
+            <a:r>
+              <a:rPr lang="en-US" altLang="ko-KR" dirty="0">
+                <a:latin typeface="나눔고딕" panose="020B0600000101010101" charset="-127"/>
+                <a:ea typeface="나눔고딕" panose="020B0600000101010101" charset="-127"/>
+              </a:rPr>
+              <a:t>4. TABLE FULL SCAN</a:t>
+            </a:r>
+            <a:endParaRPr lang="ko-KR" altLang="en-US" dirty="0">
+              <a:latin typeface="나눔고딕" panose="020B0600000101010101" charset="-127"/>
+              <a:ea typeface="나눔고딕" panose="020B0600000101010101" charset="-127"/>
+            </a:endParaRPr>
+          </a:p>
+        </p:txBody>
+      </p:sp>
+      <p:sp>
+        <p:nvSpPr>
+          <p:cNvPr id="47" name="텍스트 개체 틀 3">
+            <a:extLst>
+              <a:ext uri="{FF2B5EF4-FFF2-40B4-BE49-F238E27FC236}">
+                <a16:creationId xmlns:a16="http://schemas.microsoft.com/office/drawing/2014/main" id="{BD6E26C7-2547-444C-8643-2B2EEE99F2F4}"/>
+              </a:ext>
+            </a:extLst>
+          </p:cNvPr>
+          <p:cNvSpPr>
+            <a:spLocks noGrp="1"/>
+          </p:cNvSpPr>
+          <p:nvPr>
+            <p:ph type="body" sz="quarter" idx="13"/>
+          </p:nvPr>
+        </p:nvSpPr>
+        <p:spPr>
+          <a:xfrm>
+            <a:off x="6747393" y="62621"/>
+            <a:ext cx="2822735" cy="390525"/>
+          </a:xfrm>
+        </p:spPr>
+        <p:txBody>
+          <a:bodyPr/>
+          <a:lstStyle/>
+          <a:p>
+            <a:r>
+              <a:rPr lang="en-US" altLang="ko-KR" dirty="0">
+                <a:latin typeface="나눔고딕" panose="020D0604000000000000" pitchFamily="50" charset="-127"/>
+                <a:ea typeface="나눔고딕" panose="020D0604000000000000" pitchFamily="50" charset="-127"/>
+              </a:rPr>
+              <a:t>Ⅱ. </a:t>
+            </a:r>
+            <a:r>
+              <a:rPr lang="ko-KR" altLang="en-US" dirty="0">
+                <a:latin typeface="나눔고딕" panose="020D0604000000000000" pitchFamily="50" charset="-127"/>
+                <a:ea typeface="나눔고딕" panose="020D0604000000000000" pitchFamily="50" charset="-127"/>
+              </a:rPr>
+              <a:t>실행계획</a:t>
+            </a:r>
+          </a:p>
+        </p:txBody>
+      </p:sp>
+      <p:sp>
+        <p:nvSpPr>
+          <p:cNvPr id="13" name="TextBox 12">
+            <a:extLst>
+              <a:ext uri="{FF2B5EF4-FFF2-40B4-BE49-F238E27FC236}">
+                <a16:creationId xmlns:a16="http://schemas.microsoft.com/office/drawing/2014/main" id="{291B8812-6E7F-4ADA-8377-5EACB7DCC78A}"/>
+              </a:ext>
+            </a:extLst>
+          </p:cNvPr>
+          <p:cNvSpPr txBox="1"/>
+          <p:nvPr/>
+        </p:nvSpPr>
+        <p:spPr>
+          <a:xfrm>
+            <a:off x="363984" y="645439"/>
+            <a:ext cx="3013261" cy="353751"/>
+          </a:xfrm>
+          <a:prstGeom prst="rect">
+            <a:avLst/>
+          </a:prstGeom>
+          <a:noFill/>
+        </p:spPr>
+        <p:txBody>
+          <a:bodyPr wrap="none" rtlCol="0">
+            <a:spAutoFit/>
+          </a:bodyPr>
+          <a:lstStyle/>
+          <a:p>
+            <a:pPr marL="285750" indent="-285750">
+              <a:lnSpc>
+                <a:spcPct val="150000"/>
+              </a:lnSpc>
+              <a:buFont typeface="Arial" panose="020B0604020202020204" pitchFamily="34" charset="0"/>
+              <a:buChar char="•"/>
+            </a:pPr>
+            <a:r>
+              <a:rPr lang="en-US" altLang="ko-KR" sz="1300" dirty="0"/>
+              <a:t>TABLE FULL SCAN </a:t>
+            </a:r>
+            <a:r>
+              <a:rPr lang="ko-KR" altLang="en-US" sz="1300" dirty="0"/>
+              <a:t>예시 추가 필요</a:t>
+            </a:r>
+            <a:endParaRPr lang="en-US" altLang="ko-KR" sz="1300" dirty="0"/>
+          </a:p>
+        </p:txBody>
+      </p:sp>
+    </p:spTree>
+    <p:extLst>
+      <p:ext uri="{BB962C8B-B14F-4D97-AF65-F5344CB8AC3E}">
+        <p14:creationId xmlns:p14="http://schemas.microsoft.com/office/powerpoint/2010/main" val="3151709736"/>
+      </p:ext>
+    </p:extLst>
+  </p:cSld>
+  <p:clrMapOvr>
+    <a:masterClrMapping/>
+  </p:clrMapOvr>
+</p:sld>
+</file>
+
+<file path=ppt/slides/slide29.xml><?xml version="1.0" encoding="utf-8"?>
+<p:sld xmlns:a="http://schemas.openxmlformats.org/drawingml/2006/main" xmlns:r="http://schemas.openxmlformats.org/officeDocument/2006/relationships" xmlns:p="http://schemas.openxmlformats.org/presentationml/2006/main">
+  <p:cSld>
+    <p:spTree>
+      <p:nvGrpSpPr>
+        <p:cNvPr id="1" name=""/>
+        <p:cNvGrpSpPr/>
+        <p:nvPr/>
+      </p:nvGrpSpPr>
+      <p:grpSpPr>
+        <a:xfrm>
+          <a:off x="0" y="0"/>
+          <a:ext cx="0" cy="0"/>
+          <a:chOff x="0" y="0"/>
+          <a:chExt cx="0" cy="0"/>
+        </a:xfrm>
+      </p:grpSpPr>
+      <p:sp>
+        <p:nvSpPr>
           <p:cNvPr id="47" name="텍스트 개체 틀 3">
             <a:extLst>
               <a:ext uri="{FF2B5EF4-FFF2-40B4-BE49-F238E27FC236}">
@@ -19507,7 +19666,7 @@
                 <a:latin typeface="나눔고딕" panose="020B0600000101010101" charset="-127"/>
                 <a:ea typeface="나눔고딕" panose="020B0600000101010101" charset="-127"/>
               </a:rPr>
-              <a:t>27</a:t>
+              <a:t>28</a:t>
             </a:fld>
             <a:endParaRPr lang="ko-KR" altLang="en-US" dirty="0">
               <a:latin typeface="나눔고딕" panose="020B0600000101010101" charset="-127"/>
@@ -20349,7 +20508,453 @@
 </p:sld>
 </file>
 
-<file path=ppt/slides/slide29.xml><?xml version="1.0" encoding="utf-8"?>
+<file path=ppt/slides/slide3.xml><?xml version="1.0" encoding="utf-8"?>
+<p:sld xmlns:a="http://schemas.openxmlformats.org/drawingml/2006/main" xmlns:r="http://schemas.openxmlformats.org/officeDocument/2006/relationships" xmlns:p="http://schemas.openxmlformats.org/presentationml/2006/main">
+  <p:cSld>
+    <p:spTree>
+      <p:nvGrpSpPr>
+        <p:cNvPr id="1" name=""/>
+        <p:cNvGrpSpPr/>
+        <p:nvPr/>
+      </p:nvGrpSpPr>
+      <p:grpSpPr>
+        <a:xfrm>
+          <a:off x="0" y="0"/>
+          <a:ext cx="0" cy="0"/>
+          <a:chOff x="0" y="0"/>
+          <a:chExt cx="0" cy="0"/>
+        </a:xfrm>
+      </p:grpSpPr>
+      <p:sp>
+        <p:nvSpPr>
+          <p:cNvPr id="2" name="제목 1">
+            <a:extLst>
+              <a:ext uri="{FF2B5EF4-FFF2-40B4-BE49-F238E27FC236}">
+                <a16:creationId xmlns:a16="http://schemas.microsoft.com/office/drawing/2014/main" id="{F35C43C8-4428-4D97-87C2-6ACA5057AB6C}"/>
+              </a:ext>
+            </a:extLst>
+          </p:cNvPr>
+          <p:cNvSpPr>
+            <a:spLocks noGrp="1"/>
+          </p:cNvSpPr>
+          <p:nvPr>
+            <p:ph type="title"/>
+          </p:nvPr>
+        </p:nvSpPr>
+        <p:spPr/>
+        <p:txBody>
+          <a:bodyPr/>
+          <a:lstStyle/>
+          <a:p>
+            <a:r>
+              <a:rPr lang="en-US" altLang="ko-KR" dirty="0">
+                <a:latin typeface="나눔고딕" panose="020B0600000101010101" charset="-127"/>
+                <a:ea typeface="나눔고딕" panose="020B0600000101010101" charset="-127"/>
+              </a:rPr>
+              <a:t>1. SUBQUERY </a:t>
+            </a:r>
+            <a:r>
+              <a:rPr lang="ko-KR" altLang="en-US" dirty="0">
+                <a:latin typeface="나눔고딕" panose="020B0600000101010101" charset="-127"/>
+                <a:ea typeface="나눔고딕" panose="020B0600000101010101" charset="-127"/>
+              </a:rPr>
+              <a:t>종류</a:t>
+            </a:r>
+          </a:p>
+        </p:txBody>
+      </p:sp>
+      <p:sp>
+        <p:nvSpPr>
+          <p:cNvPr id="3" name="슬라이드 번호 개체 틀 2">
+            <a:extLst>
+              <a:ext uri="{FF2B5EF4-FFF2-40B4-BE49-F238E27FC236}">
+                <a16:creationId xmlns:a16="http://schemas.microsoft.com/office/drawing/2014/main" id="{52605890-CC5B-48CD-9CC1-694880517276}"/>
+              </a:ext>
+            </a:extLst>
+          </p:cNvPr>
+          <p:cNvSpPr>
+            <a:spLocks noGrp="1"/>
+          </p:cNvSpPr>
+          <p:nvPr>
+            <p:ph type="sldNum" sz="quarter" idx="12"/>
+          </p:nvPr>
+        </p:nvSpPr>
+        <p:spPr/>
+        <p:txBody>
+          <a:bodyPr>
+            <a:normAutofit fontScale="92500"/>
+          </a:bodyPr>
+          <a:lstStyle/>
+          <a:p>
+            <a:fld id="{EBB166B3-33A6-45CA-B81B-F13BE7654232}" type="slidenum">
+              <a:rPr lang="ko-KR" altLang="en-US" smtClean="0">
+                <a:latin typeface="나눔고딕" panose="020B0600000101010101" charset="-127"/>
+                <a:ea typeface="나눔고딕" panose="020B0600000101010101" charset="-127"/>
+              </a:rPr>
+              <a:t>2</a:t>
+            </a:fld>
+            <a:endParaRPr lang="ko-KR" altLang="en-US">
+              <a:latin typeface="나눔고딕" panose="020B0600000101010101" charset="-127"/>
+              <a:ea typeface="나눔고딕" panose="020B0600000101010101" charset="-127"/>
+            </a:endParaRPr>
+          </a:p>
+        </p:txBody>
+      </p:sp>
+      <p:sp>
+        <p:nvSpPr>
+          <p:cNvPr id="47" name="텍스트 개체 틀 3">
+            <a:extLst>
+              <a:ext uri="{FF2B5EF4-FFF2-40B4-BE49-F238E27FC236}">
+                <a16:creationId xmlns:a16="http://schemas.microsoft.com/office/drawing/2014/main" id="{BD6E26C7-2547-444C-8643-2B2EEE99F2F4}"/>
+              </a:ext>
+            </a:extLst>
+          </p:cNvPr>
+          <p:cNvSpPr>
+            <a:spLocks noGrp="1"/>
+          </p:cNvSpPr>
+          <p:nvPr>
+            <p:ph type="body" sz="quarter" idx="13"/>
+          </p:nvPr>
+        </p:nvSpPr>
+        <p:spPr>
+          <a:xfrm>
+            <a:off x="6747393" y="62621"/>
+            <a:ext cx="2822735" cy="390525"/>
+          </a:xfrm>
+        </p:spPr>
+        <p:txBody>
+          <a:bodyPr/>
+          <a:lstStyle/>
+          <a:p>
+            <a:r>
+              <a:rPr lang="en-US" altLang="ko-KR" dirty="0">
+                <a:latin typeface="나눔고딕" panose="020B0600000101010101" charset="-127"/>
+                <a:ea typeface="나눔고딕" panose="020B0600000101010101" charset="-127"/>
+              </a:rPr>
+              <a:t>Ⅰ. SUBQUERY </a:t>
+            </a:r>
+            <a:r>
+              <a:rPr lang="ko-KR" altLang="en-US" dirty="0">
+                <a:latin typeface="나눔고딕" panose="020B0600000101010101" charset="-127"/>
+                <a:ea typeface="나눔고딕" panose="020B0600000101010101" charset="-127"/>
+              </a:rPr>
+              <a:t>종류와 활용</a:t>
+            </a:r>
+          </a:p>
+        </p:txBody>
+      </p:sp>
+      <p:sp>
+        <p:nvSpPr>
+          <p:cNvPr id="4" name="TextBox 3">
+            <a:extLst>
+              <a:ext uri="{FF2B5EF4-FFF2-40B4-BE49-F238E27FC236}">
+                <a16:creationId xmlns:a16="http://schemas.microsoft.com/office/drawing/2014/main" id="{AADEDC90-8739-4034-9C72-9415D8188AB0}"/>
+              </a:ext>
+            </a:extLst>
+          </p:cNvPr>
+          <p:cNvSpPr txBox="1"/>
+          <p:nvPr/>
+        </p:nvSpPr>
+        <p:spPr>
+          <a:xfrm>
+            <a:off x="363984" y="855677"/>
+            <a:ext cx="8356839" cy="1441613"/>
+          </a:xfrm>
+          <a:prstGeom prst="rect">
+            <a:avLst/>
+          </a:prstGeom>
+          <a:noFill/>
+        </p:spPr>
+        <p:txBody>
+          <a:bodyPr wrap="none" rtlCol="0">
+            <a:spAutoFit/>
+          </a:bodyPr>
+          <a:lstStyle/>
+          <a:p>
+            <a:pPr marL="285750" indent="-285750">
+              <a:lnSpc>
+                <a:spcPct val="150000"/>
+              </a:lnSpc>
+              <a:buFont typeface="Arial" panose="020B0604020202020204" pitchFamily="34" charset="0"/>
+              <a:buChar char="•"/>
+            </a:pPr>
+            <a:r>
+              <a:rPr lang="en-US" altLang="ko-KR" sz="1200" dirty="0"/>
+              <a:t>SUBQUERY(</a:t>
+            </a:r>
+            <a:r>
+              <a:rPr lang="ko-KR" altLang="en-US" sz="1200" dirty="0" err="1"/>
+              <a:t>서브쿼리</a:t>
+            </a:r>
+            <a:r>
+              <a:rPr lang="en-US" altLang="ko-KR" sz="1200" dirty="0"/>
+              <a:t>) : </a:t>
+            </a:r>
+            <a:r>
+              <a:rPr lang="ko-KR" altLang="en-US" sz="1200" dirty="0"/>
+              <a:t>하나의 </a:t>
+            </a:r>
+            <a:r>
+              <a:rPr lang="en-US" altLang="ko-KR" sz="1200" dirty="0"/>
+              <a:t>SQL </a:t>
+            </a:r>
+            <a:r>
+              <a:rPr lang="ko-KR" altLang="en-US" sz="1200" dirty="0"/>
+              <a:t>문장 내에서 괄호로 묶인 별도의 </a:t>
+            </a:r>
+            <a:r>
+              <a:rPr lang="en-US" altLang="ko-KR" sz="1200" dirty="0"/>
+              <a:t>Query Block(</a:t>
+            </a:r>
+            <a:r>
+              <a:rPr lang="ko-KR" altLang="en-US" sz="1200" dirty="0"/>
+              <a:t>쿼리 블록</a:t>
+            </a:r>
+            <a:r>
+              <a:rPr lang="en-US" altLang="ko-KR" sz="1200" dirty="0"/>
+              <a:t>)</a:t>
+            </a:r>
+          </a:p>
+          <a:p>
+            <a:pPr marL="285750" indent="-285750">
+              <a:lnSpc>
+                <a:spcPct val="150000"/>
+              </a:lnSpc>
+              <a:buFont typeface="Arial" panose="020B0604020202020204" pitchFamily="34" charset="0"/>
+              <a:buChar char="•"/>
+            </a:pPr>
+            <a:r>
+              <a:rPr lang="ko-KR" altLang="en-US" sz="1200" dirty="0" err="1"/>
+              <a:t>서브쿼리</a:t>
+            </a:r>
+            <a:r>
+              <a:rPr lang="ko-KR" altLang="en-US" sz="1200" dirty="0"/>
+              <a:t> 종류</a:t>
+            </a:r>
+            <a:endParaRPr lang="en-US" altLang="ko-KR" sz="1200" dirty="0"/>
+          </a:p>
+          <a:p>
+            <a:pPr>
+              <a:lnSpc>
+                <a:spcPct val="150000"/>
+              </a:lnSpc>
+            </a:pPr>
+            <a:r>
+              <a:rPr lang="en-US" altLang="ko-KR" sz="1200" dirty="0"/>
+              <a:t>     1. SCALAR SUBQUERY : </a:t>
+            </a:r>
+            <a:r>
+              <a:rPr lang="ko-KR" altLang="en-US" sz="1200" dirty="0"/>
+              <a:t>한 레코드당 정확히 하나의 컬럼 </a:t>
+            </a:r>
+            <a:r>
+              <a:rPr lang="ko-KR" altLang="en-US" sz="1200" dirty="0" err="1"/>
+              <a:t>값만을</a:t>
+            </a:r>
+            <a:r>
+              <a:rPr lang="ko-KR" altLang="en-US" sz="1200" dirty="0"/>
+              <a:t> 반환하기 위해</a:t>
+            </a:r>
+            <a:r>
+              <a:rPr lang="en-US" altLang="ko-KR" sz="1200" dirty="0"/>
+              <a:t>, </a:t>
+            </a:r>
+            <a:r>
+              <a:rPr lang="ko-KR" altLang="en-US" sz="1200" dirty="0"/>
+              <a:t>주로 </a:t>
+            </a:r>
+            <a:r>
+              <a:rPr lang="en-US" altLang="ko-KR" sz="1200" dirty="0"/>
+              <a:t>SELECT</a:t>
+            </a:r>
+            <a:r>
+              <a:rPr lang="ko-KR" altLang="en-US" sz="1200" dirty="0"/>
+              <a:t>절에 사용된 </a:t>
+            </a:r>
+            <a:r>
+              <a:rPr lang="ko-KR" altLang="en-US" sz="1200" dirty="0" err="1"/>
+              <a:t>서브쿼리</a:t>
+            </a:r>
+            <a:endParaRPr lang="en-US" altLang="ko-KR" sz="1200" dirty="0"/>
+          </a:p>
+          <a:p>
+            <a:pPr>
+              <a:lnSpc>
+                <a:spcPct val="150000"/>
+              </a:lnSpc>
+            </a:pPr>
+            <a:r>
+              <a:rPr lang="en-US" altLang="ko-KR" sz="1200" dirty="0"/>
+              <a:t>     2. INLINE VIEW          : FROM</a:t>
+            </a:r>
+            <a:r>
+              <a:rPr lang="ko-KR" altLang="en-US" sz="1200" dirty="0"/>
+              <a:t>절에 나타나는 </a:t>
+            </a:r>
+            <a:r>
+              <a:rPr lang="ko-KR" altLang="en-US" sz="1200" dirty="0" err="1"/>
+              <a:t>서브쿼리</a:t>
+            </a:r>
+            <a:endParaRPr lang="en-US" altLang="ko-KR" sz="1200" dirty="0"/>
+          </a:p>
+          <a:p>
+            <a:pPr>
+              <a:lnSpc>
+                <a:spcPct val="150000"/>
+              </a:lnSpc>
+            </a:pPr>
+            <a:r>
+              <a:rPr lang="en-US" altLang="ko-KR" sz="1200" dirty="0"/>
+              <a:t>     3. NESTED SUBQUERY : </a:t>
+            </a:r>
+            <a:r>
+              <a:rPr lang="ko-KR" altLang="en-US" sz="1200" dirty="0"/>
+              <a:t>결과집합을 한정하기 위해 </a:t>
+            </a:r>
+            <a:r>
+              <a:rPr lang="en-US" altLang="ko-KR" sz="1200" dirty="0"/>
+              <a:t>WHERE</a:t>
+            </a:r>
+            <a:r>
+              <a:rPr lang="ko-KR" altLang="en-US" sz="1200" dirty="0"/>
+              <a:t>절에 사용된 </a:t>
+            </a:r>
+            <a:r>
+              <a:rPr lang="ko-KR" altLang="en-US" sz="1200" dirty="0" err="1"/>
+              <a:t>서브쿼리</a:t>
+            </a:r>
+            <a:r>
+              <a:rPr lang="en-US" altLang="ko-KR" sz="1200" dirty="0"/>
+              <a:t> </a:t>
+            </a:r>
+          </a:p>
+        </p:txBody>
+      </p:sp>
+      <p:grpSp>
+        <p:nvGrpSpPr>
+          <p:cNvPr id="13" name="그룹 12">
+            <a:extLst>
+              <a:ext uri="{FF2B5EF4-FFF2-40B4-BE49-F238E27FC236}">
+                <a16:creationId xmlns:a16="http://schemas.microsoft.com/office/drawing/2014/main" id="{15D4348A-13E5-4356-9401-5115AAB051B7}"/>
+              </a:ext>
+            </a:extLst>
+          </p:cNvPr>
+          <p:cNvGrpSpPr/>
+          <p:nvPr/>
+        </p:nvGrpSpPr>
+        <p:grpSpPr>
+          <a:xfrm>
+            <a:off x="606847" y="2699821"/>
+            <a:ext cx="6419850" cy="3218633"/>
+            <a:chOff x="481012" y="2672451"/>
+            <a:chExt cx="6419850" cy="3218633"/>
+          </a:xfrm>
+        </p:grpSpPr>
+        <p:pic>
+          <p:nvPicPr>
+            <p:cNvPr id="8" name="그림 7">
+              <a:extLst>
+                <a:ext uri="{FF2B5EF4-FFF2-40B4-BE49-F238E27FC236}">
+                  <a16:creationId xmlns:a16="http://schemas.microsoft.com/office/drawing/2014/main" id="{802A8635-5B4A-451C-A384-D99B63ED2245}"/>
+                </a:ext>
+              </a:extLst>
+            </p:cNvPr>
+            <p:cNvPicPr>
+              <a:picLocks noChangeAspect="1"/>
+            </p:cNvPicPr>
+            <p:nvPr/>
+          </p:nvPicPr>
+          <p:blipFill>
+            <a:blip r:embed="rId2"/>
+            <a:stretch>
+              <a:fillRect/>
+            </a:stretch>
+          </p:blipFill>
+          <p:spPr>
+            <a:xfrm>
+              <a:off x="481012" y="2672451"/>
+              <a:ext cx="6353175" cy="885825"/>
+            </a:xfrm>
+            <a:prstGeom prst="rect">
+              <a:avLst/>
+            </a:prstGeom>
+          </p:spPr>
+        </p:pic>
+        <p:pic>
+          <p:nvPicPr>
+            <p:cNvPr id="10" name="그림 9">
+              <a:extLst>
+                <a:ext uri="{FF2B5EF4-FFF2-40B4-BE49-F238E27FC236}">
+                  <a16:creationId xmlns:a16="http://schemas.microsoft.com/office/drawing/2014/main" id="{4B15A1DF-909F-4835-BAEC-EF472779AFA1}"/>
+                </a:ext>
+              </a:extLst>
+            </p:cNvPr>
+            <p:cNvPicPr>
+              <a:picLocks noChangeAspect="1"/>
+            </p:cNvPicPr>
+            <p:nvPr/>
+          </p:nvPicPr>
+          <p:blipFill>
+            <a:blip r:embed="rId3"/>
+            <a:stretch>
+              <a:fillRect/>
+            </a:stretch>
+          </p:blipFill>
+          <p:spPr>
+            <a:xfrm>
+              <a:off x="481012" y="3876955"/>
+              <a:ext cx="6419850" cy="800100"/>
+            </a:xfrm>
+            <a:prstGeom prst="rect">
+              <a:avLst/>
+            </a:prstGeom>
+          </p:spPr>
+        </p:pic>
+        <p:pic>
+          <p:nvPicPr>
+            <p:cNvPr id="12" name="그림 11">
+              <a:extLst>
+                <a:ext uri="{FF2B5EF4-FFF2-40B4-BE49-F238E27FC236}">
+                  <a16:creationId xmlns:a16="http://schemas.microsoft.com/office/drawing/2014/main" id="{8678A0D3-98F3-4E09-9B16-8F5E56A6FE21}"/>
+                </a:ext>
+              </a:extLst>
+            </p:cNvPr>
+            <p:cNvPicPr>
+              <a:picLocks noChangeAspect="1"/>
+            </p:cNvPicPr>
+            <p:nvPr/>
+          </p:nvPicPr>
+          <p:blipFill>
+            <a:blip r:embed="rId4"/>
+            <a:stretch>
+              <a:fillRect/>
+            </a:stretch>
+          </p:blipFill>
+          <p:spPr>
+            <a:xfrm>
+              <a:off x="547687" y="4995734"/>
+              <a:ext cx="6286500" cy="895350"/>
+            </a:xfrm>
+            <a:prstGeom prst="rect">
+              <a:avLst/>
+            </a:prstGeom>
+          </p:spPr>
+        </p:pic>
+      </p:grpSp>
+    </p:spTree>
+    <p:extLst>
+      <p:ext uri="{BB962C8B-B14F-4D97-AF65-F5344CB8AC3E}">
+        <p14:creationId xmlns:p14="http://schemas.microsoft.com/office/powerpoint/2010/main" val="2328535874"/>
+      </p:ext>
+    </p:extLst>
+  </p:cSld>
+  <p:clrMapOvr>
+    <a:masterClrMapping/>
+  </p:clrMapOvr>
+</p:sld>
+</file>
+
+<file path=ppt/slides/slide30.xml><?xml version="1.0" encoding="utf-8"?>
 <p:sld xmlns:a="http://schemas.openxmlformats.org/drawingml/2006/main" xmlns:r="http://schemas.openxmlformats.org/officeDocument/2006/relationships" xmlns:p="http://schemas.openxmlformats.org/presentationml/2006/main">
   <p:cSld>
     <p:spTree>
@@ -20442,7 +21047,7 @@
                 <a:latin typeface="나눔고딕" panose="020B0600000101010101" charset="-127"/>
                 <a:ea typeface="나눔고딕" panose="020B0600000101010101" charset="-127"/>
               </a:rPr>
-              <a:t>28</a:t>
+              <a:t>29</a:t>
             </a:fld>
             <a:endParaRPr lang="ko-KR" altLang="en-US" dirty="0">
               <a:latin typeface="나눔고딕" panose="020B0600000101010101" charset="-127"/>
@@ -21490,994 +22095,6 @@
 </p:sld>
 </file>
 
-<file path=ppt/slides/slide3.xml><?xml version="1.0" encoding="utf-8"?>
-<p:sld xmlns:a="http://schemas.openxmlformats.org/drawingml/2006/main" xmlns:r="http://schemas.openxmlformats.org/officeDocument/2006/relationships" xmlns:p="http://schemas.openxmlformats.org/presentationml/2006/main">
-  <p:cSld>
-    <p:spTree>
-      <p:nvGrpSpPr>
-        <p:cNvPr id="1" name=""/>
-        <p:cNvGrpSpPr/>
-        <p:nvPr/>
-      </p:nvGrpSpPr>
-      <p:grpSpPr>
-        <a:xfrm>
-          <a:off x="0" y="0"/>
-          <a:ext cx="0" cy="0"/>
-          <a:chOff x="0" y="0"/>
-          <a:chExt cx="0" cy="0"/>
-        </a:xfrm>
-      </p:grpSpPr>
-      <p:sp>
-        <p:nvSpPr>
-          <p:cNvPr id="2" name="제목 1">
-            <a:extLst>
-              <a:ext uri="{FF2B5EF4-FFF2-40B4-BE49-F238E27FC236}">
-                <a16:creationId xmlns:a16="http://schemas.microsoft.com/office/drawing/2014/main" id="{F35C43C8-4428-4D97-87C2-6ACA5057AB6C}"/>
-              </a:ext>
-            </a:extLst>
-          </p:cNvPr>
-          <p:cNvSpPr>
-            <a:spLocks noGrp="1"/>
-          </p:cNvSpPr>
-          <p:nvPr>
-            <p:ph type="title"/>
-          </p:nvPr>
-        </p:nvSpPr>
-        <p:spPr/>
-        <p:txBody>
-          <a:bodyPr/>
-          <a:lstStyle/>
-          <a:p>
-            <a:r>
-              <a:rPr lang="en-US" altLang="ko-KR" dirty="0">
-                <a:latin typeface="나눔고딕" panose="020B0600000101010101" charset="-127"/>
-                <a:ea typeface="나눔고딕" panose="020B0600000101010101" charset="-127"/>
-              </a:rPr>
-              <a:t>1. SUBQUERY </a:t>
-            </a:r>
-            <a:r>
-              <a:rPr lang="ko-KR" altLang="en-US" dirty="0">
-                <a:latin typeface="나눔고딕" panose="020B0600000101010101" charset="-127"/>
-                <a:ea typeface="나눔고딕" panose="020B0600000101010101" charset="-127"/>
-              </a:rPr>
-              <a:t>종류</a:t>
-            </a:r>
-          </a:p>
-        </p:txBody>
-      </p:sp>
-      <p:sp>
-        <p:nvSpPr>
-          <p:cNvPr id="3" name="슬라이드 번호 개체 틀 2">
-            <a:extLst>
-              <a:ext uri="{FF2B5EF4-FFF2-40B4-BE49-F238E27FC236}">
-                <a16:creationId xmlns:a16="http://schemas.microsoft.com/office/drawing/2014/main" id="{52605890-CC5B-48CD-9CC1-694880517276}"/>
-              </a:ext>
-            </a:extLst>
-          </p:cNvPr>
-          <p:cNvSpPr>
-            <a:spLocks noGrp="1"/>
-          </p:cNvSpPr>
-          <p:nvPr>
-            <p:ph type="sldNum" sz="quarter" idx="12"/>
-          </p:nvPr>
-        </p:nvSpPr>
-        <p:spPr/>
-        <p:txBody>
-          <a:bodyPr>
-            <a:normAutofit fontScale="92500"/>
-          </a:bodyPr>
-          <a:lstStyle/>
-          <a:p>
-            <a:fld id="{EBB166B3-33A6-45CA-B81B-F13BE7654232}" type="slidenum">
-              <a:rPr lang="ko-KR" altLang="en-US" smtClean="0">
-                <a:latin typeface="나눔고딕" panose="020B0600000101010101" charset="-127"/>
-                <a:ea typeface="나눔고딕" panose="020B0600000101010101" charset="-127"/>
-              </a:rPr>
-              <a:t>2</a:t>
-            </a:fld>
-            <a:endParaRPr lang="ko-KR" altLang="en-US">
-              <a:latin typeface="나눔고딕" panose="020B0600000101010101" charset="-127"/>
-              <a:ea typeface="나눔고딕" panose="020B0600000101010101" charset="-127"/>
-            </a:endParaRPr>
-          </a:p>
-        </p:txBody>
-      </p:sp>
-      <p:sp>
-        <p:nvSpPr>
-          <p:cNvPr id="47" name="텍스트 개체 틀 3">
-            <a:extLst>
-              <a:ext uri="{FF2B5EF4-FFF2-40B4-BE49-F238E27FC236}">
-                <a16:creationId xmlns:a16="http://schemas.microsoft.com/office/drawing/2014/main" id="{BD6E26C7-2547-444C-8643-2B2EEE99F2F4}"/>
-              </a:ext>
-            </a:extLst>
-          </p:cNvPr>
-          <p:cNvSpPr>
-            <a:spLocks noGrp="1"/>
-          </p:cNvSpPr>
-          <p:nvPr>
-            <p:ph type="body" sz="quarter" idx="13"/>
-          </p:nvPr>
-        </p:nvSpPr>
-        <p:spPr>
-          <a:xfrm>
-            <a:off x="6747393" y="62621"/>
-            <a:ext cx="2822735" cy="390525"/>
-          </a:xfrm>
-        </p:spPr>
-        <p:txBody>
-          <a:bodyPr/>
-          <a:lstStyle/>
-          <a:p>
-            <a:r>
-              <a:rPr lang="en-US" altLang="ko-KR" dirty="0">
-                <a:latin typeface="나눔고딕" panose="020B0600000101010101" charset="-127"/>
-                <a:ea typeface="나눔고딕" panose="020B0600000101010101" charset="-127"/>
-              </a:rPr>
-              <a:t>Ⅰ. SUBQUERY </a:t>
-            </a:r>
-            <a:r>
-              <a:rPr lang="ko-KR" altLang="en-US" dirty="0">
-                <a:latin typeface="나눔고딕" panose="020B0600000101010101" charset="-127"/>
-                <a:ea typeface="나눔고딕" panose="020B0600000101010101" charset="-127"/>
-              </a:rPr>
-              <a:t>종류와 활용</a:t>
-            </a:r>
-          </a:p>
-        </p:txBody>
-      </p:sp>
-      <p:sp>
-        <p:nvSpPr>
-          <p:cNvPr id="4" name="TextBox 3">
-            <a:extLst>
-              <a:ext uri="{FF2B5EF4-FFF2-40B4-BE49-F238E27FC236}">
-                <a16:creationId xmlns:a16="http://schemas.microsoft.com/office/drawing/2014/main" id="{AADEDC90-8739-4034-9C72-9415D8188AB0}"/>
-              </a:ext>
-            </a:extLst>
-          </p:cNvPr>
-          <p:cNvSpPr txBox="1"/>
-          <p:nvPr/>
-        </p:nvSpPr>
-        <p:spPr>
-          <a:xfrm>
-            <a:off x="363984" y="855677"/>
-            <a:ext cx="8356839" cy="1441613"/>
-          </a:xfrm>
-          <a:prstGeom prst="rect">
-            <a:avLst/>
-          </a:prstGeom>
-          <a:noFill/>
-        </p:spPr>
-        <p:txBody>
-          <a:bodyPr wrap="none" rtlCol="0">
-            <a:spAutoFit/>
-          </a:bodyPr>
-          <a:lstStyle/>
-          <a:p>
-            <a:pPr marL="285750" indent="-285750">
-              <a:lnSpc>
-                <a:spcPct val="150000"/>
-              </a:lnSpc>
-              <a:buFont typeface="Arial" panose="020B0604020202020204" pitchFamily="34" charset="0"/>
-              <a:buChar char="•"/>
-            </a:pPr>
-            <a:r>
-              <a:rPr lang="en-US" altLang="ko-KR" sz="1200" dirty="0"/>
-              <a:t>SUBQUERY(</a:t>
-            </a:r>
-            <a:r>
-              <a:rPr lang="ko-KR" altLang="en-US" sz="1200" dirty="0" err="1"/>
-              <a:t>서브쿼리</a:t>
-            </a:r>
-            <a:r>
-              <a:rPr lang="en-US" altLang="ko-KR" sz="1200" dirty="0"/>
-              <a:t>) : </a:t>
-            </a:r>
-            <a:r>
-              <a:rPr lang="ko-KR" altLang="en-US" sz="1200" dirty="0"/>
-              <a:t>하나의 </a:t>
-            </a:r>
-            <a:r>
-              <a:rPr lang="en-US" altLang="ko-KR" sz="1200" dirty="0"/>
-              <a:t>SQL </a:t>
-            </a:r>
-            <a:r>
-              <a:rPr lang="ko-KR" altLang="en-US" sz="1200" dirty="0"/>
-              <a:t>문장 내에서 괄호로 묶인 별도의 </a:t>
-            </a:r>
-            <a:r>
-              <a:rPr lang="en-US" altLang="ko-KR" sz="1200" dirty="0"/>
-              <a:t>Query Block(</a:t>
-            </a:r>
-            <a:r>
-              <a:rPr lang="ko-KR" altLang="en-US" sz="1200" dirty="0"/>
-              <a:t>쿼리 블록</a:t>
-            </a:r>
-            <a:r>
-              <a:rPr lang="en-US" altLang="ko-KR" sz="1200" dirty="0"/>
-              <a:t>)</a:t>
-            </a:r>
-          </a:p>
-          <a:p>
-            <a:pPr marL="285750" indent="-285750">
-              <a:lnSpc>
-                <a:spcPct val="150000"/>
-              </a:lnSpc>
-              <a:buFont typeface="Arial" panose="020B0604020202020204" pitchFamily="34" charset="0"/>
-              <a:buChar char="•"/>
-            </a:pPr>
-            <a:r>
-              <a:rPr lang="ko-KR" altLang="en-US" sz="1200" dirty="0" err="1"/>
-              <a:t>서브쿼리</a:t>
-            </a:r>
-            <a:r>
-              <a:rPr lang="ko-KR" altLang="en-US" sz="1200" dirty="0"/>
-              <a:t> 종류</a:t>
-            </a:r>
-            <a:endParaRPr lang="en-US" altLang="ko-KR" sz="1200" dirty="0"/>
-          </a:p>
-          <a:p>
-            <a:pPr>
-              <a:lnSpc>
-                <a:spcPct val="150000"/>
-              </a:lnSpc>
-            </a:pPr>
-            <a:r>
-              <a:rPr lang="en-US" altLang="ko-KR" sz="1200" dirty="0"/>
-              <a:t>     1. SCALAR SUBQUERY : </a:t>
-            </a:r>
-            <a:r>
-              <a:rPr lang="ko-KR" altLang="en-US" sz="1200" dirty="0"/>
-              <a:t>한 레코드당 정확히 하나의 컬럼 </a:t>
-            </a:r>
-            <a:r>
-              <a:rPr lang="ko-KR" altLang="en-US" sz="1200" dirty="0" err="1"/>
-              <a:t>값만을</a:t>
-            </a:r>
-            <a:r>
-              <a:rPr lang="ko-KR" altLang="en-US" sz="1200" dirty="0"/>
-              <a:t> 반환하기 위해</a:t>
-            </a:r>
-            <a:r>
-              <a:rPr lang="en-US" altLang="ko-KR" sz="1200" dirty="0"/>
-              <a:t>, </a:t>
-            </a:r>
-            <a:r>
-              <a:rPr lang="ko-KR" altLang="en-US" sz="1200" dirty="0"/>
-              <a:t>주로 </a:t>
-            </a:r>
-            <a:r>
-              <a:rPr lang="en-US" altLang="ko-KR" sz="1200" dirty="0"/>
-              <a:t>SELECT</a:t>
-            </a:r>
-            <a:r>
-              <a:rPr lang="ko-KR" altLang="en-US" sz="1200" dirty="0"/>
-              <a:t>절에 사용된 </a:t>
-            </a:r>
-            <a:r>
-              <a:rPr lang="ko-KR" altLang="en-US" sz="1200" dirty="0" err="1"/>
-              <a:t>서브쿼리</a:t>
-            </a:r>
-            <a:endParaRPr lang="en-US" altLang="ko-KR" sz="1200" dirty="0"/>
-          </a:p>
-          <a:p>
-            <a:pPr>
-              <a:lnSpc>
-                <a:spcPct val="150000"/>
-              </a:lnSpc>
-            </a:pPr>
-            <a:r>
-              <a:rPr lang="en-US" altLang="ko-KR" sz="1200" dirty="0"/>
-              <a:t>     2. INLINE VIEW          : FROM</a:t>
-            </a:r>
-            <a:r>
-              <a:rPr lang="ko-KR" altLang="en-US" sz="1200" dirty="0"/>
-              <a:t>절에 나타나는 </a:t>
-            </a:r>
-            <a:r>
-              <a:rPr lang="ko-KR" altLang="en-US" sz="1200" dirty="0" err="1"/>
-              <a:t>서브쿼리</a:t>
-            </a:r>
-            <a:endParaRPr lang="en-US" altLang="ko-KR" sz="1200" dirty="0"/>
-          </a:p>
-          <a:p>
-            <a:pPr>
-              <a:lnSpc>
-                <a:spcPct val="150000"/>
-              </a:lnSpc>
-            </a:pPr>
-            <a:r>
-              <a:rPr lang="en-US" altLang="ko-KR" sz="1200" dirty="0"/>
-              <a:t>     3. NESTED SUBQUERY : </a:t>
-            </a:r>
-            <a:r>
-              <a:rPr lang="ko-KR" altLang="en-US" sz="1200" dirty="0"/>
-              <a:t>결과집합을 한정하기 위해 </a:t>
-            </a:r>
-            <a:r>
-              <a:rPr lang="en-US" altLang="ko-KR" sz="1200" dirty="0"/>
-              <a:t>WHERE</a:t>
-            </a:r>
-            <a:r>
-              <a:rPr lang="ko-KR" altLang="en-US" sz="1200" dirty="0"/>
-              <a:t>절에 사용된 </a:t>
-            </a:r>
-            <a:r>
-              <a:rPr lang="ko-KR" altLang="en-US" sz="1200" dirty="0" err="1"/>
-              <a:t>서브쿼리</a:t>
-            </a:r>
-            <a:r>
-              <a:rPr lang="en-US" altLang="ko-KR" sz="1200" dirty="0"/>
-              <a:t> </a:t>
-            </a:r>
-          </a:p>
-        </p:txBody>
-      </p:sp>
-      <p:grpSp>
-        <p:nvGrpSpPr>
-          <p:cNvPr id="13" name="그룹 12">
-            <a:extLst>
-              <a:ext uri="{FF2B5EF4-FFF2-40B4-BE49-F238E27FC236}">
-                <a16:creationId xmlns:a16="http://schemas.microsoft.com/office/drawing/2014/main" id="{15D4348A-13E5-4356-9401-5115AAB051B7}"/>
-              </a:ext>
-            </a:extLst>
-          </p:cNvPr>
-          <p:cNvGrpSpPr/>
-          <p:nvPr/>
-        </p:nvGrpSpPr>
-        <p:grpSpPr>
-          <a:xfrm>
-            <a:off x="606847" y="2699821"/>
-            <a:ext cx="6419850" cy="3218633"/>
-            <a:chOff x="481012" y="2672451"/>
-            <a:chExt cx="6419850" cy="3218633"/>
-          </a:xfrm>
-        </p:grpSpPr>
-        <p:pic>
-          <p:nvPicPr>
-            <p:cNvPr id="8" name="그림 7">
-              <a:extLst>
-                <a:ext uri="{FF2B5EF4-FFF2-40B4-BE49-F238E27FC236}">
-                  <a16:creationId xmlns:a16="http://schemas.microsoft.com/office/drawing/2014/main" id="{802A8635-5B4A-451C-A384-D99B63ED2245}"/>
-                </a:ext>
-              </a:extLst>
-            </p:cNvPr>
-            <p:cNvPicPr>
-              <a:picLocks noChangeAspect="1"/>
-            </p:cNvPicPr>
-            <p:nvPr/>
-          </p:nvPicPr>
-          <p:blipFill>
-            <a:blip r:embed="rId2"/>
-            <a:stretch>
-              <a:fillRect/>
-            </a:stretch>
-          </p:blipFill>
-          <p:spPr>
-            <a:xfrm>
-              <a:off x="481012" y="2672451"/>
-              <a:ext cx="6353175" cy="885825"/>
-            </a:xfrm>
-            <a:prstGeom prst="rect">
-              <a:avLst/>
-            </a:prstGeom>
-          </p:spPr>
-        </p:pic>
-        <p:pic>
-          <p:nvPicPr>
-            <p:cNvPr id="10" name="그림 9">
-              <a:extLst>
-                <a:ext uri="{FF2B5EF4-FFF2-40B4-BE49-F238E27FC236}">
-                  <a16:creationId xmlns:a16="http://schemas.microsoft.com/office/drawing/2014/main" id="{4B15A1DF-909F-4835-BAEC-EF472779AFA1}"/>
-                </a:ext>
-              </a:extLst>
-            </p:cNvPr>
-            <p:cNvPicPr>
-              <a:picLocks noChangeAspect="1"/>
-            </p:cNvPicPr>
-            <p:nvPr/>
-          </p:nvPicPr>
-          <p:blipFill>
-            <a:blip r:embed="rId3"/>
-            <a:stretch>
-              <a:fillRect/>
-            </a:stretch>
-          </p:blipFill>
-          <p:spPr>
-            <a:xfrm>
-              <a:off x="481012" y="3876955"/>
-              <a:ext cx="6419850" cy="800100"/>
-            </a:xfrm>
-            <a:prstGeom prst="rect">
-              <a:avLst/>
-            </a:prstGeom>
-          </p:spPr>
-        </p:pic>
-        <p:pic>
-          <p:nvPicPr>
-            <p:cNvPr id="12" name="그림 11">
-              <a:extLst>
-                <a:ext uri="{FF2B5EF4-FFF2-40B4-BE49-F238E27FC236}">
-                  <a16:creationId xmlns:a16="http://schemas.microsoft.com/office/drawing/2014/main" id="{8678A0D3-98F3-4E09-9B16-8F5E56A6FE21}"/>
-                </a:ext>
-              </a:extLst>
-            </p:cNvPr>
-            <p:cNvPicPr>
-              <a:picLocks noChangeAspect="1"/>
-            </p:cNvPicPr>
-            <p:nvPr/>
-          </p:nvPicPr>
-          <p:blipFill>
-            <a:blip r:embed="rId4"/>
-            <a:stretch>
-              <a:fillRect/>
-            </a:stretch>
-          </p:blipFill>
-          <p:spPr>
-            <a:xfrm>
-              <a:off x="547687" y="4995734"/>
-              <a:ext cx="6286500" cy="895350"/>
-            </a:xfrm>
-            <a:prstGeom prst="rect">
-              <a:avLst/>
-            </a:prstGeom>
-          </p:spPr>
-        </p:pic>
-      </p:grpSp>
-    </p:spTree>
-    <p:extLst>
-      <p:ext uri="{BB962C8B-B14F-4D97-AF65-F5344CB8AC3E}">
-        <p14:creationId xmlns:p14="http://schemas.microsoft.com/office/powerpoint/2010/main" val="2328535874"/>
-      </p:ext>
-    </p:extLst>
-  </p:cSld>
-  <p:clrMapOvr>
-    <a:masterClrMapping/>
-  </p:clrMapOvr>
-</p:sld>
-</file>
-
-<file path=ppt/slides/slide30.xml><?xml version="1.0" encoding="utf-8"?>
-<p:sld xmlns:a="http://schemas.openxmlformats.org/drawingml/2006/main" xmlns:r="http://schemas.openxmlformats.org/officeDocument/2006/relationships" xmlns:p="http://schemas.openxmlformats.org/presentationml/2006/main">
-  <p:cSld>
-    <p:spTree>
-      <p:nvGrpSpPr>
-        <p:cNvPr id="1" name=""/>
-        <p:cNvGrpSpPr/>
-        <p:nvPr/>
-      </p:nvGrpSpPr>
-      <p:grpSpPr>
-        <a:xfrm>
-          <a:off x="0" y="0"/>
-          <a:ext cx="0" cy="0"/>
-          <a:chOff x="0" y="0"/>
-          <a:chExt cx="0" cy="0"/>
-        </a:xfrm>
-      </p:grpSpPr>
-      <p:sp>
-        <p:nvSpPr>
-          <p:cNvPr id="47" name="텍스트 개체 틀 3">
-            <a:extLst>
-              <a:ext uri="{FF2B5EF4-FFF2-40B4-BE49-F238E27FC236}">
-                <a16:creationId xmlns:a16="http://schemas.microsoft.com/office/drawing/2014/main" id="{BD6E26C7-2547-444C-8643-2B2EEE99F2F4}"/>
-              </a:ext>
-            </a:extLst>
-          </p:cNvPr>
-          <p:cNvSpPr>
-            <a:spLocks noGrp="1"/>
-          </p:cNvSpPr>
-          <p:nvPr>
-            <p:ph type="body" sz="quarter" idx="13"/>
-          </p:nvPr>
-        </p:nvSpPr>
-        <p:spPr>
-          <a:xfrm>
-            <a:off x="6747393" y="62621"/>
-            <a:ext cx="2822735" cy="390525"/>
-          </a:xfrm>
-        </p:spPr>
-        <p:txBody>
-          <a:bodyPr/>
-          <a:lstStyle/>
-          <a:p>
-            <a:r>
-              <a:rPr lang="en-US" altLang="ko-KR" dirty="0">
-                <a:latin typeface="나눔고딕" panose="020D0604000000000000" pitchFamily="50" charset="-127"/>
-                <a:ea typeface="나눔고딕" panose="020D0604000000000000" pitchFamily="50" charset="-127"/>
-              </a:rPr>
-              <a:t>Ⅱ. </a:t>
-            </a:r>
-            <a:r>
-              <a:rPr lang="ko-KR" altLang="en-US" dirty="0">
-                <a:latin typeface="나눔고딕" panose="020D0604000000000000" pitchFamily="50" charset="-127"/>
-                <a:ea typeface="나눔고딕" panose="020D0604000000000000" pitchFamily="50" charset="-127"/>
-              </a:rPr>
-              <a:t>실행계획</a:t>
-            </a:r>
-          </a:p>
-        </p:txBody>
-      </p:sp>
-      <p:sp>
-        <p:nvSpPr>
-          <p:cNvPr id="14" name="슬라이드 번호 개체 틀 2">
-            <a:extLst>
-              <a:ext uri="{FF2B5EF4-FFF2-40B4-BE49-F238E27FC236}">
-                <a16:creationId xmlns:a16="http://schemas.microsoft.com/office/drawing/2014/main" id="{E3626C26-BF47-4717-80D4-21BA55993E00}"/>
-              </a:ext>
-            </a:extLst>
-          </p:cNvPr>
-          <p:cNvSpPr>
-            <a:spLocks noGrp="1"/>
-          </p:cNvSpPr>
-          <p:nvPr>
-            <p:ph type="sldNum" sz="quarter" idx="12"/>
-          </p:nvPr>
-        </p:nvSpPr>
-        <p:spPr>
-          <a:xfrm>
-            <a:off x="4439346" y="6528442"/>
-            <a:ext cx="1029301" cy="276999"/>
-          </a:xfrm>
-        </p:spPr>
-        <p:txBody>
-          <a:bodyPr>
-            <a:normAutofit fontScale="92500"/>
-          </a:bodyPr>
-          <a:lstStyle/>
-          <a:p>
-            <a:fld id="{EBB166B3-33A6-45CA-B81B-F13BE7654232}" type="slidenum">
-              <a:rPr lang="ko-KR" altLang="en-US" smtClean="0">
-                <a:latin typeface="나눔고딕" panose="020B0600000101010101" charset="-127"/>
-                <a:ea typeface="나눔고딕" panose="020B0600000101010101" charset="-127"/>
-              </a:rPr>
-              <a:t>29</a:t>
-            </a:fld>
-            <a:endParaRPr lang="ko-KR" altLang="en-US" dirty="0">
-              <a:latin typeface="나눔고딕" panose="020B0600000101010101" charset="-127"/>
-              <a:ea typeface="나눔고딕" panose="020B0600000101010101" charset="-127"/>
-            </a:endParaRPr>
-          </a:p>
-        </p:txBody>
-      </p:sp>
-      <p:sp>
-        <p:nvSpPr>
-          <p:cNvPr id="3" name="TextBox 2">
-            <a:extLst>
-              <a:ext uri="{FF2B5EF4-FFF2-40B4-BE49-F238E27FC236}">
-                <a16:creationId xmlns:a16="http://schemas.microsoft.com/office/drawing/2014/main" id="{43BD4B0A-C817-40FC-8794-1A803D7B2883}"/>
-              </a:ext>
-            </a:extLst>
-          </p:cNvPr>
-          <p:cNvSpPr txBox="1"/>
-          <p:nvPr/>
-        </p:nvSpPr>
-        <p:spPr>
-          <a:xfrm>
-            <a:off x="217129" y="861850"/>
-            <a:ext cx="9688871" cy="3354573"/>
-          </a:xfrm>
-          <a:prstGeom prst="rect">
-            <a:avLst/>
-          </a:prstGeom>
-          <a:noFill/>
-        </p:spPr>
-        <p:txBody>
-          <a:bodyPr wrap="none" rtlCol="0">
-            <a:spAutoFit/>
-          </a:bodyPr>
-          <a:lstStyle/>
-          <a:p>
-            <a:pPr marL="285750" indent="-285750">
-              <a:lnSpc>
-                <a:spcPct val="150000"/>
-              </a:lnSpc>
-              <a:buFont typeface="Arial" panose="020B0604020202020204" pitchFamily="34" charset="0"/>
-              <a:buChar char="•"/>
-            </a:pPr>
-            <a:r>
-              <a:rPr lang="en-US" altLang="ko-KR" sz="1300" dirty="0"/>
-              <a:t>INDEX SCAN</a:t>
-            </a:r>
-            <a:r>
-              <a:rPr lang="ko-KR" altLang="en-US" sz="1300" dirty="0"/>
-              <a:t>을 선택하는 경우</a:t>
-            </a:r>
-            <a:endParaRPr lang="en-US" altLang="ko-KR" sz="1300" dirty="0"/>
-          </a:p>
-          <a:p>
-            <a:pPr>
-              <a:lnSpc>
-                <a:spcPct val="150000"/>
-              </a:lnSpc>
-            </a:pPr>
-            <a:r>
-              <a:rPr lang="en-US" altLang="ko-KR" sz="1300" dirty="0"/>
-              <a:t>     1. INDEX UNIQUE SCAN : UNIQUE INDEX</a:t>
-            </a:r>
-            <a:r>
-              <a:rPr lang="ko-KR" altLang="en-US" sz="1300" dirty="0"/>
-              <a:t>를 이용하여</a:t>
-            </a:r>
-            <a:r>
-              <a:rPr lang="en-US" altLang="ko-KR" sz="1300" dirty="0"/>
-              <a:t>, </a:t>
-            </a:r>
-            <a:r>
-              <a:rPr lang="ko-KR" altLang="en-US" sz="1300" dirty="0"/>
-              <a:t>데이터 블록에 접근</a:t>
-            </a:r>
-            <a:endParaRPr lang="en-US" altLang="ko-KR" sz="1300" dirty="0"/>
-          </a:p>
-          <a:p>
-            <a:pPr>
-              <a:lnSpc>
-                <a:spcPct val="150000"/>
-              </a:lnSpc>
-            </a:pPr>
-            <a:r>
-              <a:rPr lang="en-US" altLang="ko-KR" sz="1300" dirty="0"/>
-              <a:t>                                       </a:t>
-            </a:r>
-            <a:r>
-              <a:rPr lang="ko-KR" altLang="en-US" sz="1300" dirty="0"/>
-              <a:t>한 건 이하의 </a:t>
-            </a:r>
-            <a:r>
-              <a:rPr lang="en-US" altLang="ko-KR" sz="1300" dirty="0"/>
-              <a:t>ROWID</a:t>
-            </a:r>
-            <a:r>
-              <a:rPr lang="ko-KR" altLang="en-US" sz="1300" dirty="0"/>
-              <a:t>를 반환하는 방식</a:t>
-            </a:r>
-            <a:endParaRPr lang="en-US" altLang="ko-KR" sz="1300" dirty="0"/>
-          </a:p>
-          <a:p>
-            <a:pPr>
-              <a:lnSpc>
-                <a:spcPct val="150000"/>
-              </a:lnSpc>
-            </a:pPr>
-            <a:r>
-              <a:rPr lang="en-US" altLang="ko-KR" sz="1300" dirty="0"/>
-              <a:t>                                       </a:t>
-            </a:r>
-            <a:r>
-              <a:rPr lang="en-US" altLang="ko-KR" sz="1300" b="1" dirty="0">
-                <a:solidFill>
-                  <a:srgbClr val="FF0000"/>
-                </a:solidFill>
-              </a:rPr>
-              <a:t>UNIQUE INDEX</a:t>
-            </a:r>
-            <a:r>
-              <a:rPr lang="ko-KR" altLang="en-US" sz="1300" b="1" dirty="0">
-                <a:solidFill>
-                  <a:srgbClr val="FF0000"/>
-                </a:solidFill>
-              </a:rPr>
-              <a:t>를 구성하는 모든 컬럼이 조건절에 </a:t>
-            </a:r>
-            <a:r>
-              <a:rPr lang="en-US" altLang="ko-KR" sz="1300" b="1" dirty="0">
-                <a:solidFill>
-                  <a:srgbClr val="FF0000"/>
-                </a:solidFill>
-              </a:rPr>
-              <a:t>‘=‘</a:t>
-            </a:r>
-            <a:r>
-              <a:rPr lang="ko-KR" altLang="en-US" sz="1300" b="1" dirty="0">
-                <a:solidFill>
-                  <a:srgbClr val="FF0000"/>
-                </a:solidFill>
-              </a:rPr>
-              <a:t>로 명시된 경우 발생</a:t>
-            </a:r>
-            <a:endParaRPr lang="en-US" altLang="ko-KR" sz="1300" b="1" dirty="0">
-              <a:solidFill>
-                <a:srgbClr val="FF0000"/>
-              </a:solidFill>
-            </a:endParaRPr>
-          </a:p>
-          <a:p>
-            <a:pPr>
-              <a:lnSpc>
-                <a:spcPct val="150000"/>
-              </a:lnSpc>
-            </a:pPr>
-            <a:r>
-              <a:rPr lang="en-US" altLang="ko-KR" sz="1300" dirty="0"/>
-              <a:t>     2. INDEX RANGE SCAN : INDEX</a:t>
-            </a:r>
-            <a:r>
-              <a:rPr lang="ko-KR" altLang="en-US" sz="1300" dirty="0"/>
-              <a:t>를 이용한 데이터 블록 접근 중</a:t>
-            </a:r>
-            <a:r>
-              <a:rPr lang="en-US" altLang="ko-KR" sz="1300" dirty="0"/>
-              <a:t>, </a:t>
-            </a:r>
-            <a:r>
-              <a:rPr lang="ko-KR" altLang="en-US" sz="1300" dirty="0"/>
-              <a:t>가장 일반적인 방식</a:t>
-            </a:r>
-            <a:endParaRPr lang="en-US" altLang="ko-KR" sz="1300" dirty="0"/>
-          </a:p>
-          <a:p>
-            <a:pPr>
-              <a:lnSpc>
-                <a:spcPct val="150000"/>
-              </a:lnSpc>
-            </a:pPr>
-            <a:r>
-              <a:rPr lang="en-US" altLang="ko-KR" sz="1300" dirty="0"/>
-              <a:t> 	                      INDEX</a:t>
-            </a:r>
-            <a:r>
-              <a:rPr lang="ko-KR" altLang="en-US" sz="1300" dirty="0"/>
-              <a:t>를 구성하는 선두 컬럼에 대해 범위 검색을 하는 방식</a:t>
-            </a:r>
-            <a:endParaRPr lang="en-US" altLang="ko-KR" sz="1300" dirty="0"/>
-          </a:p>
-          <a:p>
-            <a:pPr>
-              <a:lnSpc>
-                <a:spcPct val="150000"/>
-              </a:lnSpc>
-            </a:pPr>
-            <a:r>
-              <a:rPr lang="en-US" altLang="ko-KR" sz="1300" dirty="0"/>
-              <a:t>                                     </a:t>
-            </a:r>
-            <a:r>
-              <a:rPr lang="en-US" altLang="ko-KR" sz="1300" b="1" dirty="0">
-                <a:solidFill>
-                  <a:srgbClr val="FF0000"/>
-                </a:solidFill>
-              </a:rPr>
-              <a:t>INDEX</a:t>
-            </a:r>
-            <a:r>
-              <a:rPr lang="ko-KR" altLang="en-US" sz="1300" b="1" dirty="0">
-                <a:solidFill>
-                  <a:srgbClr val="FF0000"/>
-                </a:solidFill>
-              </a:rPr>
-              <a:t>를 구성하는 선두 컬럼이 조건절에 비교연산</a:t>
-            </a:r>
-            <a:r>
-              <a:rPr lang="en-US" altLang="ko-KR" sz="1300" b="1" dirty="0">
-                <a:solidFill>
-                  <a:srgbClr val="FF0000"/>
-                </a:solidFill>
-              </a:rPr>
-              <a:t>(&lt;, &gt;, BETWEEN, LIKE)</a:t>
-            </a:r>
-            <a:r>
-              <a:rPr lang="ko-KR" altLang="en-US" sz="1300" b="1" dirty="0">
-                <a:solidFill>
-                  <a:srgbClr val="FF0000"/>
-                </a:solidFill>
-              </a:rPr>
-              <a:t>되어질 때</a:t>
-            </a:r>
-            <a:r>
-              <a:rPr lang="en-US" altLang="ko-KR" sz="1300" b="1" dirty="0">
-                <a:solidFill>
-                  <a:srgbClr val="FF0000"/>
-                </a:solidFill>
-              </a:rPr>
-              <a:t>, </a:t>
-            </a:r>
-            <a:r>
-              <a:rPr lang="ko-KR" altLang="en-US" sz="1300" b="1" dirty="0">
-                <a:solidFill>
-                  <a:srgbClr val="FF0000"/>
-                </a:solidFill>
-              </a:rPr>
-              <a:t>이 방식으로</a:t>
-            </a:r>
-            <a:endParaRPr lang="en-US" altLang="ko-KR" sz="1300" b="1" dirty="0">
-              <a:solidFill>
-                <a:srgbClr val="FF0000"/>
-              </a:solidFill>
-            </a:endParaRPr>
-          </a:p>
-          <a:p>
-            <a:pPr>
-              <a:lnSpc>
-                <a:spcPct val="150000"/>
-              </a:lnSpc>
-            </a:pPr>
-            <a:r>
-              <a:rPr lang="en-US" altLang="ko-KR" sz="1300" b="1" dirty="0">
-                <a:solidFill>
-                  <a:srgbClr val="FF0000"/>
-                </a:solidFill>
-              </a:rPr>
-              <a:t>                                     </a:t>
-            </a:r>
-            <a:r>
-              <a:rPr lang="ko-KR" altLang="en-US" sz="1300" b="1" dirty="0">
-                <a:solidFill>
-                  <a:srgbClr val="FF0000"/>
-                </a:solidFill>
-              </a:rPr>
-              <a:t>처리됨</a:t>
-            </a:r>
-            <a:endParaRPr lang="en-US" altLang="ko-KR" sz="1300" b="1" dirty="0">
-              <a:solidFill>
-                <a:srgbClr val="FF0000"/>
-              </a:solidFill>
-            </a:endParaRPr>
-          </a:p>
-          <a:p>
-            <a:pPr>
-              <a:lnSpc>
-                <a:spcPct val="150000"/>
-              </a:lnSpc>
-            </a:pPr>
-            <a:r>
-              <a:rPr lang="en-US" altLang="ko-KR" sz="1300" dirty="0"/>
-              <a:t>     3. INDEX FULL SCAN    : </a:t>
-            </a:r>
-            <a:r>
-              <a:rPr lang="ko-KR" altLang="en-US" sz="1300" dirty="0"/>
-              <a:t>최적의 </a:t>
-            </a:r>
-            <a:r>
-              <a:rPr lang="en-US" altLang="ko-KR" sz="1300" dirty="0"/>
-              <a:t>INDEX</a:t>
-            </a:r>
-            <a:r>
-              <a:rPr lang="ko-KR" altLang="en-US" sz="1300" dirty="0"/>
-              <a:t>가 없을 때</a:t>
-            </a:r>
-            <a:r>
-              <a:rPr lang="en-US" altLang="ko-KR" sz="1300" dirty="0"/>
-              <a:t>, </a:t>
-            </a:r>
-            <a:r>
-              <a:rPr lang="ko-KR" altLang="en-US" sz="1300" dirty="0"/>
-              <a:t>차선으로 선택되는 방식</a:t>
-            </a:r>
-            <a:endParaRPr lang="en-US" altLang="ko-KR" sz="1300" dirty="0"/>
-          </a:p>
-          <a:p>
-            <a:pPr>
-              <a:lnSpc>
-                <a:spcPct val="150000"/>
-              </a:lnSpc>
-            </a:pPr>
-            <a:r>
-              <a:rPr lang="en-US" altLang="ko-KR" sz="1300" dirty="0"/>
-              <a:t>                                     </a:t>
-            </a:r>
-            <a:r>
-              <a:rPr lang="en-US" altLang="ko-KR" sz="1300" b="1" dirty="0">
-                <a:solidFill>
-                  <a:srgbClr val="FF0000"/>
-                </a:solidFill>
-              </a:rPr>
-              <a:t>INEDX </a:t>
-            </a:r>
-            <a:r>
-              <a:rPr lang="ko-KR" altLang="en-US" sz="1300" b="1" dirty="0">
-                <a:solidFill>
-                  <a:srgbClr val="FF0000"/>
-                </a:solidFill>
-              </a:rPr>
-              <a:t>선두 컬럼이 조건절에 없으면</a:t>
-            </a:r>
-            <a:r>
-              <a:rPr lang="en-US" altLang="ko-KR" sz="1300" b="1" dirty="0">
-                <a:solidFill>
-                  <a:srgbClr val="FF0000"/>
-                </a:solidFill>
-              </a:rPr>
-              <a:t> TABLE FULL SCAN</a:t>
-            </a:r>
-            <a:r>
-              <a:rPr lang="ko-KR" altLang="en-US" sz="1300" b="1" dirty="0">
-                <a:solidFill>
-                  <a:srgbClr val="FF0000"/>
-                </a:solidFill>
-              </a:rPr>
-              <a:t>을 고려</a:t>
-            </a:r>
-            <a:r>
-              <a:rPr lang="ko-KR" altLang="en-US" sz="1300" dirty="0"/>
-              <a:t>하나</a:t>
-            </a:r>
-            <a:r>
-              <a:rPr lang="en-US" altLang="ko-KR" sz="1300" dirty="0"/>
-              <a:t>, TABLE FULL SCAN</a:t>
-            </a:r>
-            <a:r>
-              <a:rPr lang="ko-KR" altLang="en-US" sz="1300" dirty="0"/>
-              <a:t>보다 </a:t>
-            </a:r>
-            <a:r>
-              <a:rPr lang="en-US" altLang="ko-KR" sz="1300" dirty="0"/>
-              <a:t>I/O</a:t>
-            </a:r>
-            <a:r>
-              <a:rPr lang="ko-KR" altLang="en-US" sz="1300" dirty="0"/>
-              <a:t>를</a:t>
-            </a:r>
-            <a:endParaRPr lang="en-US" altLang="ko-KR" sz="1300" dirty="0"/>
-          </a:p>
-          <a:p>
-            <a:pPr>
-              <a:lnSpc>
-                <a:spcPct val="150000"/>
-              </a:lnSpc>
-            </a:pPr>
-            <a:r>
-              <a:rPr lang="en-US" altLang="ko-KR" sz="1300" dirty="0"/>
-              <a:t>                                     </a:t>
-            </a:r>
-            <a:r>
-              <a:rPr lang="ko-KR" altLang="en-US" sz="1300" dirty="0"/>
-              <a:t>줄일 수 있거나 정렬된 결과를 쉽게 얻을 수 있을 경우 선택</a:t>
-            </a:r>
-            <a:endParaRPr lang="en-US" altLang="ko-KR" sz="1300" dirty="0"/>
-          </a:p>
-        </p:txBody>
-      </p:sp>
-      <p:sp>
-        <p:nvSpPr>
-          <p:cNvPr id="16" name="제목 1">
-            <a:extLst>
-              <a:ext uri="{FF2B5EF4-FFF2-40B4-BE49-F238E27FC236}">
-                <a16:creationId xmlns:a16="http://schemas.microsoft.com/office/drawing/2014/main" id="{BDE76D3B-C372-4CA3-A4FD-33642B295B4F}"/>
-              </a:ext>
-            </a:extLst>
-          </p:cNvPr>
-          <p:cNvSpPr>
-            <a:spLocks noGrp="1"/>
-          </p:cNvSpPr>
-          <p:nvPr>
-            <p:ph type="title"/>
-          </p:nvPr>
-        </p:nvSpPr>
-        <p:spPr>
-          <a:xfrm>
-            <a:off x="363984" y="53269"/>
-            <a:ext cx="6587232" cy="408372"/>
-          </a:xfrm>
-        </p:spPr>
-        <p:txBody>
-          <a:bodyPr/>
-          <a:lstStyle/>
-          <a:p>
-            <a:r>
-              <a:rPr lang="en-US" altLang="ko-KR" dirty="0">
-                <a:latin typeface="나눔고딕" panose="020B0600000101010101" charset="-127"/>
-                <a:ea typeface="나눔고딕" panose="020B0600000101010101" charset="-127"/>
-              </a:rPr>
-              <a:t>5. INDEX SCAN </a:t>
-            </a:r>
-            <a:endParaRPr lang="ko-KR" altLang="en-US" dirty="0">
-              <a:latin typeface="나눔고딕" panose="020B0600000101010101" charset="-127"/>
-              <a:ea typeface="나눔고딕" panose="020B0600000101010101" charset="-127"/>
-            </a:endParaRPr>
-          </a:p>
-        </p:txBody>
-      </p:sp>
-    </p:spTree>
-    <p:extLst>
-      <p:ext uri="{BB962C8B-B14F-4D97-AF65-F5344CB8AC3E}">
-        <p14:creationId xmlns:p14="http://schemas.microsoft.com/office/powerpoint/2010/main" val="4237486263"/>
-      </p:ext>
-    </p:extLst>
-  </p:cSld>
-  <p:clrMapOvr>
-    <a:masterClrMapping/>
-  </p:clrMapOvr>
-</p:sld>
-</file>
-
 <file path=ppt/slides/slide31.xml><?xml version="1.0" encoding="utf-8"?>
 <p:sld xmlns:a="http://schemas.openxmlformats.org/drawingml/2006/main" xmlns:r="http://schemas.openxmlformats.org/officeDocument/2006/relationships" xmlns:p="http://schemas.openxmlformats.org/presentationml/2006/main">
   <p:cSld>
@@ -22495,41 +22112,6 @@
           <a:chExt cx="0" cy="0"/>
         </a:xfrm>
       </p:grpSpPr>
-      <p:sp>
-        <p:nvSpPr>
-          <p:cNvPr id="2" name="제목 1">
-            <a:extLst>
-              <a:ext uri="{FF2B5EF4-FFF2-40B4-BE49-F238E27FC236}">
-                <a16:creationId xmlns:a16="http://schemas.microsoft.com/office/drawing/2014/main" id="{F35C43C8-4428-4D97-87C2-6ACA5057AB6C}"/>
-              </a:ext>
-            </a:extLst>
-          </p:cNvPr>
-          <p:cNvSpPr>
-            <a:spLocks noGrp="1"/>
-          </p:cNvSpPr>
-          <p:nvPr>
-            <p:ph type="title"/>
-          </p:nvPr>
-        </p:nvSpPr>
-        <p:spPr/>
-        <p:txBody>
-          <a:bodyPr/>
-          <a:lstStyle/>
-          <a:p>
-            <a:r>
-              <a:rPr lang="en-US" altLang="ko-KR" dirty="0">
-                <a:latin typeface="나눔고딕" panose="020B0600000101010101" charset="-127"/>
-                <a:ea typeface="나눔고딕" panose="020B0600000101010101" charset="-127"/>
-              </a:rPr>
-              <a:t>6. ROWID SCAN</a:t>
-            </a:r>
-            <a:endParaRPr lang="ko-KR" altLang="en-US" dirty="0">
-              <a:latin typeface="나눔고딕" panose="020B0600000101010101" charset="-127"/>
-              <a:ea typeface="나눔고딕" panose="020B0600000101010101" charset="-127"/>
-            </a:endParaRPr>
-          </a:p>
-        </p:txBody>
-      </p:sp>
       <p:sp>
         <p:nvSpPr>
           <p:cNvPr id="47" name="텍스트 개체 틀 3">
@@ -22629,6 +22211,785 @@
         </p:nvSpPr>
         <p:spPr>
           <a:xfrm>
+            <a:off x="217129" y="861850"/>
+            <a:ext cx="9688871" cy="3354573"/>
+          </a:xfrm>
+          <a:prstGeom prst="rect">
+            <a:avLst/>
+          </a:prstGeom>
+          <a:noFill/>
+        </p:spPr>
+        <p:txBody>
+          <a:bodyPr wrap="none" rtlCol="0">
+            <a:spAutoFit/>
+          </a:bodyPr>
+          <a:lstStyle/>
+          <a:p>
+            <a:pPr marL="285750" indent="-285750">
+              <a:lnSpc>
+                <a:spcPct val="150000"/>
+              </a:lnSpc>
+              <a:buFont typeface="Arial" panose="020B0604020202020204" pitchFamily="34" charset="0"/>
+              <a:buChar char="•"/>
+            </a:pPr>
+            <a:r>
+              <a:rPr lang="en-US" altLang="ko-KR" sz="1300" dirty="0"/>
+              <a:t>INDEX SCAN</a:t>
+            </a:r>
+            <a:r>
+              <a:rPr lang="ko-KR" altLang="en-US" sz="1300" dirty="0"/>
+              <a:t>을 선택하는 경우</a:t>
+            </a:r>
+            <a:endParaRPr lang="en-US" altLang="ko-KR" sz="1300" dirty="0"/>
+          </a:p>
+          <a:p>
+            <a:pPr>
+              <a:lnSpc>
+                <a:spcPct val="150000"/>
+              </a:lnSpc>
+            </a:pPr>
+            <a:r>
+              <a:rPr lang="en-US" altLang="ko-KR" sz="1300" dirty="0"/>
+              <a:t>     1. INDEX UNIQUE SCAN : UNIQUE INDEX</a:t>
+            </a:r>
+            <a:r>
+              <a:rPr lang="ko-KR" altLang="en-US" sz="1300" dirty="0"/>
+              <a:t>를 이용하여</a:t>
+            </a:r>
+            <a:r>
+              <a:rPr lang="en-US" altLang="ko-KR" sz="1300" dirty="0"/>
+              <a:t>, </a:t>
+            </a:r>
+            <a:r>
+              <a:rPr lang="ko-KR" altLang="en-US" sz="1300" dirty="0"/>
+              <a:t>데이터 블록에 접근</a:t>
+            </a:r>
+            <a:endParaRPr lang="en-US" altLang="ko-KR" sz="1300" dirty="0"/>
+          </a:p>
+          <a:p>
+            <a:pPr>
+              <a:lnSpc>
+                <a:spcPct val="150000"/>
+              </a:lnSpc>
+            </a:pPr>
+            <a:r>
+              <a:rPr lang="en-US" altLang="ko-KR" sz="1300" dirty="0"/>
+              <a:t>                                       </a:t>
+            </a:r>
+            <a:r>
+              <a:rPr lang="ko-KR" altLang="en-US" sz="1300" dirty="0"/>
+              <a:t>한 건 이하의 </a:t>
+            </a:r>
+            <a:r>
+              <a:rPr lang="en-US" altLang="ko-KR" sz="1300" dirty="0"/>
+              <a:t>ROWID</a:t>
+            </a:r>
+            <a:r>
+              <a:rPr lang="ko-KR" altLang="en-US" sz="1300" dirty="0"/>
+              <a:t>를 반환하는 방식</a:t>
+            </a:r>
+            <a:endParaRPr lang="en-US" altLang="ko-KR" sz="1300" dirty="0"/>
+          </a:p>
+          <a:p>
+            <a:pPr>
+              <a:lnSpc>
+                <a:spcPct val="150000"/>
+              </a:lnSpc>
+            </a:pPr>
+            <a:r>
+              <a:rPr lang="en-US" altLang="ko-KR" sz="1300" dirty="0"/>
+              <a:t>                                       </a:t>
+            </a:r>
+            <a:r>
+              <a:rPr lang="en-US" altLang="ko-KR" sz="1300" b="1" dirty="0">
+                <a:solidFill>
+                  <a:srgbClr val="FF0000"/>
+                </a:solidFill>
+              </a:rPr>
+              <a:t>UNIQUE INDEX</a:t>
+            </a:r>
+            <a:r>
+              <a:rPr lang="ko-KR" altLang="en-US" sz="1300" b="1" dirty="0">
+                <a:solidFill>
+                  <a:srgbClr val="FF0000"/>
+                </a:solidFill>
+              </a:rPr>
+              <a:t>를 구성하는 모든 컬럼이 조건절에 </a:t>
+            </a:r>
+            <a:r>
+              <a:rPr lang="en-US" altLang="ko-KR" sz="1300" b="1" dirty="0">
+                <a:solidFill>
+                  <a:srgbClr val="FF0000"/>
+                </a:solidFill>
+              </a:rPr>
+              <a:t>‘=‘</a:t>
+            </a:r>
+            <a:r>
+              <a:rPr lang="ko-KR" altLang="en-US" sz="1300" b="1" dirty="0">
+                <a:solidFill>
+                  <a:srgbClr val="FF0000"/>
+                </a:solidFill>
+              </a:rPr>
+              <a:t>로 명시된 경우 발생</a:t>
+            </a:r>
+            <a:endParaRPr lang="en-US" altLang="ko-KR" sz="1300" b="1" dirty="0">
+              <a:solidFill>
+                <a:srgbClr val="FF0000"/>
+              </a:solidFill>
+            </a:endParaRPr>
+          </a:p>
+          <a:p>
+            <a:pPr>
+              <a:lnSpc>
+                <a:spcPct val="150000"/>
+              </a:lnSpc>
+            </a:pPr>
+            <a:r>
+              <a:rPr lang="en-US" altLang="ko-KR" sz="1300" dirty="0"/>
+              <a:t>     2. INDEX RANGE SCAN : INDEX</a:t>
+            </a:r>
+            <a:r>
+              <a:rPr lang="ko-KR" altLang="en-US" sz="1300" dirty="0"/>
+              <a:t>를 이용한 데이터 블록 접근 중</a:t>
+            </a:r>
+            <a:r>
+              <a:rPr lang="en-US" altLang="ko-KR" sz="1300" dirty="0"/>
+              <a:t>, </a:t>
+            </a:r>
+            <a:r>
+              <a:rPr lang="ko-KR" altLang="en-US" sz="1300" dirty="0"/>
+              <a:t>가장 일반적인 방식</a:t>
+            </a:r>
+            <a:endParaRPr lang="en-US" altLang="ko-KR" sz="1300" dirty="0"/>
+          </a:p>
+          <a:p>
+            <a:pPr>
+              <a:lnSpc>
+                <a:spcPct val="150000"/>
+              </a:lnSpc>
+            </a:pPr>
+            <a:r>
+              <a:rPr lang="en-US" altLang="ko-KR" sz="1300" dirty="0"/>
+              <a:t> 	                      INDEX</a:t>
+            </a:r>
+            <a:r>
+              <a:rPr lang="ko-KR" altLang="en-US" sz="1300" dirty="0"/>
+              <a:t>를 구성하는 선두 컬럼에 대해 범위 검색을 하는 방식</a:t>
+            </a:r>
+            <a:endParaRPr lang="en-US" altLang="ko-KR" sz="1300" dirty="0"/>
+          </a:p>
+          <a:p>
+            <a:pPr>
+              <a:lnSpc>
+                <a:spcPct val="150000"/>
+              </a:lnSpc>
+            </a:pPr>
+            <a:r>
+              <a:rPr lang="en-US" altLang="ko-KR" sz="1300" dirty="0"/>
+              <a:t>                                     </a:t>
+            </a:r>
+            <a:r>
+              <a:rPr lang="en-US" altLang="ko-KR" sz="1300" b="1" dirty="0">
+                <a:solidFill>
+                  <a:srgbClr val="FF0000"/>
+                </a:solidFill>
+              </a:rPr>
+              <a:t>INDEX</a:t>
+            </a:r>
+            <a:r>
+              <a:rPr lang="ko-KR" altLang="en-US" sz="1300" b="1" dirty="0">
+                <a:solidFill>
+                  <a:srgbClr val="FF0000"/>
+                </a:solidFill>
+              </a:rPr>
+              <a:t>를 구성하는 선두 컬럼이 조건절에 비교연산</a:t>
+            </a:r>
+            <a:r>
+              <a:rPr lang="en-US" altLang="ko-KR" sz="1300" b="1" dirty="0">
+                <a:solidFill>
+                  <a:srgbClr val="FF0000"/>
+                </a:solidFill>
+              </a:rPr>
+              <a:t>(&lt;, &gt;, BETWEEN, LIKE)</a:t>
+            </a:r>
+            <a:r>
+              <a:rPr lang="ko-KR" altLang="en-US" sz="1300" b="1" dirty="0">
+                <a:solidFill>
+                  <a:srgbClr val="FF0000"/>
+                </a:solidFill>
+              </a:rPr>
+              <a:t>되어질 때</a:t>
+            </a:r>
+            <a:r>
+              <a:rPr lang="en-US" altLang="ko-KR" sz="1300" b="1" dirty="0">
+                <a:solidFill>
+                  <a:srgbClr val="FF0000"/>
+                </a:solidFill>
+              </a:rPr>
+              <a:t>, </a:t>
+            </a:r>
+            <a:r>
+              <a:rPr lang="ko-KR" altLang="en-US" sz="1300" b="1" dirty="0">
+                <a:solidFill>
+                  <a:srgbClr val="FF0000"/>
+                </a:solidFill>
+              </a:rPr>
+              <a:t>이 방식으로</a:t>
+            </a:r>
+            <a:endParaRPr lang="en-US" altLang="ko-KR" sz="1300" b="1" dirty="0">
+              <a:solidFill>
+                <a:srgbClr val="FF0000"/>
+              </a:solidFill>
+            </a:endParaRPr>
+          </a:p>
+          <a:p>
+            <a:pPr>
+              <a:lnSpc>
+                <a:spcPct val="150000"/>
+              </a:lnSpc>
+            </a:pPr>
+            <a:r>
+              <a:rPr lang="en-US" altLang="ko-KR" sz="1300" b="1" dirty="0">
+                <a:solidFill>
+                  <a:srgbClr val="FF0000"/>
+                </a:solidFill>
+              </a:rPr>
+              <a:t>                                     </a:t>
+            </a:r>
+            <a:r>
+              <a:rPr lang="ko-KR" altLang="en-US" sz="1300" b="1" dirty="0">
+                <a:solidFill>
+                  <a:srgbClr val="FF0000"/>
+                </a:solidFill>
+              </a:rPr>
+              <a:t>처리됨</a:t>
+            </a:r>
+            <a:endParaRPr lang="en-US" altLang="ko-KR" sz="1300" b="1" dirty="0">
+              <a:solidFill>
+                <a:srgbClr val="FF0000"/>
+              </a:solidFill>
+            </a:endParaRPr>
+          </a:p>
+          <a:p>
+            <a:pPr>
+              <a:lnSpc>
+                <a:spcPct val="150000"/>
+              </a:lnSpc>
+            </a:pPr>
+            <a:r>
+              <a:rPr lang="en-US" altLang="ko-KR" sz="1300" dirty="0"/>
+              <a:t>     3. INDEX FULL SCAN    : </a:t>
+            </a:r>
+            <a:r>
+              <a:rPr lang="ko-KR" altLang="en-US" sz="1300" dirty="0"/>
+              <a:t>최적의 </a:t>
+            </a:r>
+            <a:r>
+              <a:rPr lang="en-US" altLang="ko-KR" sz="1300" dirty="0"/>
+              <a:t>INDEX</a:t>
+            </a:r>
+            <a:r>
+              <a:rPr lang="ko-KR" altLang="en-US" sz="1300" dirty="0"/>
+              <a:t>가 없을 때</a:t>
+            </a:r>
+            <a:r>
+              <a:rPr lang="en-US" altLang="ko-KR" sz="1300" dirty="0"/>
+              <a:t>, </a:t>
+            </a:r>
+            <a:r>
+              <a:rPr lang="ko-KR" altLang="en-US" sz="1300" dirty="0"/>
+              <a:t>차선으로 선택되는 방식</a:t>
+            </a:r>
+            <a:endParaRPr lang="en-US" altLang="ko-KR" sz="1300" dirty="0"/>
+          </a:p>
+          <a:p>
+            <a:pPr>
+              <a:lnSpc>
+                <a:spcPct val="150000"/>
+              </a:lnSpc>
+            </a:pPr>
+            <a:r>
+              <a:rPr lang="en-US" altLang="ko-KR" sz="1300" dirty="0"/>
+              <a:t>                                     </a:t>
+            </a:r>
+            <a:r>
+              <a:rPr lang="en-US" altLang="ko-KR" sz="1300" b="1" dirty="0">
+                <a:solidFill>
+                  <a:srgbClr val="FF0000"/>
+                </a:solidFill>
+              </a:rPr>
+              <a:t>INEDX </a:t>
+            </a:r>
+            <a:r>
+              <a:rPr lang="ko-KR" altLang="en-US" sz="1300" b="1" dirty="0">
+                <a:solidFill>
+                  <a:srgbClr val="FF0000"/>
+                </a:solidFill>
+              </a:rPr>
+              <a:t>선두 컬럼이 조건절에 없으면</a:t>
+            </a:r>
+            <a:r>
+              <a:rPr lang="en-US" altLang="ko-KR" sz="1300" b="1" dirty="0">
+                <a:solidFill>
+                  <a:srgbClr val="FF0000"/>
+                </a:solidFill>
+              </a:rPr>
+              <a:t> TABLE FULL SCAN</a:t>
+            </a:r>
+            <a:r>
+              <a:rPr lang="ko-KR" altLang="en-US" sz="1300" b="1" dirty="0">
+                <a:solidFill>
+                  <a:srgbClr val="FF0000"/>
+                </a:solidFill>
+              </a:rPr>
+              <a:t>을 고려</a:t>
+            </a:r>
+            <a:r>
+              <a:rPr lang="ko-KR" altLang="en-US" sz="1300" dirty="0"/>
+              <a:t>하나</a:t>
+            </a:r>
+            <a:r>
+              <a:rPr lang="en-US" altLang="ko-KR" sz="1300" dirty="0"/>
+              <a:t>, TABLE FULL SCAN</a:t>
+            </a:r>
+            <a:r>
+              <a:rPr lang="ko-KR" altLang="en-US" sz="1300" dirty="0"/>
+              <a:t>보다 </a:t>
+            </a:r>
+            <a:r>
+              <a:rPr lang="en-US" altLang="ko-KR" sz="1300" dirty="0"/>
+              <a:t>I/O</a:t>
+            </a:r>
+            <a:r>
+              <a:rPr lang="ko-KR" altLang="en-US" sz="1300" dirty="0"/>
+              <a:t>를</a:t>
+            </a:r>
+            <a:endParaRPr lang="en-US" altLang="ko-KR" sz="1300" dirty="0"/>
+          </a:p>
+          <a:p>
+            <a:pPr>
+              <a:lnSpc>
+                <a:spcPct val="150000"/>
+              </a:lnSpc>
+            </a:pPr>
+            <a:r>
+              <a:rPr lang="en-US" altLang="ko-KR" sz="1300" dirty="0"/>
+              <a:t>                                     </a:t>
+            </a:r>
+            <a:r>
+              <a:rPr lang="ko-KR" altLang="en-US" sz="1300" dirty="0"/>
+              <a:t>줄일 수 있거나 정렬된 결과를 쉽게 얻을 수 있을 경우 선택</a:t>
+            </a:r>
+            <a:endParaRPr lang="en-US" altLang="ko-KR" sz="1300" dirty="0"/>
+          </a:p>
+        </p:txBody>
+      </p:sp>
+      <p:sp>
+        <p:nvSpPr>
+          <p:cNvPr id="16" name="제목 1">
+            <a:extLst>
+              <a:ext uri="{FF2B5EF4-FFF2-40B4-BE49-F238E27FC236}">
+                <a16:creationId xmlns:a16="http://schemas.microsoft.com/office/drawing/2014/main" id="{BDE76D3B-C372-4CA3-A4FD-33642B295B4F}"/>
+              </a:ext>
+            </a:extLst>
+          </p:cNvPr>
+          <p:cNvSpPr>
+            <a:spLocks noGrp="1"/>
+          </p:cNvSpPr>
+          <p:nvPr>
+            <p:ph type="title"/>
+          </p:nvPr>
+        </p:nvSpPr>
+        <p:spPr>
+          <a:xfrm>
+            <a:off x="363984" y="53269"/>
+            <a:ext cx="6587232" cy="408372"/>
+          </a:xfrm>
+        </p:spPr>
+        <p:txBody>
+          <a:bodyPr/>
+          <a:lstStyle/>
+          <a:p>
+            <a:r>
+              <a:rPr lang="en-US" altLang="ko-KR" dirty="0">
+                <a:latin typeface="나눔고딕" panose="020B0600000101010101" charset="-127"/>
+                <a:ea typeface="나눔고딕" panose="020B0600000101010101" charset="-127"/>
+              </a:rPr>
+              <a:t>5. INDEX SCAN </a:t>
+            </a:r>
+            <a:endParaRPr lang="ko-KR" altLang="en-US" dirty="0">
+              <a:latin typeface="나눔고딕" panose="020B0600000101010101" charset="-127"/>
+              <a:ea typeface="나눔고딕" panose="020B0600000101010101" charset="-127"/>
+            </a:endParaRPr>
+          </a:p>
+        </p:txBody>
+      </p:sp>
+    </p:spTree>
+    <p:extLst>
+      <p:ext uri="{BB962C8B-B14F-4D97-AF65-F5344CB8AC3E}">
+        <p14:creationId xmlns:p14="http://schemas.microsoft.com/office/powerpoint/2010/main" val="4237486263"/>
+      </p:ext>
+    </p:extLst>
+  </p:cSld>
+  <p:clrMapOvr>
+    <a:masterClrMapping/>
+  </p:clrMapOvr>
+</p:sld>
+</file>
+
+<file path=ppt/slides/slide32.xml><?xml version="1.0" encoding="utf-8"?>
+<p:sld xmlns:a="http://schemas.openxmlformats.org/drawingml/2006/main" xmlns:r="http://schemas.openxmlformats.org/officeDocument/2006/relationships" xmlns:p="http://schemas.openxmlformats.org/presentationml/2006/main">
+  <p:cSld>
+    <p:spTree>
+      <p:nvGrpSpPr>
+        <p:cNvPr id="1" name=""/>
+        <p:cNvGrpSpPr/>
+        <p:nvPr/>
+      </p:nvGrpSpPr>
+      <p:grpSpPr>
+        <a:xfrm>
+          <a:off x="0" y="0"/>
+          <a:ext cx="0" cy="0"/>
+          <a:chOff x="0" y="0"/>
+          <a:chExt cx="0" cy="0"/>
+        </a:xfrm>
+      </p:grpSpPr>
+      <p:sp>
+        <p:nvSpPr>
+          <p:cNvPr id="47" name="텍스트 개체 틀 3">
+            <a:extLst>
+              <a:ext uri="{FF2B5EF4-FFF2-40B4-BE49-F238E27FC236}">
+                <a16:creationId xmlns:a16="http://schemas.microsoft.com/office/drawing/2014/main" id="{BD6E26C7-2547-444C-8643-2B2EEE99F2F4}"/>
+              </a:ext>
+            </a:extLst>
+          </p:cNvPr>
+          <p:cNvSpPr>
+            <a:spLocks noGrp="1"/>
+          </p:cNvSpPr>
+          <p:nvPr>
+            <p:ph type="body" sz="quarter" idx="13"/>
+          </p:nvPr>
+        </p:nvSpPr>
+        <p:spPr>
+          <a:xfrm>
+            <a:off x="6747393" y="62621"/>
+            <a:ext cx="2822735" cy="390525"/>
+          </a:xfrm>
+        </p:spPr>
+        <p:txBody>
+          <a:bodyPr/>
+          <a:lstStyle/>
+          <a:p>
+            <a:r>
+              <a:rPr lang="en-US" altLang="ko-KR" dirty="0">
+                <a:latin typeface="나눔고딕" panose="020D0604000000000000" pitchFamily="50" charset="-127"/>
+                <a:ea typeface="나눔고딕" panose="020D0604000000000000" pitchFamily="50" charset="-127"/>
+              </a:rPr>
+              <a:t>Ⅱ. </a:t>
+            </a:r>
+            <a:r>
+              <a:rPr lang="ko-KR" altLang="en-US" dirty="0">
+                <a:latin typeface="나눔고딕" panose="020D0604000000000000" pitchFamily="50" charset="-127"/>
+                <a:ea typeface="나눔고딕" panose="020D0604000000000000" pitchFamily="50" charset="-127"/>
+              </a:rPr>
+              <a:t>실행계획</a:t>
+            </a:r>
+          </a:p>
+        </p:txBody>
+      </p:sp>
+      <p:sp>
+        <p:nvSpPr>
+          <p:cNvPr id="14" name="슬라이드 번호 개체 틀 2">
+            <a:extLst>
+              <a:ext uri="{FF2B5EF4-FFF2-40B4-BE49-F238E27FC236}">
+                <a16:creationId xmlns:a16="http://schemas.microsoft.com/office/drawing/2014/main" id="{E3626C26-BF47-4717-80D4-21BA55993E00}"/>
+              </a:ext>
+            </a:extLst>
+          </p:cNvPr>
+          <p:cNvSpPr>
+            <a:spLocks noGrp="1"/>
+          </p:cNvSpPr>
+          <p:nvPr>
+            <p:ph type="sldNum" sz="quarter" idx="12"/>
+          </p:nvPr>
+        </p:nvSpPr>
+        <p:spPr>
+          <a:xfrm>
+            <a:off x="4439346" y="6528442"/>
+            <a:ext cx="1029301" cy="276999"/>
+          </a:xfrm>
+        </p:spPr>
+        <p:txBody>
+          <a:bodyPr>
+            <a:normAutofit fontScale="92500"/>
+          </a:bodyPr>
+          <a:lstStyle/>
+          <a:p>
+            <a:fld id="{EBB166B3-33A6-45CA-B81B-F13BE7654232}" type="slidenum">
+              <a:rPr lang="ko-KR" altLang="en-US" smtClean="0">
+                <a:latin typeface="나눔고딕" panose="020B0600000101010101" charset="-127"/>
+                <a:ea typeface="나눔고딕" panose="020B0600000101010101" charset="-127"/>
+              </a:rPr>
+              <a:t>31</a:t>
+            </a:fld>
+            <a:endParaRPr lang="ko-KR" altLang="en-US" dirty="0">
+              <a:latin typeface="나눔고딕" panose="020B0600000101010101" charset="-127"/>
+              <a:ea typeface="나눔고딕" panose="020B0600000101010101" charset="-127"/>
+            </a:endParaRPr>
+          </a:p>
+        </p:txBody>
+      </p:sp>
+      <p:sp>
+        <p:nvSpPr>
+          <p:cNvPr id="3" name="TextBox 2">
+            <a:extLst>
+              <a:ext uri="{FF2B5EF4-FFF2-40B4-BE49-F238E27FC236}">
+                <a16:creationId xmlns:a16="http://schemas.microsoft.com/office/drawing/2014/main" id="{43BD4B0A-C817-40FC-8794-1A803D7B2883}"/>
+              </a:ext>
+            </a:extLst>
+          </p:cNvPr>
+          <p:cNvSpPr txBox="1"/>
+          <p:nvPr/>
+        </p:nvSpPr>
+        <p:spPr>
+          <a:xfrm>
+            <a:off x="217129" y="861850"/>
+            <a:ext cx="2625142" cy="353751"/>
+          </a:xfrm>
+          <a:prstGeom prst="rect">
+            <a:avLst/>
+          </a:prstGeom>
+          <a:noFill/>
+        </p:spPr>
+        <p:txBody>
+          <a:bodyPr wrap="none" rtlCol="0">
+            <a:spAutoFit/>
+          </a:bodyPr>
+          <a:lstStyle/>
+          <a:p>
+            <a:pPr marL="285750" indent="-285750">
+              <a:lnSpc>
+                <a:spcPct val="150000"/>
+              </a:lnSpc>
+              <a:buFont typeface="Arial" panose="020B0604020202020204" pitchFamily="34" charset="0"/>
+              <a:buChar char="•"/>
+            </a:pPr>
+            <a:r>
+              <a:rPr lang="en-US" altLang="ko-KR" sz="1300" dirty="0"/>
+              <a:t>INDEX SCAN </a:t>
+            </a:r>
+            <a:r>
+              <a:rPr lang="ko-KR" altLang="en-US" sz="1300" dirty="0"/>
+              <a:t>예시 추가 필요</a:t>
+            </a:r>
+            <a:endParaRPr lang="en-US" altLang="ko-KR" sz="1300" dirty="0"/>
+          </a:p>
+        </p:txBody>
+      </p:sp>
+      <p:sp>
+        <p:nvSpPr>
+          <p:cNvPr id="16" name="제목 1">
+            <a:extLst>
+              <a:ext uri="{FF2B5EF4-FFF2-40B4-BE49-F238E27FC236}">
+                <a16:creationId xmlns:a16="http://schemas.microsoft.com/office/drawing/2014/main" id="{BDE76D3B-C372-4CA3-A4FD-33642B295B4F}"/>
+              </a:ext>
+            </a:extLst>
+          </p:cNvPr>
+          <p:cNvSpPr>
+            <a:spLocks noGrp="1"/>
+          </p:cNvSpPr>
+          <p:nvPr>
+            <p:ph type="title"/>
+          </p:nvPr>
+        </p:nvSpPr>
+        <p:spPr>
+          <a:xfrm>
+            <a:off x="363984" y="53269"/>
+            <a:ext cx="6587232" cy="408372"/>
+          </a:xfrm>
+        </p:spPr>
+        <p:txBody>
+          <a:bodyPr/>
+          <a:lstStyle/>
+          <a:p>
+            <a:r>
+              <a:rPr lang="en-US" altLang="ko-KR" dirty="0">
+                <a:latin typeface="나눔고딕" panose="020B0600000101010101" charset="-127"/>
+                <a:ea typeface="나눔고딕" panose="020B0600000101010101" charset="-127"/>
+              </a:rPr>
+              <a:t>5. INDEX SCAN </a:t>
+            </a:r>
+            <a:endParaRPr lang="ko-KR" altLang="en-US" dirty="0">
+              <a:latin typeface="나눔고딕" panose="020B0600000101010101" charset="-127"/>
+              <a:ea typeface="나눔고딕" panose="020B0600000101010101" charset="-127"/>
+            </a:endParaRPr>
+          </a:p>
+        </p:txBody>
+      </p:sp>
+    </p:spTree>
+    <p:extLst>
+      <p:ext uri="{BB962C8B-B14F-4D97-AF65-F5344CB8AC3E}">
+        <p14:creationId xmlns:p14="http://schemas.microsoft.com/office/powerpoint/2010/main" val="3792975170"/>
+      </p:ext>
+    </p:extLst>
+  </p:cSld>
+  <p:clrMapOvr>
+    <a:masterClrMapping/>
+  </p:clrMapOvr>
+</p:sld>
+</file>
+
+<file path=ppt/slides/slide33.xml><?xml version="1.0" encoding="utf-8"?>
+<p:sld xmlns:a="http://schemas.openxmlformats.org/drawingml/2006/main" xmlns:r="http://schemas.openxmlformats.org/officeDocument/2006/relationships" xmlns:p="http://schemas.openxmlformats.org/presentationml/2006/main">
+  <p:cSld>
+    <p:spTree>
+      <p:nvGrpSpPr>
+        <p:cNvPr id="1" name=""/>
+        <p:cNvGrpSpPr/>
+        <p:nvPr/>
+      </p:nvGrpSpPr>
+      <p:grpSpPr>
+        <a:xfrm>
+          <a:off x="0" y="0"/>
+          <a:ext cx="0" cy="0"/>
+          <a:chOff x="0" y="0"/>
+          <a:chExt cx="0" cy="0"/>
+        </a:xfrm>
+      </p:grpSpPr>
+      <p:sp>
+        <p:nvSpPr>
+          <p:cNvPr id="2" name="제목 1">
+            <a:extLst>
+              <a:ext uri="{FF2B5EF4-FFF2-40B4-BE49-F238E27FC236}">
+                <a16:creationId xmlns:a16="http://schemas.microsoft.com/office/drawing/2014/main" id="{F35C43C8-4428-4D97-87C2-6ACA5057AB6C}"/>
+              </a:ext>
+            </a:extLst>
+          </p:cNvPr>
+          <p:cNvSpPr>
+            <a:spLocks noGrp="1"/>
+          </p:cNvSpPr>
+          <p:nvPr>
+            <p:ph type="title"/>
+          </p:nvPr>
+        </p:nvSpPr>
+        <p:spPr/>
+        <p:txBody>
+          <a:bodyPr/>
+          <a:lstStyle/>
+          <a:p>
+            <a:r>
+              <a:rPr lang="en-US" altLang="ko-KR" dirty="0">
+                <a:latin typeface="나눔고딕" panose="020B0600000101010101" charset="-127"/>
+                <a:ea typeface="나눔고딕" panose="020B0600000101010101" charset="-127"/>
+              </a:rPr>
+              <a:t>6. ROWID SCAN</a:t>
+            </a:r>
+            <a:endParaRPr lang="ko-KR" altLang="en-US" dirty="0">
+              <a:latin typeface="나눔고딕" panose="020B0600000101010101" charset="-127"/>
+              <a:ea typeface="나눔고딕" panose="020B0600000101010101" charset="-127"/>
+            </a:endParaRPr>
+          </a:p>
+        </p:txBody>
+      </p:sp>
+      <p:sp>
+        <p:nvSpPr>
+          <p:cNvPr id="47" name="텍스트 개체 틀 3">
+            <a:extLst>
+              <a:ext uri="{FF2B5EF4-FFF2-40B4-BE49-F238E27FC236}">
+                <a16:creationId xmlns:a16="http://schemas.microsoft.com/office/drawing/2014/main" id="{BD6E26C7-2547-444C-8643-2B2EEE99F2F4}"/>
+              </a:ext>
+            </a:extLst>
+          </p:cNvPr>
+          <p:cNvSpPr>
+            <a:spLocks noGrp="1"/>
+          </p:cNvSpPr>
+          <p:nvPr>
+            <p:ph type="body" sz="quarter" idx="13"/>
+          </p:nvPr>
+        </p:nvSpPr>
+        <p:spPr>
+          <a:xfrm>
+            <a:off x="6747393" y="62621"/>
+            <a:ext cx="2822735" cy="390525"/>
+          </a:xfrm>
+        </p:spPr>
+        <p:txBody>
+          <a:bodyPr/>
+          <a:lstStyle/>
+          <a:p>
+            <a:r>
+              <a:rPr lang="en-US" altLang="ko-KR" dirty="0">
+                <a:latin typeface="나눔고딕" panose="020D0604000000000000" pitchFamily="50" charset="-127"/>
+                <a:ea typeface="나눔고딕" panose="020D0604000000000000" pitchFamily="50" charset="-127"/>
+              </a:rPr>
+              <a:t>Ⅱ. </a:t>
+            </a:r>
+            <a:r>
+              <a:rPr lang="ko-KR" altLang="en-US" dirty="0">
+                <a:latin typeface="나눔고딕" panose="020D0604000000000000" pitchFamily="50" charset="-127"/>
+                <a:ea typeface="나눔고딕" panose="020D0604000000000000" pitchFamily="50" charset="-127"/>
+              </a:rPr>
+              <a:t>실행계획</a:t>
+            </a:r>
+          </a:p>
+        </p:txBody>
+      </p:sp>
+      <p:sp>
+        <p:nvSpPr>
+          <p:cNvPr id="14" name="슬라이드 번호 개체 틀 2">
+            <a:extLst>
+              <a:ext uri="{FF2B5EF4-FFF2-40B4-BE49-F238E27FC236}">
+                <a16:creationId xmlns:a16="http://schemas.microsoft.com/office/drawing/2014/main" id="{E3626C26-BF47-4717-80D4-21BA55993E00}"/>
+              </a:ext>
+            </a:extLst>
+          </p:cNvPr>
+          <p:cNvSpPr>
+            <a:spLocks noGrp="1"/>
+          </p:cNvSpPr>
+          <p:nvPr>
+            <p:ph type="sldNum" sz="quarter" idx="12"/>
+          </p:nvPr>
+        </p:nvSpPr>
+        <p:spPr>
+          <a:xfrm>
+            <a:off x="4439346" y="6528442"/>
+            <a:ext cx="1029301" cy="276999"/>
+          </a:xfrm>
+        </p:spPr>
+        <p:txBody>
+          <a:bodyPr>
+            <a:normAutofit fontScale="92500"/>
+          </a:bodyPr>
+          <a:lstStyle/>
+          <a:p>
+            <a:fld id="{EBB166B3-33A6-45CA-B81B-F13BE7654232}" type="slidenum">
+              <a:rPr lang="ko-KR" altLang="en-US" smtClean="0">
+                <a:latin typeface="나눔고딕" panose="020B0600000101010101" charset="-127"/>
+                <a:ea typeface="나눔고딕" panose="020B0600000101010101" charset="-127"/>
+              </a:rPr>
+              <a:t>32</a:t>
+            </a:fld>
+            <a:endParaRPr lang="ko-KR" altLang="en-US" dirty="0">
+              <a:latin typeface="나눔고딕" panose="020B0600000101010101" charset="-127"/>
+              <a:ea typeface="나눔고딕" panose="020B0600000101010101" charset="-127"/>
+            </a:endParaRPr>
+          </a:p>
+        </p:txBody>
+      </p:sp>
+      <p:sp>
+        <p:nvSpPr>
+          <p:cNvPr id="3" name="TextBox 2">
+            <a:extLst>
+              <a:ext uri="{FF2B5EF4-FFF2-40B4-BE49-F238E27FC236}">
+                <a16:creationId xmlns:a16="http://schemas.microsoft.com/office/drawing/2014/main" id="{43BD4B0A-C817-40FC-8794-1A803D7B2883}"/>
+              </a:ext>
+            </a:extLst>
+          </p:cNvPr>
+          <p:cNvSpPr txBox="1"/>
+          <p:nvPr/>
+        </p:nvSpPr>
+        <p:spPr>
+          <a:xfrm>
             <a:off x="220453" y="738231"/>
             <a:ext cx="5109604" cy="953915"/>
           </a:xfrm>
@@ -22723,7 +23084,7 @@
 </p:sld>
 </file>
 
-<file path=ppt/slides/slide32.xml><?xml version="1.0" encoding="utf-8"?>
+<file path=ppt/slides/slide34.xml><?xml version="1.0" encoding="utf-8"?>
 <p:sld xmlns:a="http://schemas.openxmlformats.org/drawingml/2006/main" xmlns:r="http://schemas.openxmlformats.org/officeDocument/2006/relationships" xmlns:p="http://schemas.openxmlformats.org/presentationml/2006/main">
   <p:cSld>
     <p:spTree>
@@ -23156,7 +23517,7 @@
                 <a:latin typeface="나눔고딕" panose="020B0600000101010101" charset="-127"/>
                 <a:ea typeface="나눔고딕" panose="020B0600000101010101" charset="-127"/>
               </a:rPr>
-              <a:t>31</a:t>
+              <a:t>33</a:t>
             </a:fld>
             <a:endParaRPr lang="ko-KR" altLang="en-US" dirty="0">
               <a:latin typeface="나눔고딕" panose="020B0600000101010101" charset="-127"/>

</xml_diff>